<commit_message>
- Affichage d'une carte sur un canvas - Révision du ppt qui montre l'enchaînement des étapes - Comptage d'une main - Boucle principale
</commit_message>
<xml_diff>
--- a/Plan du code.pptx
+++ b/Plan du code.pptx
@@ -8,7 +8,7 @@
     <p:notesMasterId r:id="rId3"/>
   </p:notesMasterIdLst>
   <p:sldIdLst>
-    <p:sldId id="257" r:id="rId2"/>
+    <p:sldId id="258" r:id="rId2"/>
   </p:sldIdLst>
   <p:sldSz cx="9144000" cy="6858000" type="screen4x3"/>
   <p:notesSz cx="6858000" cy="9144000"/>
@@ -107,6 +107,22 @@
       </a:defRPr>
     </a:lvl9pPr>
   </p:defaultTextStyle>
+  <p:extLst>
+    <p:ext uri="{EFAFB233-063F-42B5-8137-9DF3F51BA10A}">
+      <p15:sldGuideLst xmlns:p15="http://schemas.microsoft.com/office/powerpoint/2012/main">
+        <p15:guide id="1" orient="horz" pos="2160">
+          <p15:clr>
+            <a:srgbClr val="A4A3A4"/>
+          </p15:clr>
+        </p15:guide>
+        <p15:guide id="2" pos="2880">
+          <p15:clr>
+            <a:srgbClr val="A4A3A4"/>
+          </p15:clr>
+        </p15:guide>
+      </p15:sldGuideLst>
+    </p:ext>
+  </p:extLst>
 </p:presentation>
 </file>
 
@@ -193,7 +209,7 @@
             <a:fld id="{DDC8463C-3E3A-418A-A60E-8E63D1408739}" type="datetimeFigureOut">
               <a:rPr lang="fr-FR" smtClean="0"/>
               <a:pPr/>
-              <a:t>08/02/2016</a:t>
+              <a:t>02/03/2016</a:t>
             </a:fld>
             <a:endParaRPr lang="fr-FR"/>
           </a:p>
@@ -355,13 +371,18 @@
             <a:fld id="{18542CE6-5613-49DF-9696-56BD62AA6F54}" type="slidenum">
               <a:rPr lang="fr-FR" smtClean="0"/>
               <a:pPr/>
-              <a:t>‹N°›</a:t>
+              <a:t>‹#›</a:t>
             </a:fld>
             <a:endParaRPr lang="fr-FR"/>
           </a:p>
         </p:txBody>
       </p:sp>
     </p:spTree>
+    <p:extLst>
+      <p:ext uri="{BB962C8B-B14F-4D97-AF65-F5344CB8AC3E}">
+        <p14:creationId xmlns:p14="http://schemas.microsoft.com/office/powerpoint/2010/main" val="4209985601"/>
+      </p:ext>
+    </p:extLst>
   </p:cSld>
   <p:clrMap bg1="lt1" tx1="dk1" bg2="lt2" tx2="dk2" accent1="accent1" accent2="accent2" accent3="accent3" accent4="accent4" accent5="accent5" accent6="accent6" hlink="hlink" folHlink="folHlink"/>
   <p:notesStyle>
@@ -506,21 +527,74 @@
           <a:lstStyle/>
           <a:p>
             <a:r>
-              <a:rPr lang="fr-FR" dirty="0" smtClean="0"/>
-              <a:t>Joueur</a:t>
-            </a:r>
-            <a:r>
               <a:rPr lang="fr-FR" baseline="0" dirty="0" smtClean="0"/>
-              <a:t> en premier ? Croupier en premier ?</a:t>
-            </a:r>
-          </a:p>
-          <a:p>
+              <a:t>1 carte croupier et 2 cartes joueur</a:t>
+            </a:r>
+          </a:p>
+          <a:p>
+            <a:pPr marL="0" marR="0" indent="0" algn="l" defTabSz="914400" rtl="0" eaLnBrk="1" fontAlgn="auto" latinLnBrk="0" hangingPunct="1">
+              <a:lnSpc>
+                <a:spcPct val="100000"/>
+              </a:lnSpc>
+              <a:spcBef>
+                <a:spcPts val="0"/>
+              </a:spcBef>
+              <a:spcAft>
+                <a:spcPts val="0"/>
+              </a:spcAft>
+              <a:buClrTx/>
+              <a:buSzTx/>
+              <a:buFontTx/>
+              <a:buNone/>
+              <a:tabLst/>
+              <a:defRPr/>
+            </a:pPr>
             <a:r>
               <a:rPr lang="fr-FR" baseline="0" dirty="0" smtClean="0"/>
-              <a:t>Boucle interne tirer/rester/perdu</a:t>
-            </a:r>
-          </a:p>
-          <a:p>
+              <a:t>Le joueur fait ses choix	Boucle interne tirer/rester/perdu</a:t>
+            </a:r>
+          </a:p>
+          <a:p>
+            <a:pPr marL="0" marR="0" indent="0" algn="l" defTabSz="914400" rtl="0" eaLnBrk="1" fontAlgn="auto" latinLnBrk="0" hangingPunct="1">
+              <a:lnSpc>
+                <a:spcPct val="100000"/>
+              </a:lnSpc>
+              <a:spcBef>
+                <a:spcPts val="0"/>
+              </a:spcBef>
+              <a:spcAft>
+                <a:spcPts val="0"/>
+              </a:spcAft>
+              <a:buClrTx/>
+              <a:buSzTx/>
+              <a:buFontTx/>
+              <a:buNone/>
+              <a:tabLst/>
+              <a:defRPr/>
+            </a:pPr>
+            <a:r>
+              <a:rPr lang="fr-FR" baseline="0" dirty="0" smtClean="0"/>
+              <a:t>Le croupier tire jusqu’à 17	Boucle interne tirer/rester/perdu</a:t>
+            </a:r>
+          </a:p>
+          <a:p>
+            <a:pPr marL="0" marR="0" indent="0" algn="l" defTabSz="914400" rtl="0" eaLnBrk="1" fontAlgn="auto" latinLnBrk="0" hangingPunct="1">
+              <a:lnSpc>
+                <a:spcPct val="100000"/>
+              </a:lnSpc>
+              <a:spcBef>
+                <a:spcPts val="0"/>
+              </a:spcBef>
+              <a:spcAft>
+                <a:spcPts val="0"/>
+              </a:spcAft>
+              <a:buClrTx/>
+              <a:buSzTx/>
+              <a:buFontTx/>
+              <a:buNone/>
+              <a:tabLst/>
+              <a:defRPr/>
+            </a:pPr>
             <a:r>
               <a:rPr lang="fr-FR" baseline="0" dirty="0" smtClean="0"/>
               <a:t>Dans cette boucle, appel à tirer carte, calculer main, compter cartes…</a:t>
@@ -529,25 +603,37 @@
           <a:p>
             <a:r>
               <a:rPr lang="fr-FR" baseline="0" dirty="0" smtClean="0"/>
-              <a:t>A l’issue des 2 boucles, comparer score et continuer</a:t>
-            </a:r>
-          </a:p>
-          <a:p>
-            <a:endParaRPr lang="fr-FR" baseline="0" dirty="0" smtClean="0"/>
+              <a:t>Comparer les scores</a:t>
+            </a:r>
           </a:p>
           <a:p>
             <a:r>
               <a:rPr lang="fr-FR" baseline="0" dirty="0" smtClean="0"/>
-              <a:t>Ajouter affichage graphique, son…</a:t>
-            </a:r>
-          </a:p>
-          <a:p>
-            <a:endParaRPr lang="fr-FR" baseline="0" dirty="0" smtClean="0"/>
-          </a:p>
-          <a:p>
+              <a:t>A </a:t>
+            </a:r>
             <a:r>
               <a:rPr lang="fr-FR" baseline="0" dirty="0" smtClean="0"/>
-              <a:t>Fichier de paramètres avec le choix du casino sur le seuil pour le croupier (17 ou 18)</a:t>
+              <a:t>l’issue des 2 boucles, comparer score et continuer</a:t>
+            </a:r>
+          </a:p>
+          <a:p>
+            <a:r>
+              <a:rPr lang="fr-FR" baseline="0" dirty="0" smtClean="0"/>
+              <a:t>Ajouter </a:t>
+            </a:r>
+            <a:r>
+              <a:rPr lang="fr-FR" baseline="0" dirty="0" smtClean="0"/>
+              <a:t>affichage graphique, son…</a:t>
+            </a:r>
+          </a:p>
+          <a:p>
+            <a:r>
+              <a:rPr lang="fr-FR" baseline="0" smtClean="0"/>
+              <a:t>Fichier </a:t>
+            </a:r>
+            <a:r>
+              <a:rPr lang="fr-FR" baseline="0" dirty="0" smtClean="0"/>
+              <a:t>de paramètres avec le choix du casino sur le seuil pour le croupier (17 ou 18)</a:t>
             </a:r>
             <a:endParaRPr lang="fr-FR" dirty="0"/>
           </a:p>
@@ -578,6 +664,11 @@
         </p:txBody>
       </p:sp>
     </p:spTree>
+    <p:extLst>
+      <p:ext uri="{BB962C8B-B14F-4D97-AF65-F5344CB8AC3E}">
+        <p14:creationId xmlns:p14="http://schemas.microsoft.com/office/powerpoint/2010/main" val="4006202470"/>
+      </p:ext>
+    </p:extLst>
   </p:cSld>
   <p:clrMapOvr>
     <a:masterClrMapping/>
@@ -767,7 +858,7 @@
             <a:fld id="{0A9D268A-F862-4ECA-AAA6-6F579D34DADA}" type="datetimeFigureOut">
               <a:rPr lang="fr-FR" smtClean="0"/>
               <a:pPr/>
-              <a:t>08/02/2016</a:t>
+              <a:t>02/03/2016</a:t>
             </a:fld>
             <a:endParaRPr lang="fr-FR"/>
           </a:p>
@@ -810,7 +901,7 @@
             <a:fld id="{A4043CEC-C98D-4494-94F9-6942A0180D31}" type="slidenum">
               <a:rPr lang="fr-FR" smtClean="0"/>
               <a:pPr/>
-              <a:t>‹N°›</a:t>
+              <a:t>‹#›</a:t>
             </a:fld>
             <a:endParaRPr lang="fr-FR"/>
           </a:p>
@@ -934,7 +1025,7 @@
             <a:fld id="{0A9D268A-F862-4ECA-AAA6-6F579D34DADA}" type="datetimeFigureOut">
               <a:rPr lang="fr-FR" smtClean="0"/>
               <a:pPr/>
-              <a:t>08/02/2016</a:t>
+              <a:t>02/03/2016</a:t>
             </a:fld>
             <a:endParaRPr lang="fr-FR"/>
           </a:p>
@@ -977,7 +1068,7 @@
             <a:fld id="{A4043CEC-C98D-4494-94F9-6942A0180D31}" type="slidenum">
               <a:rPr lang="fr-FR" smtClean="0"/>
               <a:pPr/>
-              <a:t>‹N°›</a:t>
+              <a:t>‹#›</a:t>
             </a:fld>
             <a:endParaRPr lang="fr-FR"/>
           </a:p>
@@ -1111,7 +1202,7 @@
             <a:fld id="{0A9D268A-F862-4ECA-AAA6-6F579D34DADA}" type="datetimeFigureOut">
               <a:rPr lang="fr-FR" smtClean="0"/>
               <a:pPr/>
-              <a:t>08/02/2016</a:t>
+              <a:t>02/03/2016</a:t>
             </a:fld>
             <a:endParaRPr lang="fr-FR"/>
           </a:p>
@@ -1154,7 +1245,7 @@
             <a:fld id="{A4043CEC-C98D-4494-94F9-6942A0180D31}" type="slidenum">
               <a:rPr lang="fr-FR" smtClean="0"/>
               <a:pPr/>
-              <a:t>‹N°›</a:t>
+              <a:t>‹#›</a:t>
             </a:fld>
             <a:endParaRPr lang="fr-FR"/>
           </a:p>
@@ -1278,7 +1369,7 @@
             <a:fld id="{0A9D268A-F862-4ECA-AAA6-6F579D34DADA}" type="datetimeFigureOut">
               <a:rPr lang="fr-FR" smtClean="0"/>
               <a:pPr/>
-              <a:t>08/02/2016</a:t>
+              <a:t>02/03/2016</a:t>
             </a:fld>
             <a:endParaRPr lang="fr-FR"/>
           </a:p>
@@ -1321,7 +1412,7 @@
             <a:fld id="{A4043CEC-C98D-4494-94F9-6942A0180D31}" type="slidenum">
               <a:rPr lang="fr-FR" smtClean="0"/>
               <a:pPr/>
-              <a:t>‹N°›</a:t>
+              <a:t>‹#›</a:t>
             </a:fld>
             <a:endParaRPr lang="fr-FR"/>
           </a:p>
@@ -1521,7 +1612,7 @@
             <a:fld id="{0A9D268A-F862-4ECA-AAA6-6F579D34DADA}" type="datetimeFigureOut">
               <a:rPr lang="fr-FR" smtClean="0"/>
               <a:pPr/>
-              <a:t>08/02/2016</a:t>
+              <a:t>02/03/2016</a:t>
             </a:fld>
             <a:endParaRPr lang="fr-FR"/>
           </a:p>
@@ -1564,7 +1655,7 @@
             <a:fld id="{A4043CEC-C98D-4494-94F9-6942A0180D31}" type="slidenum">
               <a:rPr lang="fr-FR" smtClean="0"/>
               <a:pPr/>
-              <a:t>‹N°›</a:t>
+              <a:t>‹#›</a:t>
             </a:fld>
             <a:endParaRPr lang="fr-FR"/>
           </a:p>
@@ -1806,7 +1897,7 @@
             <a:fld id="{0A9D268A-F862-4ECA-AAA6-6F579D34DADA}" type="datetimeFigureOut">
               <a:rPr lang="fr-FR" smtClean="0"/>
               <a:pPr/>
-              <a:t>08/02/2016</a:t>
+              <a:t>02/03/2016</a:t>
             </a:fld>
             <a:endParaRPr lang="fr-FR"/>
           </a:p>
@@ -1849,7 +1940,7 @@
             <a:fld id="{A4043CEC-C98D-4494-94F9-6942A0180D31}" type="slidenum">
               <a:rPr lang="fr-FR" smtClean="0"/>
               <a:pPr/>
-              <a:t>‹N°›</a:t>
+              <a:t>‹#›</a:t>
             </a:fld>
             <a:endParaRPr lang="fr-FR"/>
           </a:p>
@@ -2225,7 +2316,7 @@
             <a:fld id="{0A9D268A-F862-4ECA-AAA6-6F579D34DADA}" type="datetimeFigureOut">
               <a:rPr lang="fr-FR" smtClean="0"/>
               <a:pPr/>
-              <a:t>08/02/2016</a:t>
+              <a:t>02/03/2016</a:t>
             </a:fld>
             <a:endParaRPr lang="fr-FR"/>
           </a:p>
@@ -2268,7 +2359,7 @@
             <a:fld id="{A4043CEC-C98D-4494-94F9-6942A0180D31}" type="slidenum">
               <a:rPr lang="fr-FR" smtClean="0"/>
               <a:pPr/>
-              <a:t>‹N°›</a:t>
+              <a:t>‹#›</a:t>
             </a:fld>
             <a:endParaRPr lang="fr-FR"/>
           </a:p>
@@ -2340,7 +2431,7 @@
             <a:fld id="{0A9D268A-F862-4ECA-AAA6-6F579D34DADA}" type="datetimeFigureOut">
               <a:rPr lang="fr-FR" smtClean="0"/>
               <a:pPr/>
-              <a:t>08/02/2016</a:t>
+              <a:t>02/03/2016</a:t>
             </a:fld>
             <a:endParaRPr lang="fr-FR"/>
           </a:p>
@@ -2383,7 +2474,7 @@
             <a:fld id="{A4043CEC-C98D-4494-94F9-6942A0180D31}" type="slidenum">
               <a:rPr lang="fr-FR" smtClean="0"/>
               <a:pPr/>
-              <a:t>‹N°›</a:t>
+              <a:t>‹#›</a:t>
             </a:fld>
             <a:endParaRPr lang="fr-FR"/>
           </a:p>
@@ -2432,7 +2523,7 @@
             <a:fld id="{0A9D268A-F862-4ECA-AAA6-6F579D34DADA}" type="datetimeFigureOut">
               <a:rPr lang="fr-FR" smtClean="0"/>
               <a:pPr/>
-              <a:t>08/02/2016</a:t>
+              <a:t>02/03/2016</a:t>
             </a:fld>
             <a:endParaRPr lang="fr-FR"/>
           </a:p>
@@ -2475,7 +2566,7 @@
             <a:fld id="{A4043CEC-C98D-4494-94F9-6942A0180D31}" type="slidenum">
               <a:rPr lang="fr-FR" smtClean="0"/>
               <a:pPr/>
-              <a:t>‹N°›</a:t>
+              <a:t>‹#›</a:t>
             </a:fld>
             <a:endParaRPr lang="fr-FR"/>
           </a:p>
@@ -2706,7 +2797,7 @@
             <a:fld id="{0A9D268A-F862-4ECA-AAA6-6F579D34DADA}" type="datetimeFigureOut">
               <a:rPr lang="fr-FR" smtClean="0"/>
               <a:pPr/>
-              <a:t>08/02/2016</a:t>
+              <a:t>02/03/2016</a:t>
             </a:fld>
             <a:endParaRPr lang="fr-FR"/>
           </a:p>
@@ -2749,7 +2840,7 @@
             <a:fld id="{A4043CEC-C98D-4494-94F9-6942A0180D31}" type="slidenum">
               <a:rPr lang="fr-FR" smtClean="0"/>
               <a:pPr/>
-              <a:t>‹N°›</a:t>
+              <a:t>‹#›</a:t>
             </a:fld>
             <a:endParaRPr lang="fr-FR"/>
           </a:p>
@@ -2956,7 +3047,7 @@
             <a:fld id="{0A9D268A-F862-4ECA-AAA6-6F579D34DADA}" type="datetimeFigureOut">
               <a:rPr lang="fr-FR" smtClean="0"/>
               <a:pPr/>
-              <a:t>08/02/2016</a:t>
+              <a:t>02/03/2016</a:t>
             </a:fld>
             <a:endParaRPr lang="fr-FR"/>
           </a:p>
@@ -2999,7 +3090,7 @@
             <a:fld id="{A4043CEC-C98D-4494-94F9-6942A0180D31}" type="slidenum">
               <a:rPr lang="fr-FR" smtClean="0"/>
               <a:pPr/>
-              <a:t>‹N°›</a:t>
+              <a:t>‹#›</a:t>
             </a:fld>
             <a:endParaRPr lang="fr-FR"/>
           </a:p>
@@ -3166,7 +3257,7 @@
             <a:fld id="{0A9D268A-F862-4ECA-AAA6-6F579D34DADA}" type="datetimeFigureOut">
               <a:rPr lang="fr-FR" smtClean="0"/>
               <a:pPr/>
-              <a:t>08/02/2016</a:t>
+              <a:t>02/03/2016</a:t>
             </a:fld>
             <a:endParaRPr lang="fr-FR"/>
           </a:p>
@@ -3245,7 +3336,7 @@
             <a:fld id="{A4043CEC-C98D-4494-94F9-6942A0180D31}" type="slidenum">
               <a:rPr lang="fr-FR" smtClean="0"/>
               <a:pPr/>
-              <a:t>‹N°›</a:t>
+              <a:t>‹#›</a:t>
             </a:fld>
             <a:endParaRPr lang="fr-FR"/>
           </a:p>
@@ -3545,7 +3636,7 @@
         </p:nvSpPr>
         <p:spPr>
           <a:xfrm>
-            <a:off x="3707904" y="1778332"/>
+            <a:off x="1431106" y="4748137"/>
             <a:ext cx="1728192" cy="276999"/>
           </a:xfrm>
           <a:prstGeom prst="rect">
@@ -3575,14 +3666,14 @@
       </p:sp>
       <p:sp>
         <p:nvSpPr>
-          <p:cNvPr id="6" name="ZoneTexte 5"/>
+          <p:cNvPr id="7" name="ZoneTexte 6"/>
           <p:cNvSpPr txBox="1"/>
           <p:nvPr/>
         </p:nvSpPr>
         <p:spPr>
           <a:xfrm>
-            <a:off x="6084168" y="2498412"/>
-            <a:ext cx="648072" cy="276999"/>
+            <a:off x="6012489" y="3974743"/>
+            <a:ext cx="2016224" cy="461665"/>
           </a:xfrm>
           <a:prstGeom prst="rect">
             <a:avLst/>
@@ -3603,7 +3694,18 @@
             <a:pPr algn="ctr"/>
             <a:r>
               <a:rPr lang="fr-FR" sz="1200" dirty="0" smtClean="0"/>
-              <a:t>Tirer</a:t>
+              <a:t>Comparer le </a:t>
+            </a:r>
+            <a:r>
+              <a:rPr lang="fr-FR" sz="1200" dirty="0" smtClean="0"/>
+              <a:t>score</a:t>
+            </a:r>
+          </a:p>
+          <a:p>
+            <a:pPr algn="ctr"/>
+            <a:r>
+              <a:rPr lang="fr-FR" sz="1200" dirty="0" smtClean="0"/>
+              <a:t>Afficher</a:t>
             </a:r>
             <a:endParaRPr lang="fr-FR" sz="1200" dirty="0"/>
           </a:p>
@@ -3611,14 +3713,14 @@
       </p:sp>
       <p:sp>
         <p:nvSpPr>
-          <p:cNvPr id="7" name="ZoneTexte 6"/>
+          <p:cNvPr id="8" name="ZoneTexte 7"/>
           <p:cNvSpPr txBox="1"/>
           <p:nvPr/>
         </p:nvSpPr>
         <p:spPr>
           <a:xfrm>
-            <a:off x="3563888" y="3866564"/>
-            <a:ext cx="2016224" cy="276999"/>
+            <a:off x="3860165" y="5309504"/>
+            <a:ext cx="792088" cy="276999"/>
           </a:xfrm>
           <a:prstGeom prst="rect">
             <a:avLst/>
@@ -3639,7 +3741,7 @@
             <a:pPr algn="ctr"/>
             <a:r>
               <a:rPr lang="fr-FR" sz="1200" dirty="0" smtClean="0"/>
-              <a:t>Comparer le score</a:t>
+              <a:t>Perdu</a:t>
             </a:r>
             <a:endParaRPr lang="fr-FR" sz="1200" dirty="0"/>
           </a:p>
@@ -3647,14 +3749,14 @@
       </p:sp>
       <p:sp>
         <p:nvSpPr>
-          <p:cNvPr id="8" name="ZoneTexte 7"/>
+          <p:cNvPr id="11" name="ZoneTexte 10"/>
           <p:cNvSpPr txBox="1"/>
           <p:nvPr/>
         </p:nvSpPr>
         <p:spPr>
           <a:xfrm>
-            <a:off x="7812360" y="2498412"/>
-            <a:ext cx="792088" cy="276999"/>
+            <a:off x="1742085" y="2777493"/>
+            <a:ext cx="1080120" cy="461665"/>
           </a:xfrm>
           <a:prstGeom prst="rect">
             <a:avLst/>
@@ -3675,7 +3777,7 @@
             <a:pPr algn="ctr"/>
             <a:r>
               <a:rPr lang="fr-FR" sz="1200" dirty="0" smtClean="0"/>
-              <a:t>Perdu</a:t>
+              <a:t>Tirer 2 cartes pour le joueur</a:t>
             </a:r>
             <a:endParaRPr lang="fr-FR" sz="1200" dirty="0"/>
           </a:p>
@@ -3683,14 +3785,14 @@
       </p:sp>
       <p:sp>
         <p:nvSpPr>
-          <p:cNvPr id="9" name="ZoneTexte 8"/>
+          <p:cNvPr id="12" name="ZoneTexte 11"/>
           <p:cNvSpPr txBox="1"/>
           <p:nvPr/>
         </p:nvSpPr>
         <p:spPr>
           <a:xfrm>
-            <a:off x="3491880" y="3146484"/>
-            <a:ext cx="2160240" cy="461665"/>
+            <a:off x="1600037" y="2042945"/>
+            <a:ext cx="1364217" cy="461665"/>
           </a:xfrm>
           <a:prstGeom prst="rect">
             <a:avLst/>
@@ -3710,15 +3812,16 @@
           <a:p>
             <a:pPr algn="ctr"/>
             <a:r>
+              <a:rPr lang="fr-FR" sz="1200" dirty="0"/>
+              <a:t>Tire une </a:t>
+            </a:r>
+            <a:r>
+              <a:rPr lang="fr-FR" sz="1200" dirty="0"/>
+              <a:t>carte pour le </a:t>
+            </a:r>
+            <a:r>
               <a:rPr lang="fr-FR" sz="1200" dirty="0" smtClean="0"/>
-              <a:t>Comptage des cartes</a:t>
-            </a:r>
-          </a:p>
-          <a:p>
-            <a:pPr algn="ctr"/>
-            <a:r>
-              <a:rPr lang="fr-FR" sz="1200" dirty="0" smtClean="0"/>
-              <a:t>+1 ou -1</a:t>
+              <a:t>croupier</a:t>
             </a:r>
             <a:endParaRPr lang="fr-FR" sz="1200" dirty="0"/>
           </a:p>
@@ -3726,14 +3829,14 @@
       </p:sp>
       <p:sp>
         <p:nvSpPr>
-          <p:cNvPr id="10" name="ZoneTexte 9"/>
+          <p:cNvPr id="13" name="ZoneTexte 12"/>
           <p:cNvSpPr txBox="1"/>
           <p:nvPr/>
         </p:nvSpPr>
         <p:spPr>
           <a:xfrm>
-            <a:off x="3635896" y="4379912"/>
-            <a:ext cx="1872208" cy="461665"/>
+            <a:off x="1742085" y="1378202"/>
+            <a:ext cx="1080120" cy="276999"/>
           </a:xfrm>
           <a:prstGeom prst="rect">
             <a:avLst/>
@@ -3751,27 +3854,173 @@
           </a:bodyPr>
           <a:lstStyle/>
           <a:p>
+            <a:pPr algn="ctr">
+              <a:tabLst>
+                <a:tab pos="623888" algn="l"/>
+              </a:tabLst>
+            </a:pPr>
+            <a:r>
+              <a:rPr lang="fr-FR" sz="1200" dirty="0" smtClean="0"/>
+              <a:t>Deck</a:t>
+            </a:r>
+            <a:endParaRPr lang="fr-FR" sz="1200" dirty="0"/>
+          </a:p>
+        </p:txBody>
+      </p:sp>
+      <p:sp>
+        <p:nvSpPr>
+          <p:cNvPr id="105" name="Rectangle à coins arrondis 104"/>
+          <p:cNvSpPr/>
+          <p:nvPr/>
+        </p:nvSpPr>
+        <p:spPr>
+          <a:xfrm>
+            <a:off x="1436145" y="298082"/>
+            <a:ext cx="1692000" cy="396000"/>
+          </a:xfrm>
+          <a:prstGeom prst="roundRect">
+            <a:avLst/>
+          </a:prstGeom>
+          <a:ln/>
+        </p:spPr>
+        <p:style>
+          <a:lnRef idx="2">
+            <a:schemeClr val="dk1"/>
+          </a:lnRef>
+          <a:fillRef idx="1">
+            <a:schemeClr val="lt1"/>
+          </a:fillRef>
+          <a:effectRef idx="0">
+            <a:schemeClr val="dk1"/>
+          </a:effectRef>
+          <a:fontRef idx="minor">
+            <a:schemeClr val="dk1"/>
+          </a:fontRef>
+        </p:style>
+        <p:txBody>
+          <a:bodyPr rtlCol="0" anchor="ctr"/>
+          <a:lstStyle/>
+          <a:p>
             <a:pPr algn="ctr"/>
             <a:r>
-              <a:rPr lang="fr-FR" sz="1200" dirty="0" smtClean="0"/>
-              <a:t>Victoire de X ou Y ou égalité</a:t>
-            </a:r>
-            <a:endParaRPr lang="fr-FR" sz="1200" dirty="0"/>
-          </a:p>
-        </p:txBody>
-      </p:sp>
-      <p:sp>
-        <p:nvSpPr>
-          <p:cNvPr id="11" name="ZoneTexte 10"/>
+              <a:rPr lang="fr-FR" sz="1200" dirty="0">
+                <a:solidFill>
+                  <a:schemeClr val="tx1"/>
+                </a:solidFill>
+              </a:rPr>
+              <a:t>Début</a:t>
+            </a:r>
+          </a:p>
+        </p:txBody>
+      </p:sp>
+      <p:sp>
+        <p:nvSpPr>
+          <p:cNvPr id="106" name="Rectangle à coins arrondis 105"/>
+          <p:cNvSpPr/>
+          <p:nvPr/>
+        </p:nvSpPr>
+        <p:spPr>
+          <a:xfrm>
+            <a:off x="6156176" y="6093296"/>
+            <a:ext cx="1692000" cy="396000"/>
+          </a:xfrm>
+          <a:prstGeom prst="roundRect">
+            <a:avLst/>
+          </a:prstGeom>
+          <a:ln/>
+        </p:spPr>
+        <p:style>
+          <a:lnRef idx="2">
+            <a:schemeClr val="dk1"/>
+          </a:lnRef>
+          <a:fillRef idx="1">
+            <a:schemeClr val="lt1"/>
+          </a:fillRef>
+          <a:effectRef idx="0">
+            <a:schemeClr val="dk1"/>
+          </a:effectRef>
+          <a:fontRef idx="minor">
+            <a:schemeClr val="dk1"/>
+          </a:fontRef>
+        </p:style>
+        <p:txBody>
+          <a:bodyPr rtlCol="0" anchor="ctr"/>
+          <a:lstStyle/>
+          <a:p>
+            <a:pPr algn="ctr"/>
+            <a:r>
+              <a:rPr lang="fr-FR" sz="1200" dirty="0" smtClean="0">
+                <a:solidFill>
+                  <a:schemeClr val="tx1"/>
+                </a:solidFill>
+              </a:rPr>
+              <a:t>Fin</a:t>
+            </a:r>
+            <a:endParaRPr lang="fr-FR" sz="1200" dirty="0">
+              <a:solidFill>
+                <a:schemeClr val="tx1"/>
+              </a:solidFill>
+            </a:endParaRPr>
+          </a:p>
+        </p:txBody>
+      </p:sp>
+      <p:sp>
+        <p:nvSpPr>
+          <p:cNvPr id="166" name="ZoneTexte 165"/>
           <p:cNvSpPr txBox="1"/>
           <p:nvPr/>
         </p:nvSpPr>
         <p:spPr>
           <a:xfrm>
-            <a:off x="7524328" y="1778332"/>
-            <a:ext cx="1080120" cy="276999"/>
+            <a:off x="3216470" y="3498624"/>
+            <a:ext cx="1080120" cy="261610"/>
           </a:xfrm>
           <a:prstGeom prst="rect">
+            <a:avLst/>
+          </a:prstGeom>
+          <a:noFill/>
+        </p:spPr>
+        <p:txBody>
+          <a:bodyPr wrap="square" rtlCol="0">
+            <a:spAutoFit/>
+          </a:bodyPr>
+          <a:lstStyle/>
+          <a:p>
+            <a:pPr algn="ctr"/>
+            <a:r>
+              <a:rPr lang="fr-FR" sz="1050" dirty="0" smtClean="0">
+                <a:solidFill>
+                  <a:schemeClr val="accent1">
+                    <a:lumMod val="60000"/>
+                    <a:lumOff val="40000"/>
+                  </a:schemeClr>
+                </a:solidFill>
+              </a:rPr>
+              <a:t>rester</a:t>
+            </a:r>
+            <a:endParaRPr lang="fr-FR" sz="1050" dirty="0">
+              <a:solidFill>
+                <a:schemeClr val="accent1">
+                  <a:lumMod val="60000"/>
+                  <a:lumOff val="40000"/>
+                </a:schemeClr>
+              </a:solidFill>
+            </a:endParaRPr>
+          </a:p>
+        </p:txBody>
+      </p:sp>
+      <p:sp>
+        <p:nvSpPr>
+          <p:cNvPr id="67" name="Losange 66"/>
+          <p:cNvSpPr/>
+          <p:nvPr/>
+        </p:nvSpPr>
+        <p:spPr>
+          <a:xfrm>
+            <a:off x="6144748" y="4922296"/>
+            <a:ext cx="1728192" cy="794802"/>
+          </a:xfrm>
+          <a:prstGeom prst="diamond">
             <a:avLst/>
           </a:prstGeom>
           <a:noFill/>
@@ -3789,33 +4038,31 @@
           <a:p>
             <a:pPr algn="ctr"/>
             <a:r>
-              <a:rPr lang="fr-FR" sz="1200" dirty="0" smtClean="0"/>
-              <a:t>Joueur</a:t>
-            </a:r>
-            <a:endParaRPr lang="fr-FR" sz="1200" dirty="0"/>
-          </a:p>
-        </p:txBody>
-      </p:sp>
-      <p:sp>
-        <p:nvSpPr>
-          <p:cNvPr id="12" name="ZoneTexte 11"/>
+              <a:rPr lang="fr-FR" sz="1000" dirty="0" smtClean="0">
+                <a:solidFill>
+                  <a:schemeClr val="tx1"/>
+                </a:solidFill>
+              </a:rPr>
+              <a:t>Quitter / rejouer ?</a:t>
+            </a:r>
+          </a:p>
+        </p:txBody>
+      </p:sp>
+      <p:sp>
+        <p:nvSpPr>
+          <p:cNvPr id="86" name="ZoneTexte 85"/>
           <p:cNvSpPr txBox="1"/>
           <p:nvPr/>
         </p:nvSpPr>
         <p:spPr>
           <a:xfrm>
-            <a:off x="467544" y="1778332"/>
-            <a:ext cx="1080120" cy="276999"/>
+            <a:off x="6870713" y="5758604"/>
+            <a:ext cx="1080120" cy="261610"/>
           </a:xfrm>
           <a:prstGeom prst="rect">
             <a:avLst/>
           </a:prstGeom>
           <a:noFill/>
-          <a:ln>
-            <a:solidFill>
-              <a:schemeClr val="tx1"/>
-            </a:solidFill>
-          </a:ln>
         </p:spPr>
         <p:txBody>
           <a:bodyPr wrap="square" rtlCol="0">
@@ -3825,72 +4072,97 @@
           <a:p>
             <a:pPr algn="ctr"/>
             <a:r>
-              <a:rPr lang="fr-FR" sz="1200" dirty="0" smtClean="0"/>
-              <a:t>Croupier</a:t>
-            </a:r>
-            <a:endParaRPr lang="fr-FR" sz="1200" dirty="0"/>
-          </a:p>
-        </p:txBody>
-      </p:sp>
-      <p:sp>
-        <p:nvSpPr>
-          <p:cNvPr id="13" name="ZoneTexte 12"/>
-          <p:cNvSpPr txBox="1"/>
+              <a:rPr lang="fr-FR" sz="1050" dirty="0" smtClean="0">
+                <a:solidFill>
+                  <a:schemeClr val="accent1">
+                    <a:lumMod val="60000"/>
+                    <a:lumOff val="40000"/>
+                  </a:schemeClr>
+                </a:solidFill>
+              </a:rPr>
+              <a:t>Quitter</a:t>
+            </a:r>
+            <a:endParaRPr lang="fr-FR" sz="1050" dirty="0">
+              <a:solidFill>
+                <a:schemeClr val="accent1">
+                  <a:lumMod val="60000"/>
+                  <a:lumOff val="40000"/>
+                </a:schemeClr>
+              </a:solidFill>
+            </a:endParaRPr>
+          </a:p>
+        </p:txBody>
+      </p:sp>
+      <p:sp>
+        <p:nvSpPr>
+          <p:cNvPr id="91" name="Rectangle à coins arrondis 90"/>
+          <p:cNvSpPr/>
           <p:nvPr/>
         </p:nvSpPr>
         <p:spPr>
           <a:xfrm>
-            <a:off x="3995936" y="1283568"/>
-            <a:ext cx="1080120" cy="276999"/>
-          </a:xfrm>
-          <a:prstGeom prst="rect">
+            <a:off x="1436145" y="802138"/>
+            <a:ext cx="1692000" cy="396000"/>
+          </a:xfrm>
+          <a:prstGeom prst="roundRect">
             <a:avLst/>
           </a:prstGeom>
-          <a:noFill/>
-          <a:ln>
-            <a:solidFill>
-              <a:schemeClr val="tx1"/>
-            </a:solidFill>
-          </a:ln>
-        </p:spPr>
-        <p:txBody>
-          <a:bodyPr wrap="square" rtlCol="0">
-            <a:spAutoFit/>
-          </a:bodyPr>
-          <a:lstStyle/>
-          <a:p>
-            <a:pPr algn="ctr">
-              <a:tabLst>
-                <a:tab pos="623888" algn="l"/>
-              </a:tabLst>
-            </a:pPr>
-            <a:r>
-              <a:rPr lang="fr-FR" sz="1200" dirty="0" smtClean="0"/>
-              <a:t>Deck</a:t>
-            </a:r>
-            <a:endParaRPr lang="fr-FR" sz="1200" dirty="0"/>
+          <a:ln/>
+        </p:spPr>
+        <p:style>
+          <a:lnRef idx="2">
+            <a:schemeClr val="dk1"/>
+          </a:lnRef>
+          <a:fillRef idx="1">
+            <a:schemeClr val="lt1"/>
+          </a:fillRef>
+          <a:effectRef idx="0">
+            <a:schemeClr val="dk1"/>
+          </a:effectRef>
+          <a:fontRef idx="minor">
+            <a:schemeClr val="dk1"/>
+          </a:fontRef>
+        </p:style>
+        <p:txBody>
+          <a:bodyPr rtlCol="0" anchor="ctr"/>
+          <a:lstStyle/>
+          <a:p>
+            <a:pPr algn="ctr"/>
+            <a:r>
+              <a:rPr lang="fr-FR" sz="1200" dirty="0" smtClean="0">
+                <a:solidFill>
+                  <a:schemeClr val="tx1"/>
+                </a:solidFill>
+              </a:rPr>
+              <a:t>Initialiser les données</a:t>
+            </a:r>
+            <a:endParaRPr lang="fr-FR" sz="1200" dirty="0">
+              <a:solidFill>
+                <a:schemeClr val="tx1"/>
+              </a:solidFill>
+            </a:endParaRPr>
           </a:p>
         </p:txBody>
       </p:sp>
       <p:cxnSp>
         <p:nvCxnSpPr>
-          <p:cNvPr id="15" name="Forme 14"/>
+          <p:cNvPr id="30" name="Straight Arrow Connector 29"/>
           <p:cNvCxnSpPr>
-            <a:stCxn id="12" idx="0"/>
-            <a:endCxn id="13" idx="1"/>
+            <a:stCxn id="91" idx="2"/>
+            <a:endCxn id="13" idx="0"/>
           </p:cNvCxnSpPr>
           <p:nvPr/>
         </p:nvCxnSpPr>
         <p:spPr>
-          <a:xfrm rot="5400000" flipH="1" flipV="1">
-            <a:off x="2323638" y="106034"/>
-            <a:ext cx="356264" cy="2988332"/>
-          </a:xfrm>
-          <a:prstGeom prst="bentConnector2">
+          <a:xfrm>
+            <a:off x="2282145" y="1198138"/>
+            <a:ext cx="0" cy="180064"/>
+          </a:xfrm>
+          <a:prstGeom prst="straightConnector1">
             <a:avLst/>
           </a:prstGeom>
           <a:ln>
-            <a:tailEnd type="arrow"/>
+            <a:tailEnd type="triangle"/>
           </a:ln>
         </p:spPr>
         <p:style>
@@ -3910,23 +4182,23 @@
       </p:cxnSp>
       <p:cxnSp>
         <p:nvCxnSpPr>
-          <p:cNvPr id="17" name="Connecteur en angle 16"/>
+          <p:cNvPr id="42" name="Straight Arrow Connector 41"/>
           <p:cNvCxnSpPr>
-            <a:stCxn id="11" idx="0"/>
-            <a:endCxn id="13" idx="3"/>
+            <a:stCxn id="13" idx="2"/>
+            <a:endCxn id="12" idx="0"/>
           </p:cNvCxnSpPr>
           <p:nvPr/>
         </p:nvCxnSpPr>
         <p:spPr>
-          <a:xfrm rot="16200000" flipV="1">
-            <a:off x="6392090" y="106034"/>
-            <a:ext cx="356264" cy="2988332"/>
-          </a:xfrm>
-          <a:prstGeom prst="bentConnector2">
+          <a:xfrm>
+            <a:off x="2282145" y="1655201"/>
+            <a:ext cx="1" cy="387744"/>
+          </a:xfrm>
+          <a:prstGeom prst="straightConnector1">
             <a:avLst/>
           </a:prstGeom>
           <a:ln>
-            <a:tailEnd type="arrow"/>
+            <a:tailEnd type="triangle"/>
           </a:ln>
         </p:spPr>
         <p:style>
@@ -3946,23 +4218,23 @@
       </p:cxnSp>
       <p:cxnSp>
         <p:nvCxnSpPr>
-          <p:cNvPr id="29" name="Connecteur droit avec flèche 28"/>
+          <p:cNvPr id="55" name="Straight Arrow Connector 54"/>
           <p:cNvCxnSpPr>
-            <a:stCxn id="11" idx="1"/>
-            <a:endCxn id="5" idx="3"/>
+            <a:stCxn id="12" idx="2"/>
+            <a:endCxn id="11" idx="0"/>
           </p:cNvCxnSpPr>
           <p:nvPr/>
         </p:nvCxnSpPr>
         <p:spPr>
           <a:xfrm flipH="1">
-            <a:off x="5436096" y="1916832"/>
-            <a:ext cx="2088232" cy="0"/>
+            <a:off x="2282145" y="2504610"/>
+            <a:ext cx="1" cy="272883"/>
           </a:xfrm>
           <a:prstGeom prst="straightConnector1">
             <a:avLst/>
           </a:prstGeom>
           <a:ln>
-            <a:tailEnd type="arrow"/>
+            <a:tailEnd type="triangle"/>
           </a:ln>
         </p:spPr>
         <p:style>
@@ -3982,23 +4254,23 @@
       </p:cxnSp>
       <p:cxnSp>
         <p:nvCxnSpPr>
-          <p:cNvPr id="32" name="Connecteur droit avec flèche 31"/>
+          <p:cNvPr id="61" name="Straight Arrow Connector 60"/>
           <p:cNvCxnSpPr>
-            <a:stCxn id="12" idx="3"/>
-            <a:endCxn id="5" idx="1"/>
+            <a:stCxn id="11" idx="2"/>
+            <a:endCxn id="126" idx="0"/>
           </p:cNvCxnSpPr>
           <p:nvPr/>
         </p:nvCxnSpPr>
         <p:spPr>
           <a:xfrm>
-            <a:off x="1547664" y="1916832"/>
-            <a:ext cx="2160240" cy="0"/>
+            <a:off x="2282145" y="3239158"/>
+            <a:ext cx="6341" cy="229687"/>
           </a:xfrm>
           <a:prstGeom prst="straightConnector1">
             <a:avLst/>
           </a:prstGeom>
           <a:ln>
-            <a:tailEnd type="arrow"/>
+            <a:tailEnd type="triangle"/>
           </a:ln>
         </p:spPr>
         <p:style>
@@ -4018,14 +4290,58 @@
       </p:cxnSp>
       <p:sp>
         <p:nvSpPr>
-          <p:cNvPr id="33" name="ZoneTexte 32"/>
+          <p:cNvPr id="126" name="Losange 66"/>
+          <p:cNvSpPr/>
+          <p:nvPr/>
+        </p:nvSpPr>
+        <p:spPr>
+          <a:xfrm>
+            <a:off x="1424390" y="3468845"/>
+            <a:ext cx="1728192" cy="489109"/>
+          </a:xfrm>
+          <a:prstGeom prst="diamond">
+            <a:avLst/>
+          </a:prstGeom>
+          <a:noFill/>
+          <a:ln>
+            <a:solidFill>
+              <a:schemeClr val="tx1"/>
+            </a:solidFill>
+          </a:ln>
+        </p:spPr>
+        <p:txBody>
+          <a:bodyPr wrap="square" rtlCol="0">
+            <a:spAutoFit/>
+          </a:bodyPr>
+          <a:lstStyle/>
+          <a:p>
+            <a:pPr algn="ctr"/>
+            <a:r>
+              <a:rPr lang="fr-FR" sz="1000" dirty="0" smtClean="0">
+                <a:solidFill>
+                  <a:schemeClr val="tx1"/>
+                </a:solidFill>
+              </a:rPr>
+              <a:t>Tirer / rester</a:t>
+            </a:r>
+            <a:endParaRPr lang="fr-FR" sz="1000" dirty="0" smtClean="0">
+              <a:solidFill>
+                <a:schemeClr val="tx1"/>
+              </a:solidFill>
+            </a:endParaRPr>
+          </a:p>
+        </p:txBody>
+      </p:sp>
+      <p:sp>
+        <p:nvSpPr>
+          <p:cNvPr id="133" name="ZoneTexte 4"/>
           <p:cNvSpPr txBox="1"/>
           <p:nvPr/>
         </p:nvSpPr>
         <p:spPr>
           <a:xfrm>
-            <a:off x="6876256" y="2498412"/>
-            <a:ext cx="792088" cy="276999"/>
+            <a:off x="1430628" y="4207207"/>
+            <a:ext cx="1728192" cy="276999"/>
           </a:xfrm>
           <a:prstGeom prst="rect">
             <a:avLst/>
@@ -4046,7 +4362,7 @@
             <a:pPr algn="ctr"/>
             <a:r>
               <a:rPr lang="fr-FR" sz="1200" dirty="0" smtClean="0"/>
-              <a:t>Rester</a:t>
+              <a:t>tirer</a:t>
             </a:r>
             <a:endParaRPr lang="fr-FR" sz="1200" dirty="0"/>
           </a:p>
@@ -4054,25 +4370,23 @@
       </p:sp>
       <p:cxnSp>
         <p:nvCxnSpPr>
-          <p:cNvPr id="35" name="Connecteur en angle 34"/>
+          <p:cNvPr id="134" name="Straight Arrow Connector 133"/>
           <p:cNvCxnSpPr>
-            <a:stCxn id="11" idx="2"/>
-            <a:endCxn id="6" idx="0"/>
+            <a:stCxn id="126" idx="2"/>
+            <a:endCxn id="133" idx="0"/>
           </p:cNvCxnSpPr>
           <p:nvPr/>
         </p:nvCxnSpPr>
         <p:spPr>
-          <a:xfrm rot="5400000">
-            <a:off x="7014756" y="1448779"/>
-            <a:ext cx="443081" cy="1656184"/>
-          </a:xfrm>
-          <a:prstGeom prst="bentConnector3">
-            <a:avLst>
-              <a:gd name="adj1" fmla="val 50000"/>
-            </a:avLst>
+          <a:xfrm>
+            <a:off x="2288486" y="3957954"/>
+            <a:ext cx="6238" cy="249253"/>
+          </a:xfrm>
+          <a:prstGeom prst="straightConnector1">
+            <a:avLst/>
           </a:prstGeom>
           <a:ln>
-            <a:tailEnd type="arrow"/>
+            <a:tailEnd type="triangle"/>
           </a:ln>
         </p:spPr>
         <p:style>
@@ -4092,23 +4406,103 @@
       </p:cxnSp>
       <p:cxnSp>
         <p:nvCxnSpPr>
-          <p:cNvPr id="40" name="Connecteur droit avec flèche 39"/>
+          <p:cNvPr id="137" name="Straight Arrow Connector 136"/>
           <p:cNvCxnSpPr>
-            <a:stCxn id="11" idx="2"/>
-            <a:endCxn id="8" idx="0"/>
+            <a:stCxn id="133" idx="2"/>
+            <a:endCxn id="5" idx="0"/>
           </p:cNvCxnSpPr>
           <p:nvPr/>
         </p:nvCxnSpPr>
         <p:spPr>
           <a:xfrm>
-            <a:off x="8064388" y="2055331"/>
-            <a:ext cx="144016" cy="443081"/>
+            <a:off x="2294724" y="4484206"/>
+            <a:ext cx="478" cy="263931"/>
           </a:xfrm>
           <a:prstGeom prst="straightConnector1">
             <a:avLst/>
           </a:prstGeom>
           <a:ln>
-            <a:tailEnd type="arrow"/>
+            <a:tailEnd type="triangle"/>
+          </a:ln>
+        </p:spPr>
+        <p:style>
+          <a:lnRef idx="1">
+            <a:schemeClr val="accent1"/>
+          </a:lnRef>
+          <a:fillRef idx="0">
+            <a:schemeClr val="accent1"/>
+          </a:fillRef>
+          <a:effectRef idx="0">
+            <a:schemeClr val="accent1"/>
+          </a:effectRef>
+          <a:fontRef idx="minor">
+            <a:schemeClr val="tx1"/>
+          </a:fontRef>
+        </p:style>
+      </p:cxnSp>
+      <p:sp>
+        <p:nvSpPr>
+          <p:cNvPr id="150" name="Losange 66"/>
+          <p:cNvSpPr/>
+          <p:nvPr/>
+        </p:nvSpPr>
+        <p:spPr>
+          <a:xfrm>
+            <a:off x="1431106" y="5198761"/>
+            <a:ext cx="1728192" cy="489109"/>
+          </a:xfrm>
+          <a:prstGeom prst="diamond">
+            <a:avLst/>
+          </a:prstGeom>
+          <a:noFill/>
+          <a:ln>
+            <a:solidFill>
+              <a:schemeClr val="tx1"/>
+            </a:solidFill>
+          </a:ln>
+        </p:spPr>
+        <p:txBody>
+          <a:bodyPr wrap="square" rtlCol="0">
+            <a:spAutoFit/>
+          </a:bodyPr>
+          <a:lstStyle/>
+          <a:p>
+            <a:pPr algn="ctr"/>
+            <a:r>
+              <a:rPr lang="fr-FR" sz="1000" dirty="0" smtClean="0">
+                <a:solidFill>
+                  <a:schemeClr val="tx1"/>
+                </a:solidFill>
+              </a:rPr>
+              <a:t>+ de 21 ?</a:t>
+            </a:r>
+            <a:endParaRPr lang="fr-FR" sz="1000" dirty="0" smtClean="0">
+              <a:solidFill>
+                <a:schemeClr val="tx1"/>
+              </a:solidFill>
+            </a:endParaRPr>
+          </a:p>
+        </p:txBody>
+      </p:sp>
+      <p:cxnSp>
+        <p:nvCxnSpPr>
+          <p:cNvPr id="151" name="Straight Arrow Connector 150"/>
+          <p:cNvCxnSpPr>
+            <a:stCxn id="5" idx="2"/>
+            <a:endCxn id="150" idx="0"/>
+          </p:cNvCxnSpPr>
+          <p:nvPr/>
+        </p:nvCxnSpPr>
+        <p:spPr>
+          <a:xfrm>
+            <a:off x="2295202" y="5025136"/>
+            <a:ext cx="0" cy="173625"/>
+          </a:xfrm>
+          <a:prstGeom prst="straightConnector1">
+            <a:avLst/>
+          </a:prstGeom>
+          <a:ln>
+            <a:tailEnd type="triangle"/>
           </a:ln>
         </p:spPr>
         <p:style>
@@ -4128,23 +4522,23 @@
       </p:cxnSp>
       <p:cxnSp>
         <p:nvCxnSpPr>
-          <p:cNvPr id="43" name="Forme 42"/>
+          <p:cNvPr id="153" name="Straight Arrow Connector 152"/>
           <p:cNvCxnSpPr>
-            <a:stCxn id="6" idx="1"/>
-            <a:endCxn id="5" idx="2"/>
+            <a:stCxn id="150" idx="3"/>
+            <a:endCxn id="8" idx="1"/>
           </p:cNvCxnSpPr>
           <p:nvPr/>
         </p:nvCxnSpPr>
         <p:spPr>
-          <a:xfrm rot="10800000">
-            <a:off x="4572000" y="2055332"/>
-            <a:ext cx="1512168" cy="581581"/>
-          </a:xfrm>
-          <a:prstGeom prst="bentConnector2">
+          <a:xfrm>
+            <a:off x="3159298" y="5443316"/>
+            <a:ext cx="700867" cy="4688"/>
+          </a:xfrm>
+          <a:prstGeom prst="straightConnector1">
             <a:avLst/>
           </a:prstGeom>
           <a:ln>
-            <a:tailEnd type="arrow"/>
+            <a:tailEnd type="triangle"/>
           </a:ln>
         </p:spPr>
         <p:style>
@@ -4164,14 +4558,142 @@
       </p:cxnSp>
       <p:sp>
         <p:nvSpPr>
-          <p:cNvPr id="44" name="ZoneTexte 43"/>
+          <p:cNvPr id="156" name="ZoneTexte 165"/>
           <p:cNvSpPr txBox="1"/>
           <p:nvPr/>
         </p:nvSpPr>
         <p:spPr>
           <a:xfrm>
-            <a:off x="2339752" y="2498412"/>
-            <a:ext cx="648072" cy="276999"/>
+            <a:off x="3068077" y="5222121"/>
+            <a:ext cx="648072" cy="261610"/>
+          </a:xfrm>
+          <a:prstGeom prst="rect">
+            <a:avLst/>
+          </a:prstGeom>
+          <a:noFill/>
+        </p:spPr>
+        <p:txBody>
+          <a:bodyPr wrap="square" rtlCol="0">
+            <a:spAutoFit/>
+          </a:bodyPr>
+          <a:lstStyle/>
+          <a:p>
+            <a:pPr algn="ctr"/>
+            <a:r>
+              <a:rPr lang="fr-FR" sz="1050" dirty="0" smtClean="0">
+                <a:solidFill>
+                  <a:schemeClr val="accent1">
+                    <a:lumMod val="60000"/>
+                    <a:lumOff val="40000"/>
+                  </a:schemeClr>
+                </a:solidFill>
+              </a:rPr>
+              <a:t>oui</a:t>
+            </a:r>
+            <a:endParaRPr lang="fr-FR" sz="1050" dirty="0">
+              <a:solidFill>
+                <a:schemeClr val="accent1">
+                  <a:lumMod val="60000"/>
+                  <a:lumOff val="40000"/>
+                </a:schemeClr>
+              </a:solidFill>
+            </a:endParaRPr>
+          </a:p>
+        </p:txBody>
+      </p:sp>
+      <p:cxnSp>
+        <p:nvCxnSpPr>
+          <p:cNvPr id="158" name="Elbow Connector 157"/>
+          <p:cNvCxnSpPr>
+            <a:stCxn id="150" idx="1"/>
+            <a:endCxn id="126" idx="1"/>
+          </p:cNvCxnSpPr>
+          <p:nvPr/>
+        </p:nvCxnSpPr>
+        <p:spPr>
+          <a:xfrm rot="10800000">
+            <a:off x="1424390" y="3713400"/>
+            <a:ext cx="6716" cy="1729916"/>
+          </a:xfrm>
+          <a:prstGeom prst="bentConnector3">
+            <a:avLst>
+              <a:gd name="adj1" fmla="val 3503812"/>
+            </a:avLst>
+          </a:prstGeom>
+          <a:ln>
+            <a:tailEnd type="triangle"/>
+          </a:ln>
+        </p:spPr>
+        <p:style>
+          <a:lnRef idx="1">
+            <a:schemeClr val="accent1"/>
+          </a:lnRef>
+          <a:fillRef idx="0">
+            <a:schemeClr val="accent1"/>
+          </a:fillRef>
+          <a:effectRef idx="0">
+            <a:schemeClr val="accent1"/>
+          </a:effectRef>
+          <a:fontRef idx="minor">
+            <a:schemeClr val="tx1"/>
+          </a:fontRef>
+        </p:style>
+      </p:cxnSp>
+      <p:sp>
+        <p:nvSpPr>
+          <p:cNvPr id="167" name="ZoneTexte 165"/>
+          <p:cNvSpPr txBox="1"/>
+          <p:nvPr/>
+        </p:nvSpPr>
+        <p:spPr>
+          <a:xfrm rot="16200000">
+            <a:off x="730437" y="4537989"/>
+            <a:ext cx="648072" cy="261610"/>
+          </a:xfrm>
+          <a:prstGeom prst="rect">
+            <a:avLst/>
+          </a:prstGeom>
+          <a:noFill/>
+        </p:spPr>
+        <p:txBody>
+          <a:bodyPr wrap="square" rtlCol="0">
+            <a:spAutoFit/>
+          </a:bodyPr>
+          <a:lstStyle/>
+          <a:p>
+            <a:pPr algn="ctr"/>
+            <a:r>
+              <a:rPr lang="fr-FR" sz="1050" dirty="0" smtClean="0">
+                <a:solidFill>
+                  <a:schemeClr val="accent1">
+                    <a:lumMod val="60000"/>
+                    <a:lumOff val="40000"/>
+                  </a:schemeClr>
+                </a:solidFill>
+              </a:rPr>
+              <a:t>non</a:t>
+            </a:r>
+            <a:endParaRPr lang="fr-FR" sz="1050" dirty="0">
+              <a:solidFill>
+                <a:schemeClr val="accent1">
+                  <a:lumMod val="60000"/>
+                  <a:lumOff val="40000"/>
+                </a:schemeClr>
+              </a:solidFill>
+            </a:endParaRPr>
+          </a:p>
+        </p:txBody>
+      </p:sp>
+      <p:sp>
+        <p:nvSpPr>
+          <p:cNvPr id="195" name="ZoneTexte 4"/>
+          <p:cNvSpPr txBox="1"/>
+          <p:nvPr/>
+        </p:nvSpPr>
+        <p:spPr>
+          <a:xfrm>
+            <a:off x="6156504" y="2544891"/>
+            <a:ext cx="1728192" cy="276999"/>
           </a:xfrm>
           <a:prstGeom prst="rect">
             <a:avLst/>
@@ -4192,7 +4714,7 @@
             <a:pPr algn="ctr"/>
             <a:r>
               <a:rPr lang="fr-FR" sz="1200" dirty="0" smtClean="0"/>
-              <a:t>Tirer</a:t>
+              <a:t>Calculer la main</a:t>
             </a:r>
             <a:endParaRPr lang="fr-FR" sz="1200" dirty="0"/>
           </a:p>
@@ -4200,14 +4722,14 @@
       </p:sp>
       <p:sp>
         <p:nvSpPr>
-          <p:cNvPr id="46" name="ZoneTexte 45"/>
+          <p:cNvPr id="201" name="ZoneTexte 4"/>
           <p:cNvSpPr txBox="1"/>
           <p:nvPr/>
         </p:nvSpPr>
         <p:spPr>
           <a:xfrm>
-            <a:off x="1403648" y="2498412"/>
-            <a:ext cx="792088" cy="276999"/>
+            <a:off x="6156504" y="2016860"/>
+            <a:ext cx="1728192" cy="276999"/>
           </a:xfrm>
           <a:prstGeom prst="rect">
             <a:avLst/>
@@ -4227,25 +4749,61 @@
           <a:p>
             <a:pPr algn="ctr"/>
             <a:r>
-              <a:rPr lang="fr-FR" sz="1200" dirty="0" smtClean="0"/>
-              <a:t>Rester</a:t>
+              <a:rPr lang="fr-FR" sz="1200" dirty="0"/>
+              <a:t>Croupier tire</a:t>
             </a:r>
             <a:endParaRPr lang="fr-FR" sz="1200" dirty="0"/>
           </a:p>
         </p:txBody>
       </p:sp>
-      <p:sp>
-        <p:nvSpPr>
-          <p:cNvPr id="47" name="ZoneTexte 46"/>
-          <p:cNvSpPr txBox="1"/>
+      <p:cxnSp>
+        <p:nvCxnSpPr>
+          <p:cNvPr id="203" name="Straight Arrow Connector 202"/>
+          <p:cNvCxnSpPr>
+            <a:stCxn id="201" idx="2"/>
+            <a:endCxn id="195" idx="0"/>
+          </p:cNvCxnSpPr>
           <p:nvPr/>
-        </p:nvSpPr>
+        </p:nvCxnSpPr>
         <p:spPr>
           <a:xfrm>
-            <a:off x="467544" y="2498412"/>
-            <a:ext cx="792088" cy="276999"/>
-          </a:xfrm>
-          <a:prstGeom prst="rect">
+            <a:off x="7020600" y="2293859"/>
+            <a:ext cx="0" cy="251032"/>
+          </a:xfrm>
+          <a:prstGeom prst="straightConnector1">
+            <a:avLst/>
+          </a:prstGeom>
+          <a:ln>
+            <a:tailEnd type="triangle"/>
+          </a:ln>
+        </p:spPr>
+        <p:style>
+          <a:lnRef idx="1">
+            <a:schemeClr val="accent1"/>
+          </a:lnRef>
+          <a:fillRef idx="0">
+            <a:schemeClr val="accent1"/>
+          </a:fillRef>
+          <a:effectRef idx="0">
+            <a:schemeClr val="accent1"/>
+          </a:effectRef>
+          <a:fontRef idx="minor">
+            <a:schemeClr val="tx1"/>
+          </a:fontRef>
+        </p:style>
+      </p:cxnSp>
+      <p:sp>
+        <p:nvSpPr>
+          <p:cNvPr id="205" name="Losange 66"/>
+          <p:cNvSpPr/>
+          <p:nvPr/>
+        </p:nvSpPr>
+        <p:spPr>
+          <a:xfrm>
+            <a:off x="6156504" y="3103081"/>
+            <a:ext cx="1728192" cy="489109"/>
+          </a:xfrm>
+          <a:prstGeom prst="diamond">
             <a:avLst/>
           </a:prstGeom>
           <a:noFill/>
@@ -4263,34 +4821,123 @@
           <a:p>
             <a:pPr algn="ctr"/>
             <a:r>
-              <a:rPr lang="fr-FR" sz="1200" dirty="0" smtClean="0"/>
-              <a:t>Perdu</a:t>
-            </a:r>
-            <a:endParaRPr lang="fr-FR" sz="1200" dirty="0"/>
+              <a:rPr lang="fr-FR" sz="1000" dirty="0" smtClean="0">
+                <a:solidFill>
+                  <a:schemeClr val="tx1"/>
+                </a:solidFill>
+              </a:rPr>
+              <a:t>+ de 17?</a:t>
+            </a:r>
+            <a:endParaRPr lang="fr-FR" sz="1000" dirty="0" smtClean="0">
+              <a:solidFill>
+                <a:schemeClr val="tx1"/>
+              </a:solidFill>
+            </a:endParaRPr>
           </a:p>
         </p:txBody>
       </p:sp>
       <p:cxnSp>
         <p:nvCxnSpPr>
-          <p:cNvPr id="64" name="Connecteur en angle 63"/>
+          <p:cNvPr id="206" name="Straight Arrow Connector 205"/>
           <p:cNvCxnSpPr>
-            <a:stCxn id="12" idx="2"/>
-            <a:endCxn id="44" idx="0"/>
+            <a:stCxn id="195" idx="2"/>
+            <a:endCxn id="205" idx="0"/>
           </p:cNvCxnSpPr>
           <p:nvPr/>
         </p:nvCxnSpPr>
         <p:spPr>
-          <a:xfrm rot="16200000" flipH="1">
-            <a:off x="1614156" y="1448779"/>
-            <a:ext cx="443081" cy="1656184"/>
+          <a:xfrm>
+            <a:off x="7020600" y="2821890"/>
+            <a:ext cx="0" cy="281191"/>
+          </a:xfrm>
+          <a:prstGeom prst="straightConnector1">
+            <a:avLst/>
+          </a:prstGeom>
+          <a:ln>
+            <a:tailEnd type="triangle"/>
+          </a:ln>
+        </p:spPr>
+        <p:style>
+          <a:lnRef idx="1">
+            <a:schemeClr val="accent1"/>
+          </a:lnRef>
+          <a:fillRef idx="0">
+            <a:schemeClr val="accent1"/>
+          </a:fillRef>
+          <a:effectRef idx="0">
+            <a:schemeClr val="accent1"/>
+          </a:effectRef>
+          <a:fontRef idx="minor">
+            <a:schemeClr val="tx1"/>
+          </a:fontRef>
+        </p:style>
+      </p:cxnSp>
+      <p:sp>
+        <p:nvSpPr>
+          <p:cNvPr id="208" name="ZoneTexte 165"/>
+          <p:cNvSpPr txBox="1"/>
+          <p:nvPr/>
+        </p:nvSpPr>
+        <p:spPr>
+          <a:xfrm rot="16200000">
+            <a:off x="5427255" y="2693853"/>
+            <a:ext cx="648072" cy="261610"/>
+          </a:xfrm>
+          <a:prstGeom prst="rect">
+            <a:avLst/>
+          </a:prstGeom>
+          <a:noFill/>
+        </p:spPr>
+        <p:txBody>
+          <a:bodyPr wrap="square" rtlCol="0">
+            <a:spAutoFit/>
+          </a:bodyPr>
+          <a:lstStyle/>
+          <a:p>
+            <a:pPr algn="ctr"/>
+            <a:r>
+              <a:rPr lang="fr-FR" sz="1050" dirty="0" smtClean="0">
+                <a:solidFill>
+                  <a:schemeClr val="accent1">
+                    <a:lumMod val="60000"/>
+                    <a:lumOff val="40000"/>
+                  </a:schemeClr>
+                </a:solidFill>
+              </a:rPr>
+              <a:t>oui</a:t>
+            </a:r>
+            <a:endParaRPr lang="fr-FR" sz="1050" dirty="0">
+              <a:solidFill>
+                <a:schemeClr val="accent1">
+                  <a:lumMod val="60000"/>
+                  <a:lumOff val="40000"/>
+                </a:schemeClr>
+              </a:solidFill>
+            </a:endParaRPr>
+          </a:p>
+        </p:txBody>
+      </p:sp>
+      <p:cxnSp>
+        <p:nvCxnSpPr>
+          <p:cNvPr id="209" name="Elbow Connector 208"/>
+          <p:cNvCxnSpPr>
+            <a:stCxn id="205" idx="1"/>
+            <a:endCxn id="201" idx="1"/>
+          </p:cNvCxnSpPr>
+          <p:nvPr/>
+        </p:nvCxnSpPr>
+        <p:spPr>
+          <a:xfrm rot="10800000">
+            <a:off x="6156504" y="2155360"/>
+            <a:ext cx="12700" cy="1192276"/>
           </a:xfrm>
           <a:prstGeom prst="bentConnector3">
             <a:avLst>
-              <a:gd name="adj1" fmla="val 50000"/>
+              <a:gd name="adj1" fmla="val 1800000"/>
             </a:avLst>
           </a:prstGeom>
           <a:ln>
-            <a:tailEnd type="arrow"/>
+            <a:tailEnd type="triangle"/>
           </a:ln>
         </p:spPr>
         <p:style>
@@ -4310,23 +4957,26 @@
       </p:cxnSp>
       <p:cxnSp>
         <p:nvCxnSpPr>
-          <p:cNvPr id="70" name="Connecteur droit avec flèche 69"/>
+          <p:cNvPr id="213" name="Elbow Connector 212"/>
           <p:cNvCxnSpPr>
-            <a:stCxn id="12" idx="2"/>
-            <a:endCxn id="47" idx="0"/>
+            <a:stCxn id="126" idx="3"/>
+            <a:endCxn id="201" idx="0"/>
           </p:cNvCxnSpPr>
           <p:nvPr/>
         </p:nvCxnSpPr>
         <p:spPr>
-          <a:xfrm flipH="1">
-            <a:off x="863588" y="2055331"/>
-            <a:ext cx="144016" cy="443081"/>
-          </a:xfrm>
-          <a:prstGeom prst="straightConnector1">
-            <a:avLst/>
+          <a:xfrm flipV="1">
+            <a:off x="3152582" y="2016860"/>
+            <a:ext cx="3868018" cy="1696540"/>
+          </a:xfrm>
+          <a:prstGeom prst="bentConnector4">
+            <a:avLst>
+              <a:gd name="adj1" fmla="val 38830"/>
+              <a:gd name="adj2" fmla="val 113474"/>
+            </a:avLst>
           </a:prstGeom>
           <a:ln>
-            <a:tailEnd type="arrow"/>
+            <a:tailEnd type="triangle"/>
           </a:ln>
         </p:spPr>
         <p:style>
@@ -4346,21 +4996,27 @@
       </p:cxnSp>
       <p:cxnSp>
         <p:nvCxnSpPr>
-          <p:cNvPr id="74" name="Connecteur droit 73"/>
+          <p:cNvPr id="216" name="Elbow Connector 215"/>
           <p:cNvCxnSpPr>
-            <a:stCxn id="44" idx="3"/>
-            <a:endCxn id="6" idx="1"/>
+            <a:stCxn id="8" idx="3"/>
+            <a:endCxn id="201" idx="0"/>
           </p:cNvCxnSpPr>
           <p:nvPr/>
         </p:nvCxnSpPr>
         <p:spPr>
-          <a:xfrm>
-            <a:off x="2987824" y="2636912"/>
-            <a:ext cx="3096344" cy="0"/>
-          </a:xfrm>
-          <a:prstGeom prst="line">
-            <a:avLst/>
+          <a:xfrm flipV="1">
+            <a:off x="4652253" y="2016860"/>
+            <a:ext cx="2368347" cy="3431144"/>
+          </a:xfrm>
+          <a:prstGeom prst="bentConnector4">
+            <a:avLst>
+              <a:gd name="adj1" fmla="val 31757"/>
+              <a:gd name="adj2" fmla="val 106663"/>
+            </a:avLst>
           </a:prstGeom>
+          <a:ln>
+            <a:tailEnd type="triangle"/>
+          </a:ln>
         </p:spPr>
         <p:style>
           <a:lnRef idx="1">
@@ -4379,23 +5035,23 @@
       </p:cxnSp>
       <p:cxnSp>
         <p:nvCxnSpPr>
-          <p:cNvPr id="76" name="Forme 75"/>
+          <p:cNvPr id="238" name="Straight Arrow Connector 237"/>
           <p:cNvCxnSpPr>
-            <a:stCxn id="46" idx="2"/>
-            <a:endCxn id="7" idx="1"/>
+            <a:stCxn id="205" idx="2"/>
+            <a:endCxn id="7" idx="0"/>
           </p:cNvCxnSpPr>
           <p:nvPr/>
         </p:nvCxnSpPr>
         <p:spPr>
-          <a:xfrm rot="16200000" flipH="1">
-            <a:off x="2066964" y="2508139"/>
-            <a:ext cx="1229653" cy="1764196"/>
-          </a:xfrm>
-          <a:prstGeom prst="bentConnector2">
+          <a:xfrm>
+            <a:off x="7020600" y="3592190"/>
+            <a:ext cx="1" cy="382553"/>
+          </a:xfrm>
+          <a:prstGeom prst="straightConnector1">
             <a:avLst/>
           </a:prstGeom>
           <a:ln>
-            <a:tailEnd type="arrow"/>
+            <a:tailEnd type="triangle"/>
           </a:ln>
         </p:spPr>
         <p:style>
@@ -4415,23 +5071,25 @@
       </p:cxnSp>
       <p:cxnSp>
         <p:nvCxnSpPr>
-          <p:cNvPr id="78" name="Forme 77"/>
+          <p:cNvPr id="247" name="Elbow Connector 246"/>
           <p:cNvCxnSpPr>
-            <a:stCxn id="33" idx="2"/>
-            <a:endCxn id="7" idx="3"/>
+            <a:stCxn id="67" idx="3"/>
+            <a:endCxn id="13" idx="3"/>
           </p:cNvCxnSpPr>
           <p:nvPr/>
         </p:nvCxnSpPr>
         <p:spPr>
-          <a:xfrm rot="5400000">
-            <a:off x="5811380" y="2544143"/>
-            <a:ext cx="1229653" cy="1692188"/>
-          </a:xfrm>
-          <a:prstGeom prst="bentConnector2">
-            <a:avLst/>
+          <a:xfrm flipH="1" flipV="1">
+            <a:off x="2822205" y="1516702"/>
+            <a:ext cx="5050735" cy="3802995"/>
+          </a:xfrm>
+          <a:prstGeom prst="bentConnector3">
+            <a:avLst>
+              <a:gd name="adj1" fmla="val -4526"/>
+            </a:avLst>
           </a:prstGeom>
           <a:ln>
-            <a:tailEnd type="arrow"/>
+            <a:tailEnd type="triangle"/>
           </a:ln>
         </p:spPr>
         <p:style>
@@ -4451,25 +5109,23 @@
       </p:cxnSp>
       <p:cxnSp>
         <p:nvCxnSpPr>
-          <p:cNvPr id="80" name="Connecteur droit 79"/>
+          <p:cNvPr id="252" name="Straight Arrow Connector 251"/>
           <p:cNvCxnSpPr>
-            <a:stCxn id="6" idx="0"/>
-            <a:endCxn id="8" idx="0"/>
+            <a:stCxn id="67" idx="2"/>
+            <a:endCxn id="106" idx="0"/>
           </p:cNvCxnSpPr>
           <p:nvPr/>
         </p:nvCxnSpPr>
         <p:spPr>
-          <a:xfrm>
-            <a:off x="6408204" y="2498412"/>
-            <a:ext cx="1800200" cy="0"/>
-          </a:xfrm>
-          <a:prstGeom prst="line">
+          <a:xfrm flipH="1">
+            <a:off x="7002176" y="5717098"/>
+            <a:ext cx="6668" cy="376198"/>
+          </a:xfrm>
+          <a:prstGeom prst="straightConnector1">
             <a:avLst/>
           </a:prstGeom>
           <a:ln>
-            <a:solidFill>
-              <a:schemeClr val="tx1"/>
-            </a:solidFill>
+            <a:tailEnd type="triangle"/>
           </a:ln>
         </p:spPr>
         <p:style>
@@ -4489,25 +5145,23 @@
       </p:cxnSp>
       <p:cxnSp>
         <p:nvCxnSpPr>
-          <p:cNvPr id="84" name="Connecteur droit 83"/>
+          <p:cNvPr id="257" name="Straight Arrow Connector 256"/>
           <p:cNvCxnSpPr>
-            <a:stCxn id="6" idx="2"/>
-            <a:endCxn id="8" idx="2"/>
+            <a:stCxn id="7" idx="2"/>
+            <a:endCxn id="67" idx="0"/>
           </p:cNvCxnSpPr>
           <p:nvPr/>
         </p:nvCxnSpPr>
         <p:spPr>
-          <a:xfrm>
-            <a:off x="6408204" y="2775411"/>
-            <a:ext cx="1800200" cy="0"/>
-          </a:xfrm>
-          <a:prstGeom prst="line">
+          <a:xfrm flipH="1">
+            <a:off x="7008844" y="4436408"/>
+            <a:ext cx="11757" cy="485888"/>
+          </a:xfrm>
+          <a:prstGeom prst="straightConnector1">
             <a:avLst/>
           </a:prstGeom>
           <a:ln>
-            <a:solidFill>
-              <a:schemeClr val="tx1"/>
-            </a:solidFill>
+            <a:tailEnd type="triangle"/>
           </a:ln>
         </p:spPr>
         <p:style>
@@ -4525,631 +5179,16 @@
           </a:fontRef>
         </p:style>
       </p:cxnSp>
-      <p:cxnSp>
-        <p:nvCxnSpPr>
-          <p:cNvPr id="87" name="Connecteur droit 86"/>
-          <p:cNvCxnSpPr>
-            <a:stCxn id="47" idx="0"/>
-            <a:endCxn id="44" idx="0"/>
-          </p:cNvCxnSpPr>
-          <p:nvPr/>
-        </p:nvCxnSpPr>
-        <p:spPr>
-          <a:xfrm>
-            <a:off x="863588" y="2498412"/>
-            <a:ext cx="1800200" cy="0"/>
-          </a:xfrm>
-          <a:prstGeom prst="line">
-            <a:avLst/>
-          </a:prstGeom>
-          <a:ln>
-            <a:solidFill>
-              <a:schemeClr val="tx1"/>
-            </a:solidFill>
-          </a:ln>
-        </p:spPr>
-        <p:style>
-          <a:lnRef idx="1">
-            <a:schemeClr val="accent1"/>
-          </a:lnRef>
-          <a:fillRef idx="0">
-            <a:schemeClr val="accent1"/>
-          </a:fillRef>
-          <a:effectRef idx="0">
-            <a:schemeClr val="accent1"/>
-          </a:effectRef>
-          <a:fontRef idx="minor">
-            <a:schemeClr val="tx1"/>
-          </a:fontRef>
-        </p:style>
-      </p:cxnSp>
-      <p:cxnSp>
-        <p:nvCxnSpPr>
-          <p:cNvPr id="90" name="Connecteur droit 89"/>
-          <p:cNvCxnSpPr>
-            <a:stCxn id="47" idx="2"/>
-            <a:endCxn id="44" idx="2"/>
-          </p:cNvCxnSpPr>
-          <p:nvPr/>
-        </p:nvCxnSpPr>
-        <p:spPr>
-          <a:xfrm>
-            <a:off x="863588" y="2775411"/>
-            <a:ext cx="1800200" cy="0"/>
-          </a:xfrm>
-          <a:prstGeom prst="line">
-            <a:avLst/>
-          </a:prstGeom>
-          <a:ln>
-            <a:solidFill>
-              <a:schemeClr val="tx1"/>
-            </a:solidFill>
-          </a:ln>
-        </p:spPr>
-        <p:style>
-          <a:lnRef idx="1">
-            <a:schemeClr val="accent1"/>
-          </a:lnRef>
-          <a:fillRef idx="0">
-            <a:schemeClr val="accent1"/>
-          </a:fillRef>
-          <a:effectRef idx="0">
-            <a:schemeClr val="accent1"/>
-          </a:effectRef>
-          <a:fontRef idx="minor">
-            <a:schemeClr val="tx1"/>
-          </a:fontRef>
-        </p:style>
-      </p:cxnSp>
-      <p:cxnSp>
-        <p:nvCxnSpPr>
-          <p:cNvPr id="94" name="Forme 93"/>
-          <p:cNvCxnSpPr>
-            <a:stCxn id="6" idx="2"/>
-            <a:endCxn id="9" idx="3"/>
-          </p:cNvCxnSpPr>
-          <p:nvPr/>
-        </p:nvCxnSpPr>
-        <p:spPr>
-          <a:xfrm rot="5400000">
-            <a:off x="5729209" y="2698322"/>
-            <a:ext cx="601906" cy="756084"/>
-          </a:xfrm>
-          <a:prstGeom prst="bentConnector2">
-            <a:avLst/>
-          </a:prstGeom>
-          <a:ln>
-            <a:tailEnd type="arrow"/>
-          </a:ln>
-        </p:spPr>
-        <p:style>
-          <a:lnRef idx="1">
-            <a:schemeClr val="accent1"/>
-          </a:lnRef>
-          <a:fillRef idx="0">
-            <a:schemeClr val="accent1"/>
-          </a:fillRef>
-          <a:effectRef idx="0">
-            <a:schemeClr val="accent1"/>
-          </a:effectRef>
-          <a:fontRef idx="minor">
-            <a:schemeClr val="tx1"/>
-          </a:fontRef>
-        </p:style>
-      </p:cxnSp>
-      <p:cxnSp>
-        <p:nvCxnSpPr>
-          <p:cNvPr id="97" name="Forme 96"/>
-          <p:cNvCxnSpPr>
-            <a:stCxn id="44" idx="2"/>
-            <a:endCxn id="9" idx="1"/>
-          </p:cNvCxnSpPr>
-          <p:nvPr/>
-        </p:nvCxnSpPr>
-        <p:spPr>
-          <a:xfrm rot="16200000" flipH="1">
-            <a:off x="2776881" y="2662318"/>
-            <a:ext cx="601906" cy="828092"/>
-          </a:xfrm>
-          <a:prstGeom prst="bentConnector2">
-            <a:avLst/>
-          </a:prstGeom>
-          <a:ln>
-            <a:tailEnd type="arrow"/>
-          </a:ln>
-        </p:spPr>
-        <p:style>
-          <a:lnRef idx="1">
-            <a:schemeClr val="accent1"/>
-          </a:lnRef>
-          <a:fillRef idx="0">
-            <a:schemeClr val="accent1"/>
-          </a:fillRef>
-          <a:effectRef idx="0">
-            <a:schemeClr val="accent1"/>
-          </a:effectRef>
-          <a:fontRef idx="minor">
-            <a:schemeClr val="tx1"/>
-          </a:fontRef>
-        </p:style>
-      </p:cxnSp>
-      <p:cxnSp>
-        <p:nvCxnSpPr>
-          <p:cNvPr id="100" name="Connecteur droit avec flèche 99"/>
-          <p:cNvCxnSpPr>
-            <a:stCxn id="7" idx="2"/>
-            <a:endCxn id="10" idx="0"/>
-          </p:cNvCxnSpPr>
-          <p:nvPr/>
-        </p:nvCxnSpPr>
-        <p:spPr>
-          <a:xfrm>
-            <a:off x="4572000" y="4143563"/>
-            <a:ext cx="0" cy="236349"/>
-          </a:xfrm>
-          <a:prstGeom prst="straightConnector1">
-            <a:avLst/>
-          </a:prstGeom>
-          <a:ln>
-            <a:tailEnd type="arrow"/>
-          </a:ln>
-        </p:spPr>
-        <p:style>
-          <a:lnRef idx="1">
-            <a:schemeClr val="accent1"/>
-          </a:lnRef>
-          <a:fillRef idx="0">
-            <a:schemeClr val="accent1"/>
-          </a:fillRef>
-          <a:effectRef idx="0">
-            <a:schemeClr val="accent1"/>
-          </a:effectRef>
-          <a:fontRef idx="minor">
-            <a:schemeClr val="tx1"/>
-          </a:fontRef>
-        </p:style>
-      </p:cxnSp>
-      <p:cxnSp>
-        <p:nvCxnSpPr>
-          <p:cNvPr id="102" name="Forme 101"/>
-          <p:cNvCxnSpPr>
-            <a:stCxn id="8" idx="2"/>
-            <a:endCxn id="10" idx="3"/>
-          </p:cNvCxnSpPr>
-          <p:nvPr/>
-        </p:nvCxnSpPr>
-        <p:spPr>
-          <a:xfrm rot="5400000">
-            <a:off x="5940587" y="2342928"/>
-            <a:ext cx="1835334" cy="2700300"/>
-          </a:xfrm>
-          <a:prstGeom prst="bentConnector2">
-            <a:avLst/>
-          </a:prstGeom>
-          <a:ln>
-            <a:tailEnd type="arrow"/>
-          </a:ln>
-        </p:spPr>
-        <p:style>
-          <a:lnRef idx="1">
-            <a:schemeClr val="accent1"/>
-          </a:lnRef>
-          <a:fillRef idx="0">
-            <a:schemeClr val="accent1"/>
-          </a:fillRef>
-          <a:effectRef idx="0">
-            <a:schemeClr val="accent1"/>
-          </a:effectRef>
-          <a:fontRef idx="minor">
-            <a:schemeClr val="tx1"/>
-          </a:fontRef>
-        </p:style>
-      </p:cxnSp>
-      <p:cxnSp>
-        <p:nvCxnSpPr>
-          <p:cNvPr id="104" name="Forme 103"/>
-          <p:cNvCxnSpPr>
-            <a:stCxn id="47" idx="2"/>
-            <a:endCxn id="10" idx="1"/>
-          </p:cNvCxnSpPr>
-          <p:nvPr/>
-        </p:nvCxnSpPr>
-        <p:spPr>
-          <a:xfrm rot="16200000" flipH="1">
-            <a:off x="1332075" y="2306924"/>
-            <a:ext cx="1835334" cy="2772308"/>
-          </a:xfrm>
-          <a:prstGeom prst="bentConnector2">
-            <a:avLst/>
-          </a:prstGeom>
-          <a:ln>
-            <a:tailEnd type="arrow"/>
-          </a:ln>
-        </p:spPr>
-        <p:style>
-          <a:lnRef idx="1">
-            <a:schemeClr val="accent1"/>
-          </a:lnRef>
-          <a:fillRef idx="0">
-            <a:schemeClr val="accent1"/>
-          </a:fillRef>
-          <a:effectRef idx="0">
-            <a:schemeClr val="accent1"/>
-          </a:effectRef>
-          <a:fontRef idx="minor">
-            <a:schemeClr val="tx1"/>
-          </a:fontRef>
-        </p:style>
-      </p:cxnSp>
-      <p:sp>
-        <p:nvSpPr>
-          <p:cNvPr id="105" name="Rectangle à coins arrondis 104"/>
-          <p:cNvSpPr/>
-          <p:nvPr/>
-        </p:nvSpPr>
-        <p:spPr>
-          <a:xfrm>
-            <a:off x="3672088" y="116632"/>
-            <a:ext cx="1692000" cy="396000"/>
-          </a:xfrm>
-          <a:prstGeom prst="roundRect">
-            <a:avLst/>
-          </a:prstGeom>
-          <a:ln/>
-        </p:spPr>
-        <p:style>
-          <a:lnRef idx="2">
-            <a:schemeClr val="dk1"/>
-          </a:lnRef>
-          <a:fillRef idx="1">
-            <a:schemeClr val="lt1"/>
-          </a:fillRef>
-          <a:effectRef idx="0">
-            <a:schemeClr val="dk1"/>
-          </a:effectRef>
-          <a:fontRef idx="minor">
-            <a:schemeClr val="dk1"/>
-          </a:fontRef>
-        </p:style>
-        <p:txBody>
-          <a:bodyPr rtlCol="0" anchor="ctr"/>
-          <a:lstStyle/>
-          <a:p>
-            <a:pPr algn="ctr"/>
-            <a:r>
-              <a:rPr lang="fr-FR" sz="1200" dirty="0">
-                <a:solidFill>
-                  <a:schemeClr val="tx1"/>
-                </a:solidFill>
-              </a:rPr>
-              <a:t>Début</a:t>
-            </a:r>
-          </a:p>
-        </p:txBody>
-      </p:sp>
-      <p:sp>
-        <p:nvSpPr>
-          <p:cNvPr id="106" name="Rectangle à coins arrondis 105"/>
-          <p:cNvSpPr/>
-          <p:nvPr/>
-        </p:nvSpPr>
-        <p:spPr>
-          <a:xfrm>
-            <a:off x="179512" y="6108104"/>
-            <a:ext cx="1692000" cy="396000"/>
-          </a:xfrm>
-          <a:prstGeom prst="roundRect">
-            <a:avLst/>
-          </a:prstGeom>
-          <a:ln/>
-        </p:spPr>
-        <p:style>
-          <a:lnRef idx="2">
-            <a:schemeClr val="dk1"/>
-          </a:lnRef>
-          <a:fillRef idx="1">
-            <a:schemeClr val="lt1"/>
-          </a:fillRef>
-          <a:effectRef idx="0">
-            <a:schemeClr val="dk1"/>
-          </a:effectRef>
-          <a:fontRef idx="minor">
-            <a:schemeClr val="dk1"/>
-          </a:fontRef>
-        </p:style>
-        <p:txBody>
-          <a:bodyPr rtlCol="0" anchor="ctr"/>
-          <a:lstStyle/>
-          <a:p>
-            <a:pPr algn="ctr"/>
-            <a:r>
-              <a:rPr lang="fr-FR" sz="1200" dirty="0" smtClean="0">
-                <a:solidFill>
-                  <a:schemeClr val="tx1"/>
-                </a:solidFill>
-              </a:rPr>
-              <a:t>Fin</a:t>
-            </a:r>
-            <a:endParaRPr lang="fr-FR" sz="1200" dirty="0">
-              <a:solidFill>
-                <a:schemeClr val="tx1"/>
-              </a:solidFill>
-            </a:endParaRPr>
-          </a:p>
-        </p:txBody>
-      </p:sp>
-      <p:sp>
-        <p:nvSpPr>
-          <p:cNvPr id="107" name="ZoneTexte 106"/>
+      <p:sp>
+        <p:nvSpPr>
+          <p:cNvPr id="262" name="ZoneTexte 165"/>
           <p:cNvSpPr txBox="1"/>
           <p:nvPr/>
         </p:nvSpPr>
         <p:spPr>
-          <a:xfrm>
-            <a:off x="3563888" y="5099992"/>
-            <a:ext cx="2088232" cy="461665"/>
-          </a:xfrm>
-          <a:prstGeom prst="rect">
-            <a:avLst/>
-          </a:prstGeom>
-          <a:noFill/>
-          <a:ln>
-            <a:solidFill>
-              <a:schemeClr val="tx1"/>
-            </a:solidFill>
-          </a:ln>
-        </p:spPr>
-        <p:txBody>
-          <a:bodyPr wrap="square" rtlCol="0">
-            <a:spAutoFit/>
-          </a:bodyPr>
-          <a:lstStyle/>
-          <a:p>
-            <a:pPr algn="ctr"/>
-            <a:r>
-              <a:rPr lang="fr-FR" sz="1200" dirty="0" smtClean="0"/>
-              <a:t>Affichage du nombre de victoires</a:t>
-            </a:r>
-            <a:endParaRPr lang="fr-FR" sz="1200" dirty="0"/>
-          </a:p>
-        </p:txBody>
-      </p:sp>
-      <p:cxnSp>
-        <p:nvCxnSpPr>
-          <p:cNvPr id="124" name="Forme 123"/>
-          <p:cNvCxnSpPr>
-            <a:stCxn id="67" idx="1"/>
-            <a:endCxn id="106" idx="3"/>
-          </p:cNvCxnSpPr>
-          <p:nvPr/>
-        </p:nvCxnSpPr>
-        <p:spPr>
-          <a:xfrm rot="10800000" flipV="1">
-            <a:off x="1871512" y="6278612"/>
-            <a:ext cx="1836392" cy="27492"/>
-          </a:xfrm>
-          <a:prstGeom prst="bentConnector3">
-            <a:avLst>
-              <a:gd name="adj1" fmla="val 50000"/>
-            </a:avLst>
-          </a:prstGeom>
-          <a:ln>
-            <a:tailEnd type="arrow"/>
-          </a:ln>
-        </p:spPr>
-        <p:style>
-          <a:lnRef idx="1">
-            <a:schemeClr val="accent1"/>
-          </a:lnRef>
-          <a:fillRef idx="0">
-            <a:schemeClr val="accent1"/>
-          </a:fillRef>
-          <a:effectRef idx="0">
-            <a:schemeClr val="accent1"/>
-          </a:effectRef>
-          <a:fontRef idx="minor">
-            <a:schemeClr val="tx1"/>
-          </a:fontRef>
-        </p:style>
-      </p:cxnSp>
-      <p:cxnSp>
-        <p:nvCxnSpPr>
-          <p:cNvPr id="127" name="Connecteur en angle 126"/>
-          <p:cNvCxnSpPr>
-            <a:stCxn id="67" idx="3"/>
-            <a:endCxn id="11" idx="3"/>
-          </p:cNvCxnSpPr>
-          <p:nvPr/>
-        </p:nvCxnSpPr>
-        <p:spPr>
-          <a:xfrm flipV="1">
-            <a:off x="5436096" y="1916832"/>
-            <a:ext cx="3168352" cy="4361780"/>
-          </a:xfrm>
-          <a:prstGeom prst="bentConnector3">
-            <a:avLst>
-              <a:gd name="adj1" fmla="val 107215"/>
-            </a:avLst>
-          </a:prstGeom>
-          <a:ln>
-            <a:tailEnd type="arrow"/>
-          </a:ln>
-        </p:spPr>
-        <p:style>
-          <a:lnRef idx="1">
-            <a:schemeClr val="accent1"/>
-          </a:lnRef>
-          <a:fillRef idx="0">
-            <a:schemeClr val="accent1"/>
-          </a:fillRef>
-          <a:effectRef idx="0">
-            <a:schemeClr val="accent1"/>
-          </a:effectRef>
-          <a:fontRef idx="minor">
-            <a:schemeClr val="tx1"/>
-          </a:fontRef>
-        </p:style>
-      </p:cxnSp>
-      <p:sp>
-        <p:nvSpPr>
-          <p:cNvPr id="148" name="ZoneTexte 147"/>
-          <p:cNvSpPr txBox="1"/>
-          <p:nvPr/>
-        </p:nvSpPr>
-        <p:spPr>
-          <a:xfrm>
-            <a:off x="1691680" y="1139552"/>
-            <a:ext cx="1584176" cy="261610"/>
-          </a:xfrm>
-          <a:prstGeom prst="rect">
-            <a:avLst/>
-          </a:prstGeom>
-          <a:noFill/>
-        </p:spPr>
-        <p:txBody>
-          <a:bodyPr wrap="square" rtlCol="0">
-            <a:spAutoFit/>
-          </a:bodyPr>
-          <a:lstStyle/>
-          <a:p>
-            <a:pPr algn="ctr"/>
-            <a:r>
-              <a:rPr lang="fr-FR" sz="1050" dirty="0">
-                <a:solidFill>
-                  <a:schemeClr val="accent1">
-                    <a:lumMod val="60000"/>
-                    <a:lumOff val="40000"/>
-                  </a:schemeClr>
-                </a:solidFill>
-              </a:rPr>
-              <a:t>Tire une carte</a:t>
-            </a:r>
-          </a:p>
-        </p:txBody>
-      </p:sp>
-      <p:sp>
-        <p:nvSpPr>
-          <p:cNvPr id="149" name="ZoneTexte 148"/>
-          <p:cNvSpPr txBox="1"/>
-          <p:nvPr/>
-        </p:nvSpPr>
-        <p:spPr>
-          <a:xfrm>
-            <a:off x="5796136" y="1139552"/>
-            <a:ext cx="1584176" cy="261610"/>
-          </a:xfrm>
-          <a:prstGeom prst="rect">
-            <a:avLst/>
-          </a:prstGeom>
-          <a:noFill/>
-        </p:spPr>
-        <p:txBody>
-          <a:bodyPr wrap="square" rtlCol="0">
-            <a:spAutoFit/>
-          </a:bodyPr>
-          <a:lstStyle/>
-          <a:p>
-            <a:pPr algn="ctr"/>
-            <a:r>
-              <a:rPr lang="fr-FR" sz="1050" dirty="0">
-                <a:solidFill>
-                  <a:schemeClr val="accent1">
-                    <a:lumMod val="60000"/>
-                    <a:lumOff val="40000"/>
-                  </a:schemeClr>
-                </a:solidFill>
-              </a:rPr>
-              <a:t>Tire 2 cartes</a:t>
-            </a:r>
-          </a:p>
-        </p:txBody>
-      </p:sp>
-      <p:cxnSp>
-        <p:nvCxnSpPr>
-          <p:cNvPr id="155" name="Connecteur en angle 154"/>
-          <p:cNvCxnSpPr>
-            <a:stCxn id="12" idx="2"/>
-            <a:endCxn id="46" idx="0"/>
-          </p:cNvCxnSpPr>
-          <p:nvPr/>
-        </p:nvCxnSpPr>
-        <p:spPr>
-          <a:xfrm rot="16200000" flipH="1">
-            <a:off x="1182108" y="1880827"/>
-            <a:ext cx="443081" cy="792088"/>
-          </a:xfrm>
-          <a:prstGeom prst="bentConnector3">
-            <a:avLst>
-              <a:gd name="adj1" fmla="val 50000"/>
-            </a:avLst>
-          </a:prstGeom>
-          <a:ln>
-            <a:tailEnd type="arrow"/>
-          </a:ln>
-        </p:spPr>
-        <p:style>
-          <a:lnRef idx="1">
-            <a:schemeClr val="accent1"/>
-          </a:lnRef>
-          <a:fillRef idx="0">
-            <a:schemeClr val="accent1"/>
-          </a:fillRef>
-          <a:effectRef idx="0">
-            <a:schemeClr val="accent1"/>
-          </a:effectRef>
-          <a:fontRef idx="minor">
-            <a:schemeClr val="tx1"/>
-          </a:fontRef>
-        </p:style>
-      </p:cxnSp>
-      <p:cxnSp>
-        <p:nvCxnSpPr>
-          <p:cNvPr id="159" name="Connecteur en angle 158"/>
-          <p:cNvCxnSpPr>
-            <a:stCxn id="11" idx="2"/>
-            <a:endCxn id="33" idx="0"/>
-          </p:cNvCxnSpPr>
-          <p:nvPr/>
-        </p:nvCxnSpPr>
-        <p:spPr>
-          <a:xfrm rot="5400000">
-            <a:off x="7446804" y="1880827"/>
-            <a:ext cx="443081" cy="792088"/>
-          </a:xfrm>
-          <a:prstGeom prst="bentConnector3">
-            <a:avLst>
-              <a:gd name="adj1" fmla="val 50000"/>
-            </a:avLst>
-          </a:prstGeom>
-          <a:ln>
-            <a:tailEnd type="arrow"/>
-          </a:ln>
-        </p:spPr>
-        <p:style>
-          <a:lnRef idx="1">
-            <a:schemeClr val="accent1"/>
-          </a:lnRef>
-          <a:fillRef idx="0">
-            <a:schemeClr val="accent1"/>
-          </a:fillRef>
-          <a:effectRef idx="0">
-            <a:schemeClr val="accent1"/>
-          </a:effectRef>
-          <a:fontRef idx="minor">
-            <a:schemeClr val="tx1"/>
-          </a:fontRef>
-        </p:style>
-      </p:cxnSp>
-      <p:sp>
-        <p:nvSpPr>
-          <p:cNvPr id="161" name="ZoneTexte 160"/>
-          <p:cNvSpPr txBox="1"/>
-          <p:nvPr/>
-        </p:nvSpPr>
-        <p:spPr>
-          <a:xfrm>
-            <a:off x="1403648" y="2055911"/>
-            <a:ext cx="1584176" cy="261610"/>
+          <a:xfrm rot="16200000">
+            <a:off x="7982779" y="3544853"/>
+            <a:ext cx="648072" cy="261610"/>
           </a:xfrm>
           <a:prstGeom prst="rect">
             <a:avLst/>
@@ -5172,7 +5211,7 @@
                   </a:schemeClr>
                 </a:solidFill>
               </a:rPr>
-              <a:t>Tire jusqu’à 17</a:t>
+              <a:t>rejouer</a:t>
             </a:r>
             <a:endParaRPr lang="fr-FR" sz="1050" dirty="0">
               <a:solidFill>
@@ -5185,394 +5224,12 @@
           </a:p>
         </p:txBody>
       </p:sp>
-      <p:sp>
-        <p:nvSpPr>
-          <p:cNvPr id="163" name="ZoneTexte 162"/>
-          <p:cNvSpPr txBox="1"/>
-          <p:nvPr/>
-        </p:nvSpPr>
-        <p:spPr>
-          <a:xfrm>
-            <a:off x="7380312" y="4072135"/>
-            <a:ext cx="1080120" cy="261610"/>
-          </a:xfrm>
-          <a:prstGeom prst="rect">
-            <a:avLst/>
-          </a:prstGeom>
-          <a:noFill/>
-        </p:spPr>
-        <p:txBody>
-          <a:bodyPr wrap="square" rtlCol="0">
-            <a:spAutoFit/>
-          </a:bodyPr>
-          <a:lstStyle/>
-          <a:p>
-            <a:pPr algn="ctr"/>
-            <a:r>
-              <a:rPr lang="fr-FR" sz="1050" dirty="0" smtClean="0">
-                <a:solidFill>
-                  <a:schemeClr val="accent1">
-                    <a:lumMod val="60000"/>
-                    <a:lumOff val="40000"/>
-                  </a:schemeClr>
-                </a:solidFill>
-              </a:rPr>
-              <a:t>+ de 21</a:t>
-            </a:r>
-            <a:endParaRPr lang="fr-FR" sz="1050" dirty="0">
-              <a:solidFill>
-                <a:schemeClr val="accent1">
-                  <a:lumMod val="60000"/>
-                  <a:lumOff val="40000"/>
-                </a:schemeClr>
-              </a:solidFill>
-            </a:endParaRPr>
-          </a:p>
-        </p:txBody>
-      </p:sp>
-      <p:sp>
-        <p:nvSpPr>
-          <p:cNvPr id="164" name="ZoneTexte 163"/>
-          <p:cNvSpPr txBox="1"/>
-          <p:nvPr/>
-        </p:nvSpPr>
-        <p:spPr>
-          <a:xfrm>
-            <a:off x="611560" y="4072135"/>
-            <a:ext cx="1080120" cy="261610"/>
-          </a:xfrm>
-          <a:prstGeom prst="rect">
-            <a:avLst/>
-          </a:prstGeom>
-          <a:noFill/>
-        </p:spPr>
-        <p:txBody>
-          <a:bodyPr wrap="square" rtlCol="0">
-            <a:spAutoFit/>
-          </a:bodyPr>
-          <a:lstStyle/>
-          <a:p>
-            <a:pPr algn="ctr"/>
-            <a:r>
-              <a:rPr lang="fr-FR" sz="1050" dirty="0" smtClean="0">
-                <a:solidFill>
-                  <a:schemeClr val="accent1">
-                    <a:lumMod val="60000"/>
-                    <a:lumOff val="40000"/>
-                  </a:schemeClr>
-                </a:solidFill>
-              </a:rPr>
-              <a:t>+ de 21</a:t>
-            </a:r>
-            <a:endParaRPr lang="fr-FR" sz="1050" dirty="0">
-              <a:solidFill>
-                <a:schemeClr val="accent1">
-                  <a:lumMod val="60000"/>
-                  <a:lumOff val="40000"/>
-                </a:schemeClr>
-              </a:solidFill>
-            </a:endParaRPr>
-          </a:p>
-        </p:txBody>
-      </p:sp>
-      <p:sp>
-        <p:nvSpPr>
-          <p:cNvPr id="166" name="ZoneTexte 165"/>
-          <p:cNvSpPr txBox="1"/>
-          <p:nvPr/>
-        </p:nvSpPr>
-        <p:spPr>
-          <a:xfrm>
-            <a:off x="6444208" y="2003648"/>
-            <a:ext cx="1080120" cy="261610"/>
-          </a:xfrm>
-          <a:prstGeom prst="rect">
-            <a:avLst/>
-          </a:prstGeom>
-          <a:noFill/>
-        </p:spPr>
-        <p:txBody>
-          <a:bodyPr wrap="square" rtlCol="0">
-            <a:spAutoFit/>
-          </a:bodyPr>
-          <a:lstStyle/>
-          <a:p>
-            <a:pPr algn="ctr"/>
-            <a:r>
-              <a:rPr lang="fr-FR" sz="1050" dirty="0" smtClean="0">
-                <a:solidFill>
-                  <a:schemeClr val="accent1">
-                    <a:lumMod val="60000"/>
-                    <a:lumOff val="40000"/>
-                  </a:schemeClr>
-                </a:solidFill>
-              </a:rPr>
-              <a:t>Saisir</a:t>
-            </a:r>
-            <a:endParaRPr lang="fr-FR" sz="1050" dirty="0">
-              <a:solidFill>
-                <a:schemeClr val="accent1">
-                  <a:lumMod val="60000"/>
-                  <a:lumOff val="40000"/>
-                </a:schemeClr>
-              </a:solidFill>
-            </a:endParaRPr>
-          </a:p>
-        </p:txBody>
-      </p:sp>
-      <p:cxnSp>
-        <p:nvCxnSpPr>
-          <p:cNvPr id="62" name="Connecteur droit avec flèche 61"/>
-          <p:cNvCxnSpPr>
-            <a:stCxn id="10" idx="2"/>
-            <a:endCxn id="107" idx="0"/>
-          </p:cNvCxnSpPr>
-          <p:nvPr/>
-        </p:nvCxnSpPr>
-        <p:spPr>
-          <a:xfrm>
-            <a:off x="4572000" y="4841577"/>
-            <a:ext cx="36004" cy="258415"/>
-          </a:xfrm>
-          <a:prstGeom prst="straightConnector1">
-            <a:avLst/>
-          </a:prstGeom>
-          <a:ln>
-            <a:tailEnd type="arrow"/>
-          </a:ln>
-        </p:spPr>
-        <p:style>
-          <a:lnRef idx="1">
-            <a:schemeClr val="accent1"/>
-          </a:lnRef>
-          <a:fillRef idx="0">
-            <a:schemeClr val="accent1"/>
-          </a:fillRef>
-          <a:effectRef idx="0">
-            <a:schemeClr val="accent1"/>
-          </a:effectRef>
-          <a:fontRef idx="minor">
-            <a:schemeClr val="tx1"/>
-          </a:fontRef>
-        </p:style>
-      </p:cxnSp>
-      <p:sp>
-        <p:nvSpPr>
-          <p:cNvPr id="67" name="Losange 66"/>
-          <p:cNvSpPr/>
-          <p:nvPr/>
-        </p:nvSpPr>
-        <p:spPr>
-          <a:xfrm>
-            <a:off x="3707904" y="5820072"/>
-            <a:ext cx="1728192" cy="917079"/>
-          </a:xfrm>
-          <a:prstGeom prst="diamond">
-            <a:avLst/>
-          </a:prstGeom>
-          <a:noFill/>
-          <a:ln>
-            <a:solidFill>
-              <a:schemeClr val="tx1"/>
-            </a:solidFill>
-          </a:ln>
-        </p:spPr>
-        <p:txBody>
-          <a:bodyPr wrap="square" rtlCol="0">
-            <a:spAutoFit/>
-          </a:bodyPr>
-          <a:lstStyle/>
-          <a:p>
-            <a:pPr algn="ctr"/>
-            <a:r>
-              <a:rPr lang="fr-FR" sz="1200" dirty="0" smtClean="0">
-                <a:solidFill>
-                  <a:schemeClr val="tx1"/>
-                </a:solidFill>
-              </a:rPr>
-              <a:t>Quitter / rejouer ?</a:t>
-            </a:r>
-          </a:p>
-        </p:txBody>
-      </p:sp>
-      <p:cxnSp>
-        <p:nvCxnSpPr>
-          <p:cNvPr id="68" name="Connecteur droit avec flèche 67"/>
-          <p:cNvCxnSpPr>
-            <a:stCxn id="107" idx="2"/>
-            <a:endCxn id="67" idx="0"/>
-          </p:cNvCxnSpPr>
-          <p:nvPr/>
-        </p:nvCxnSpPr>
-        <p:spPr>
-          <a:xfrm flipH="1">
-            <a:off x="4572000" y="5561657"/>
-            <a:ext cx="36004" cy="258415"/>
-          </a:xfrm>
-          <a:prstGeom prst="straightConnector1">
-            <a:avLst/>
-          </a:prstGeom>
-          <a:ln>
-            <a:tailEnd type="arrow"/>
-          </a:ln>
-        </p:spPr>
-        <p:style>
-          <a:lnRef idx="1">
-            <a:schemeClr val="accent1"/>
-          </a:lnRef>
-          <a:fillRef idx="0">
-            <a:schemeClr val="accent1"/>
-          </a:fillRef>
-          <a:effectRef idx="0">
-            <a:schemeClr val="accent1"/>
-          </a:effectRef>
-          <a:fontRef idx="minor">
-            <a:schemeClr val="tx1"/>
-          </a:fontRef>
-        </p:style>
-      </p:cxnSp>
-      <p:sp>
-        <p:nvSpPr>
-          <p:cNvPr id="81" name="ZoneTexte 80"/>
-          <p:cNvSpPr txBox="1"/>
-          <p:nvPr/>
-        </p:nvSpPr>
-        <p:spPr>
-          <a:xfrm>
-            <a:off x="6084168" y="5964088"/>
-            <a:ext cx="1080120" cy="261610"/>
-          </a:xfrm>
-          <a:prstGeom prst="rect">
-            <a:avLst/>
-          </a:prstGeom>
-          <a:noFill/>
-        </p:spPr>
-        <p:txBody>
-          <a:bodyPr wrap="square" rtlCol="0">
-            <a:spAutoFit/>
-          </a:bodyPr>
-          <a:lstStyle/>
-          <a:p>
-            <a:pPr algn="ctr"/>
-            <a:r>
-              <a:rPr lang="fr-FR" sz="1050" dirty="0" smtClean="0">
-                <a:solidFill>
-                  <a:schemeClr val="accent1">
-                    <a:lumMod val="60000"/>
-                    <a:lumOff val="40000"/>
-                  </a:schemeClr>
-                </a:solidFill>
-              </a:rPr>
-              <a:t>Rejouer</a:t>
-            </a:r>
-            <a:endParaRPr lang="fr-FR" sz="1050" dirty="0">
-              <a:solidFill>
-                <a:schemeClr val="accent1">
-                  <a:lumMod val="60000"/>
-                  <a:lumOff val="40000"/>
-                </a:schemeClr>
-              </a:solidFill>
-            </a:endParaRPr>
-          </a:p>
-        </p:txBody>
-      </p:sp>
-      <p:sp>
-        <p:nvSpPr>
-          <p:cNvPr id="86" name="ZoneTexte 85"/>
-          <p:cNvSpPr txBox="1"/>
-          <p:nvPr/>
-        </p:nvSpPr>
-        <p:spPr>
-          <a:xfrm>
-            <a:off x="2339752" y="5964088"/>
-            <a:ext cx="1080120" cy="261610"/>
-          </a:xfrm>
-          <a:prstGeom prst="rect">
-            <a:avLst/>
-          </a:prstGeom>
-          <a:noFill/>
-        </p:spPr>
-        <p:txBody>
-          <a:bodyPr wrap="square" rtlCol="0">
-            <a:spAutoFit/>
-          </a:bodyPr>
-          <a:lstStyle/>
-          <a:p>
-            <a:pPr algn="ctr"/>
-            <a:r>
-              <a:rPr lang="fr-FR" sz="1050" dirty="0" smtClean="0">
-                <a:solidFill>
-                  <a:schemeClr val="accent1">
-                    <a:lumMod val="60000"/>
-                    <a:lumOff val="40000"/>
-                  </a:schemeClr>
-                </a:solidFill>
-              </a:rPr>
-              <a:t>Quitter</a:t>
-            </a:r>
-            <a:endParaRPr lang="fr-FR" sz="1050" dirty="0">
-              <a:solidFill>
-                <a:schemeClr val="accent1">
-                  <a:lumMod val="60000"/>
-                  <a:lumOff val="40000"/>
-                </a:schemeClr>
-              </a:solidFill>
-            </a:endParaRPr>
-          </a:p>
-        </p:txBody>
-      </p:sp>
-      <p:sp>
-        <p:nvSpPr>
-          <p:cNvPr id="91" name="Rectangle à coins arrondis 90"/>
-          <p:cNvSpPr/>
-          <p:nvPr/>
-        </p:nvSpPr>
-        <p:spPr>
-          <a:xfrm>
-            <a:off x="3672088" y="620688"/>
-            <a:ext cx="1692000" cy="396000"/>
-          </a:xfrm>
-          <a:prstGeom prst="roundRect">
-            <a:avLst/>
-          </a:prstGeom>
-          <a:ln/>
-        </p:spPr>
-        <p:style>
-          <a:lnRef idx="2">
-            <a:schemeClr val="dk1"/>
-          </a:lnRef>
-          <a:fillRef idx="1">
-            <a:schemeClr val="lt1"/>
-          </a:fillRef>
-          <a:effectRef idx="0">
-            <a:schemeClr val="dk1"/>
-          </a:effectRef>
-          <a:fontRef idx="minor">
-            <a:schemeClr val="dk1"/>
-          </a:fontRef>
-        </p:style>
-        <p:txBody>
-          <a:bodyPr rtlCol="0" anchor="ctr"/>
-          <a:lstStyle/>
-          <a:p>
-            <a:pPr algn="ctr"/>
-            <a:r>
-              <a:rPr lang="fr-FR" sz="1200" dirty="0" smtClean="0">
-                <a:solidFill>
-                  <a:schemeClr val="tx1"/>
-                </a:solidFill>
-              </a:rPr>
-              <a:t>Initialiser les données</a:t>
-            </a:r>
-            <a:endParaRPr lang="fr-FR" sz="1200" dirty="0">
-              <a:solidFill>
-                <a:schemeClr val="tx1"/>
-              </a:solidFill>
-            </a:endParaRPr>
-          </a:p>
-        </p:txBody>
-      </p:sp>
     </p:spTree>
+    <p:extLst>
+      <p:ext uri="{BB962C8B-B14F-4D97-AF65-F5344CB8AC3E}">
+        <p14:creationId xmlns:p14="http://schemas.microsoft.com/office/powerpoint/2010/main" val="898925216"/>
+      </p:ext>
+    </p:extLst>
   </p:cSld>
   <p:clrMapOvr>
     <a:masterClrMapping/>

</xml_diff>

<commit_message>
affichage d'une carte sur un canvas revision du ppt qui montre l'enchainement des etapes comptage de la valeur d'une main boucle principale
</commit_message>
<xml_diff>
--- a/Plan du code.pptx
+++ b/Plan du code.pptx
@@ -8,7 +8,7 @@
     <p:notesMasterId r:id="rId3"/>
   </p:notesMasterIdLst>
   <p:sldIdLst>
-    <p:sldId id="257" r:id="rId2"/>
+    <p:sldId id="258" r:id="rId2"/>
   </p:sldIdLst>
   <p:sldSz cx="9144000" cy="6858000" type="screen4x3"/>
   <p:notesSz cx="6858000" cy="9144000"/>
@@ -107,6 +107,22 @@
       </a:defRPr>
     </a:lvl9pPr>
   </p:defaultTextStyle>
+  <p:extLst>
+    <p:ext uri="{EFAFB233-063F-42B5-8137-9DF3F51BA10A}">
+      <p15:sldGuideLst xmlns:p15="http://schemas.microsoft.com/office/powerpoint/2012/main">
+        <p15:guide id="1" orient="horz" pos="2160">
+          <p15:clr>
+            <a:srgbClr val="A4A3A4"/>
+          </p15:clr>
+        </p15:guide>
+        <p15:guide id="2" pos="2880">
+          <p15:clr>
+            <a:srgbClr val="A4A3A4"/>
+          </p15:clr>
+        </p15:guide>
+      </p15:sldGuideLst>
+    </p:ext>
+  </p:extLst>
 </p:presentation>
 </file>
 
@@ -193,7 +209,7 @@
             <a:fld id="{DDC8463C-3E3A-418A-A60E-8E63D1408739}" type="datetimeFigureOut">
               <a:rPr lang="fr-FR" smtClean="0"/>
               <a:pPr/>
-              <a:t>08/02/2016</a:t>
+              <a:t>02/03/2016</a:t>
             </a:fld>
             <a:endParaRPr lang="fr-FR"/>
           </a:p>
@@ -355,13 +371,18 @@
             <a:fld id="{18542CE6-5613-49DF-9696-56BD62AA6F54}" type="slidenum">
               <a:rPr lang="fr-FR" smtClean="0"/>
               <a:pPr/>
-              <a:t>‹N°›</a:t>
+              <a:t>‹#›</a:t>
             </a:fld>
             <a:endParaRPr lang="fr-FR"/>
           </a:p>
         </p:txBody>
       </p:sp>
     </p:spTree>
+    <p:extLst>
+      <p:ext uri="{BB962C8B-B14F-4D97-AF65-F5344CB8AC3E}">
+        <p14:creationId xmlns:p14="http://schemas.microsoft.com/office/powerpoint/2010/main" val="4209985601"/>
+      </p:ext>
+    </p:extLst>
   </p:cSld>
   <p:clrMap bg1="lt1" tx1="dk1" bg2="lt2" tx2="dk2" accent1="accent1" accent2="accent2" accent3="accent3" accent4="accent4" accent5="accent5" accent6="accent6" hlink="hlink" folHlink="folHlink"/>
   <p:notesStyle>
@@ -506,21 +527,74 @@
           <a:lstStyle/>
           <a:p>
             <a:r>
-              <a:rPr lang="fr-FR" dirty="0" smtClean="0"/>
-              <a:t>Joueur</a:t>
-            </a:r>
-            <a:r>
               <a:rPr lang="fr-FR" baseline="0" dirty="0" smtClean="0"/>
-              <a:t> en premier ? Croupier en premier ?</a:t>
-            </a:r>
-          </a:p>
-          <a:p>
+              <a:t>1 carte croupier et 2 cartes joueur</a:t>
+            </a:r>
+          </a:p>
+          <a:p>
+            <a:pPr marL="0" marR="0" indent="0" algn="l" defTabSz="914400" rtl="0" eaLnBrk="1" fontAlgn="auto" latinLnBrk="0" hangingPunct="1">
+              <a:lnSpc>
+                <a:spcPct val="100000"/>
+              </a:lnSpc>
+              <a:spcBef>
+                <a:spcPts val="0"/>
+              </a:spcBef>
+              <a:spcAft>
+                <a:spcPts val="0"/>
+              </a:spcAft>
+              <a:buClrTx/>
+              <a:buSzTx/>
+              <a:buFontTx/>
+              <a:buNone/>
+              <a:tabLst/>
+              <a:defRPr/>
+            </a:pPr>
             <a:r>
               <a:rPr lang="fr-FR" baseline="0" dirty="0" smtClean="0"/>
-              <a:t>Boucle interne tirer/rester/perdu</a:t>
-            </a:r>
-          </a:p>
-          <a:p>
+              <a:t>Le joueur fait ses choix	Boucle interne tirer/rester/perdu</a:t>
+            </a:r>
+          </a:p>
+          <a:p>
+            <a:pPr marL="0" marR="0" indent="0" algn="l" defTabSz="914400" rtl="0" eaLnBrk="1" fontAlgn="auto" latinLnBrk="0" hangingPunct="1">
+              <a:lnSpc>
+                <a:spcPct val="100000"/>
+              </a:lnSpc>
+              <a:spcBef>
+                <a:spcPts val="0"/>
+              </a:spcBef>
+              <a:spcAft>
+                <a:spcPts val="0"/>
+              </a:spcAft>
+              <a:buClrTx/>
+              <a:buSzTx/>
+              <a:buFontTx/>
+              <a:buNone/>
+              <a:tabLst/>
+              <a:defRPr/>
+            </a:pPr>
+            <a:r>
+              <a:rPr lang="fr-FR" baseline="0" dirty="0" smtClean="0"/>
+              <a:t>Le croupier tire jusqu’à 17	Boucle interne tirer/rester/perdu</a:t>
+            </a:r>
+          </a:p>
+          <a:p>
+            <a:pPr marL="0" marR="0" indent="0" algn="l" defTabSz="914400" rtl="0" eaLnBrk="1" fontAlgn="auto" latinLnBrk="0" hangingPunct="1">
+              <a:lnSpc>
+                <a:spcPct val="100000"/>
+              </a:lnSpc>
+              <a:spcBef>
+                <a:spcPts val="0"/>
+              </a:spcBef>
+              <a:spcAft>
+                <a:spcPts val="0"/>
+              </a:spcAft>
+              <a:buClrTx/>
+              <a:buSzTx/>
+              <a:buFontTx/>
+              <a:buNone/>
+              <a:tabLst/>
+              <a:defRPr/>
+            </a:pPr>
             <a:r>
               <a:rPr lang="fr-FR" baseline="0" dirty="0" smtClean="0"/>
               <a:t>Dans cette boucle, appel à tirer carte, calculer main, compter cartes…</a:t>
@@ -529,25 +603,37 @@
           <a:p>
             <a:r>
               <a:rPr lang="fr-FR" baseline="0" dirty="0" smtClean="0"/>
-              <a:t>A l’issue des 2 boucles, comparer score et continuer</a:t>
-            </a:r>
-          </a:p>
-          <a:p>
-            <a:endParaRPr lang="fr-FR" baseline="0" dirty="0" smtClean="0"/>
+              <a:t>Comparer les scores</a:t>
+            </a:r>
           </a:p>
           <a:p>
             <a:r>
               <a:rPr lang="fr-FR" baseline="0" dirty="0" smtClean="0"/>
-              <a:t>Ajouter affichage graphique, son…</a:t>
-            </a:r>
-          </a:p>
-          <a:p>
-            <a:endParaRPr lang="fr-FR" baseline="0" dirty="0" smtClean="0"/>
-          </a:p>
-          <a:p>
+              <a:t>A </a:t>
+            </a:r>
             <a:r>
               <a:rPr lang="fr-FR" baseline="0" dirty="0" smtClean="0"/>
-              <a:t>Fichier de paramètres avec le choix du casino sur le seuil pour le croupier (17 ou 18)</a:t>
+              <a:t>l’issue des 2 boucles, comparer score et continuer</a:t>
+            </a:r>
+          </a:p>
+          <a:p>
+            <a:r>
+              <a:rPr lang="fr-FR" baseline="0" dirty="0" smtClean="0"/>
+              <a:t>Ajouter </a:t>
+            </a:r>
+            <a:r>
+              <a:rPr lang="fr-FR" baseline="0" dirty="0" smtClean="0"/>
+              <a:t>affichage graphique, son…</a:t>
+            </a:r>
+          </a:p>
+          <a:p>
+            <a:r>
+              <a:rPr lang="fr-FR" baseline="0" smtClean="0"/>
+              <a:t>Fichier </a:t>
+            </a:r>
+            <a:r>
+              <a:rPr lang="fr-FR" baseline="0" dirty="0" smtClean="0"/>
+              <a:t>de paramètres avec le choix du casino sur le seuil pour le croupier (17 ou 18)</a:t>
             </a:r>
             <a:endParaRPr lang="fr-FR" dirty="0"/>
           </a:p>
@@ -578,6 +664,11 @@
         </p:txBody>
       </p:sp>
     </p:spTree>
+    <p:extLst>
+      <p:ext uri="{BB962C8B-B14F-4D97-AF65-F5344CB8AC3E}">
+        <p14:creationId xmlns:p14="http://schemas.microsoft.com/office/powerpoint/2010/main" val="4006202470"/>
+      </p:ext>
+    </p:extLst>
   </p:cSld>
   <p:clrMapOvr>
     <a:masterClrMapping/>
@@ -767,7 +858,7 @@
             <a:fld id="{0A9D268A-F862-4ECA-AAA6-6F579D34DADA}" type="datetimeFigureOut">
               <a:rPr lang="fr-FR" smtClean="0"/>
               <a:pPr/>
-              <a:t>08/02/2016</a:t>
+              <a:t>02/03/2016</a:t>
             </a:fld>
             <a:endParaRPr lang="fr-FR"/>
           </a:p>
@@ -810,7 +901,7 @@
             <a:fld id="{A4043CEC-C98D-4494-94F9-6942A0180D31}" type="slidenum">
               <a:rPr lang="fr-FR" smtClean="0"/>
               <a:pPr/>
-              <a:t>‹N°›</a:t>
+              <a:t>‹#›</a:t>
             </a:fld>
             <a:endParaRPr lang="fr-FR"/>
           </a:p>
@@ -934,7 +1025,7 @@
             <a:fld id="{0A9D268A-F862-4ECA-AAA6-6F579D34DADA}" type="datetimeFigureOut">
               <a:rPr lang="fr-FR" smtClean="0"/>
               <a:pPr/>
-              <a:t>08/02/2016</a:t>
+              <a:t>02/03/2016</a:t>
             </a:fld>
             <a:endParaRPr lang="fr-FR"/>
           </a:p>
@@ -977,7 +1068,7 @@
             <a:fld id="{A4043CEC-C98D-4494-94F9-6942A0180D31}" type="slidenum">
               <a:rPr lang="fr-FR" smtClean="0"/>
               <a:pPr/>
-              <a:t>‹N°›</a:t>
+              <a:t>‹#›</a:t>
             </a:fld>
             <a:endParaRPr lang="fr-FR"/>
           </a:p>
@@ -1111,7 +1202,7 @@
             <a:fld id="{0A9D268A-F862-4ECA-AAA6-6F579D34DADA}" type="datetimeFigureOut">
               <a:rPr lang="fr-FR" smtClean="0"/>
               <a:pPr/>
-              <a:t>08/02/2016</a:t>
+              <a:t>02/03/2016</a:t>
             </a:fld>
             <a:endParaRPr lang="fr-FR"/>
           </a:p>
@@ -1154,7 +1245,7 @@
             <a:fld id="{A4043CEC-C98D-4494-94F9-6942A0180D31}" type="slidenum">
               <a:rPr lang="fr-FR" smtClean="0"/>
               <a:pPr/>
-              <a:t>‹N°›</a:t>
+              <a:t>‹#›</a:t>
             </a:fld>
             <a:endParaRPr lang="fr-FR"/>
           </a:p>
@@ -1278,7 +1369,7 @@
             <a:fld id="{0A9D268A-F862-4ECA-AAA6-6F579D34DADA}" type="datetimeFigureOut">
               <a:rPr lang="fr-FR" smtClean="0"/>
               <a:pPr/>
-              <a:t>08/02/2016</a:t>
+              <a:t>02/03/2016</a:t>
             </a:fld>
             <a:endParaRPr lang="fr-FR"/>
           </a:p>
@@ -1321,7 +1412,7 @@
             <a:fld id="{A4043CEC-C98D-4494-94F9-6942A0180D31}" type="slidenum">
               <a:rPr lang="fr-FR" smtClean="0"/>
               <a:pPr/>
-              <a:t>‹N°›</a:t>
+              <a:t>‹#›</a:t>
             </a:fld>
             <a:endParaRPr lang="fr-FR"/>
           </a:p>
@@ -1521,7 +1612,7 @@
             <a:fld id="{0A9D268A-F862-4ECA-AAA6-6F579D34DADA}" type="datetimeFigureOut">
               <a:rPr lang="fr-FR" smtClean="0"/>
               <a:pPr/>
-              <a:t>08/02/2016</a:t>
+              <a:t>02/03/2016</a:t>
             </a:fld>
             <a:endParaRPr lang="fr-FR"/>
           </a:p>
@@ -1564,7 +1655,7 @@
             <a:fld id="{A4043CEC-C98D-4494-94F9-6942A0180D31}" type="slidenum">
               <a:rPr lang="fr-FR" smtClean="0"/>
               <a:pPr/>
-              <a:t>‹N°›</a:t>
+              <a:t>‹#›</a:t>
             </a:fld>
             <a:endParaRPr lang="fr-FR"/>
           </a:p>
@@ -1806,7 +1897,7 @@
             <a:fld id="{0A9D268A-F862-4ECA-AAA6-6F579D34DADA}" type="datetimeFigureOut">
               <a:rPr lang="fr-FR" smtClean="0"/>
               <a:pPr/>
-              <a:t>08/02/2016</a:t>
+              <a:t>02/03/2016</a:t>
             </a:fld>
             <a:endParaRPr lang="fr-FR"/>
           </a:p>
@@ -1849,7 +1940,7 @@
             <a:fld id="{A4043CEC-C98D-4494-94F9-6942A0180D31}" type="slidenum">
               <a:rPr lang="fr-FR" smtClean="0"/>
               <a:pPr/>
-              <a:t>‹N°›</a:t>
+              <a:t>‹#›</a:t>
             </a:fld>
             <a:endParaRPr lang="fr-FR"/>
           </a:p>
@@ -2225,7 +2316,7 @@
             <a:fld id="{0A9D268A-F862-4ECA-AAA6-6F579D34DADA}" type="datetimeFigureOut">
               <a:rPr lang="fr-FR" smtClean="0"/>
               <a:pPr/>
-              <a:t>08/02/2016</a:t>
+              <a:t>02/03/2016</a:t>
             </a:fld>
             <a:endParaRPr lang="fr-FR"/>
           </a:p>
@@ -2268,7 +2359,7 @@
             <a:fld id="{A4043CEC-C98D-4494-94F9-6942A0180D31}" type="slidenum">
               <a:rPr lang="fr-FR" smtClean="0"/>
               <a:pPr/>
-              <a:t>‹N°›</a:t>
+              <a:t>‹#›</a:t>
             </a:fld>
             <a:endParaRPr lang="fr-FR"/>
           </a:p>
@@ -2340,7 +2431,7 @@
             <a:fld id="{0A9D268A-F862-4ECA-AAA6-6F579D34DADA}" type="datetimeFigureOut">
               <a:rPr lang="fr-FR" smtClean="0"/>
               <a:pPr/>
-              <a:t>08/02/2016</a:t>
+              <a:t>02/03/2016</a:t>
             </a:fld>
             <a:endParaRPr lang="fr-FR"/>
           </a:p>
@@ -2383,7 +2474,7 @@
             <a:fld id="{A4043CEC-C98D-4494-94F9-6942A0180D31}" type="slidenum">
               <a:rPr lang="fr-FR" smtClean="0"/>
               <a:pPr/>
-              <a:t>‹N°›</a:t>
+              <a:t>‹#›</a:t>
             </a:fld>
             <a:endParaRPr lang="fr-FR"/>
           </a:p>
@@ -2432,7 +2523,7 @@
             <a:fld id="{0A9D268A-F862-4ECA-AAA6-6F579D34DADA}" type="datetimeFigureOut">
               <a:rPr lang="fr-FR" smtClean="0"/>
               <a:pPr/>
-              <a:t>08/02/2016</a:t>
+              <a:t>02/03/2016</a:t>
             </a:fld>
             <a:endParaRPr lang="fr-FR"/>
           </a:p>
@@ -2475,7 +2566,7 @@
             <a:fld id="{A4043CEC-C98D-4494-94F9-6942A0180D31}" type="slidenum">
               <a:rPr lang="fr-FR" smtClean="0"/>
               <a:pPr/>
-              <a:t>‹N°›</a:t>
+              <a:t>‹#›</a:t>
             </a:fld>
             <a:endParaRPr lang="fr-FR"/>
           </a:p>
@@ -2706,7 +2797,7 @@
             <a:fld id="{0A9D268A-F862-4ECA-AAA6-6F579D34DADA}" type="datetimeFigureOut">
               <a:rPr lang="fr-FR" smtClean="0"/>
               <a:pPr/>
-              <a:t>08/02/2016</a:t>
+              <a:t>02/03/2016</a:t>
             </a:fld>
             <a:endParaRPr lang="fr-FR"/>
           </a:p>
@@ -2749,7 +2840,7 @@
             <a:fld id="{A4043CEC-C98D-4494-94F9-6942A0180D31}" type="slidenum">
               <a:rPr lang="fr-FR" smtClean="0"/>
               <a:pPr/>
-              <a:t>‹N°›</a:t>
+              <a:t>‹#›</a:t>
             </a:fld>
             <a:endParaRPr lang="fr-FR"/>
           </a:p>
@@ -2956,7 +3047,7 @@
             <a:fld id="{0A9D268A-F862-4ECA-AAA6-6F579D34DADA}" type="datetimeFigureOut">
               <a:rPr lang="fr-FR" smtClean="0"/>
               <a:pPr/>
-              <a:t>08/02/2016</a:t>
+              <a:t>02/03/2016</a:t>
             </a:fld>
             <a:endParaRPr lang="fr-FR"/>
           </a:p>
@@ -2999,7 +3090,7 @@
             <a:fld id="{A4043CEC-C98D-4494-94F9-6942A0180D31}" type="slidenum">
               <a:rPr lang="fr-FR" smtClean="0"/>
               <a:pPr/>
-              <a:t>‹N°›</a:t>
+              <a:t>‹#›</a:t>
             </a:fld>
             <a:endParaRPr lang="fr-FR"/>
           </a:p>
@@ -3166,7 +3257,7 @@
             <a:fld id="{0A9D268A-F862-4ECA-AAA6-6F579D34DADA}" type="datetimeFigureOut">
               <a:rPr lang="fr-FR" smtClean="0"/>
               <a:pPr/>
-              <a:t>08/02/2016</a:t>
+              <a:t>02/03/2016</a:t>
             </a:fld>
             <a:endParaRPr lang="fr-FR"/>
           </a:p>
@@ -3245,7 +3336,7 @@
             <a:fld id="{A4043CEC-C98D-4494-94F9-6942A0180D31}" type="slidenum">
               <a:rPr lang="fr-FR" smtClean="0"/>
               <a:pPr/>
-              <a:t>‹N°›</a:t>
+              <a:t>‹#›</a:t>
             </a:fld>
             <a:endParaRPr lang="fr-FR"/>
           </a:p>
@@ -3545,7 +3636,7 @@
         </p:nvSpPr>
         <p:spPr>
           <a:xfrm>
-            <a:off x="3707904" y="1778332"/>
+            <a:off x="1431106" y="4748137"/>
             <a:ext cx="1728192" cy="276999"/>
           </a:xfrm>
           <a:prstGeom prst="rect">
@@ -3575,14 +3666,14 @@
       </p:sp>
       <p:sp>
         <p:nvSpPr>
-          <p:cNvPr id="6" name="ZoneTexte 5"/>
+          <p:cNvPr id="7" name="ZoneTexte 6"/>
           <p:cNvSpPr txBox="1"/>
           <p:nvPr/>
         </p:nvSpPr>
         <p:spPr>
           <a:xfrm>
-            <a:off x="6084168" y="2498412"/>
-            <a:ext cx="648072" cy="276999"/>
+            <a:off x="6012489" y="3974743"/>
+            <a:ext cx="2016224" cy="461665"/>
           </a:xfrm>
           <a:prstGeom prst="rect">
             <a:avLst/>
@@ -3603,7 +3694,18 @@
             <a:pPr algn="ctr"/>
             <a:r>
               <a:rPr lang="fr-FR" sz="1200" dirty="0" smtClean="0"/>
-              <a:t>Tirer</a:t>
+              <a:t>Comparer le </a:t>
+            </a:r>
+            <a:r>
+              <a:rPr lang="fr-FR" sz="1200" dirty="0" smtClean="0"/>
+              <a:t>score</a:t>
+            </a:r>
+          </a:p>
+          <a:p>
+            <a:pPr algn="ctr"/>
+            <a:r>
+              <a:rPr lang="fr-FR" sz="1200" dirty="0" smtClean="0"/>
+              <a:t>Afficher</a:t>
             </a:r>
             <a:endParaRPr lang="fr-FR" sz="1200" dirty="0"/>
           </a:p>
@@ -3611,14 +3713,14 @@
       </p:sp>
       <p:sp>
         <p:nvSpPr>
-          <p:cNvPr id="7" name="ZoneTexte 6"/>
+          <p:cNvPr id="8" name="ZoneTexte 7"/>
           <p:cNvSpPr txBox="1"/>
           <p:nvPr/>
         </p:nvSpPr>
         <p:spPr>
           <a:xfrm>
-            <a:off x="3563888" y="3866564"/>
-            <a:ext cx="2016224" cy="276999"/>
+            <a:off x="3860165" y="5309504"/>
+            <a:ext cx="792088" cy="276999"/>
           </a:xfrm>
           <a:prstGeom prst="rect">
             <a:avLst/>
@@ -3639,7 +3741,7 @@
             <a:pPr algn="ctr"/>
             <a:r>
               <a:rPr lang="fr-FR" sz="1200" dirty="0" smtClean="0"/>
-              <a:t>Comparer le score</a:t>
+              <a:t>Perdu</a:t>
             </a:r>
             <a:endParaRPr lang="fr-FR" sz="1200" dirty="0"/>
           </a:p>
@@ -3647,14 +3749,14 @@
       </p:sp>
       <p:sp>
         <p:nvSpPr>
-          <p:cNvPr id="8" name="ZoneTexte 7"/>
+          <p:cNvPr id="11" name="ZoneTexte 10"/>
           <p:cNvSpPr txBox="1"/>
           <p:nvPr/>
         </p:nvSpPr>
         <p:spPr>
           <a:xfrm>
-            <a:off x="7812360" y="2498412"/>
-            <a:ext cx="792088" cy="276999"/>
+            <a:off x="1742085" y="2777493"/>
+            <a:ext cx="1080120" cy="461665"/>
           </a:xfrm>
           <a:prstGeom prst="rect">
             <a:avLst/>
@@ -3675,7 +3777,7 @@
             <a:pPr algn="ctr"/>
             <a:r>
               <a:rPr lang="fr-FR" sz="1200" dirty="0" smtClean="0"/>
-              <a:t>Perdu</a:t>
+              <a:t>Tirer 2 cartes pour le joueur</a:t>
             </a:r>
             <a:endParaRPr lang="fr-FR" sz="1200" dirty="0"/>
           </a:p>
@@ -3683,14 +3785,14 @@
       </p:sp>
       <p:sp>
         <p:nvSpPr>
-          <p:cNvPr id="9" name="ZoneTexte 8"/>
+          <p:cNvPr id="12" name="ZoneTexte 11"/>
           <p:cNvSpPr txBox="1"/>
           <p:nvPr/>
         </p:nvSpPr>
         <p:spPr>
           <a:xfrm>
-            <a:off x="3491880" y="3146484"/>
-            <a:ext cx="2160240" cy="461665"/>
+            <a:off x="1600037" y="2042945"/>
+            <a:ext cx="1364217" cy="461665"/>
           </a:xfrm>
           <a:prstGeom prst="rect">
             <a:avLst/>
@@ -3710,15 +3812,16 @@
           <a:p>
             <a:pPr algn="ctr"/>
             <a:r>
+              <a:rPr lang="fr-FR" sz="1200" dirty="0"/>
+              <a:t>Tire une </a:t>
+            </a:r>
+            <a:r>
+              <a:rPr lang="fr-FR" sz="1200" dirty="0"/>
+              <a:t>carte pour le </a:t>
+            </a:r>
+            <a:r>
               <a:rPr lang="fr-FR" sz="1200" dirty="0" smtClean="0"/>
-              <a:t>Comptage des cartes</a:t>
-            </a:r>
-          </a:p>
-          <a:p>
-            <a:pPr algn="ctr"/>
-            <a:r>
-              <a:rPr lang="fr-FR" sz="1200" dirty="0" smtClean="0"/>
-              <a:t>+1 ou -1</a:t>
+              <a:t>croupier</a:t>
             </a:r>
             <a:endParaRPr lang="fr-FR" sz="1200" dirty="0"/>
           </a:p>
@@ -3726,14 +3829,14 @@
       </p:sp>
       <p:sp>
         <p:nvSpPr>
-          <p:cNvPr id="10" name="ZoneTexte 9"/>
+          <p:cNvPr id="13" name="ZoneTexte 12"/>
           <p:cNvSpPr txBox="1"/>
           <p:nvPr/>
         </p:nvSpPr>
         <p:spPr>
           <a:xfrm>
-            <a:off x="3635896" y="4379912"/>
-            <a:ext cx="1872208" cy="461665"/>
+            <a:off x="1742085" y="1378202"/>
+            <a:ext cx="1080120" cy="276999"/>
           </a:xfrm>
           <a:prstGeom prst="rect">
             <a:avLst/>
@@ -3751,27 +3854,173 @@
           </a:bodyPr>
           <a:lstStyle/>
           <a:p>
+            <a:pPr algn="ctr">
+              <a:tabLst>
+                <a:tab pos="623888" algn="l"/>
+              </a:tabLst>
+            </a:pPr>
+            <a:r>
+              <a:rPr lang="fr-FR" sz="1200" dirty="0" smtClean="0"/>
+              <a:t>Deck</a:t>
+            </a:r>
+            <a:endParaRPr lang="fr-FR" sz="1200" dirty="0"/>
+          </a:p>
+        </p:txBody>
+      </p:sp>
+      <p:sp>
+        <p:nvSpPr>
+          <p:cNvPr id="105" name="Rectangle à coins arrondis 104"/>
+          <p:cNvSpPr/>
+          <p:nvPr/>
+        </p:nvSpPr>
+        <p:spPr>
+          <a:xfrm>
+            <a:off x="1436145" y="298082"/>
+            <a:ext cx="1692000" cy="396000"/>
+          </a:xfrm>
+          <a:prstGeom prst="roundRect">
+            <a:avLst/>
+          </a:prstGeom>
+          <a:ln/>
+        </p:spPr>
+        <p:style>
+          <a:lnRef idx="2">
+            <a:schemeClr val="dk1"/>
+          </a:lnRef>
+          <a:fillRef idx="1">
+            <a:schemeClr val="lt1"/>
+          </a:fillRef>
+          <a:effectRef idx="0">
+            <a:schemeClr val="dk1"/>
+          </a:effectRef>
+          <a:fontRef idx="minor">
+            <a:schemeClr val="dk1"/>
+          </a:fontRef>
+        </p:style>
+        <p:txBody>
+          <a:bodyPr rtlCol="0" anchor="ctr"/>
+          <a:lstStyle/>
+          <a:p>
             <a:pPr algn="ctr"/>
             <a:r>
-              <a:rPr lang="fr-FR" sz="1200" dirty="0" smtClean="0"/>
-              <a:t>Victoire de X ou Y ou égalité</a:t>
-            </a:r>
-            <a:endParaRPr lang="fr-FR" sz="1200" dirty="0"/>
-          </a:p>
-        </p:txBody>
-      </p:sp>
-      <p:sp>
-        <p:nvSpPr>
-          <p:cNvPr id="11" name="ZoneTexte 10"/>
+              <a:rPr lang="fr-FR" sz="1200" dirty="0">
+                <a:solidFill>
+                  <a:schemeClr val="tx1"/>
+                </a:solidFill>
+              </a:rPr>
+              <a:t>Début</a:t>
+            </a:r>
+          </a:p>
+        </p:txBody>
+      </p:sp>
+      <p:sp>
+        <p:nvSpPr>
+          <p:cNvPr id="106" name="Rectangle à coins arrondis 105"/>
+          <p:cNvSpPr/>
+          <p:nvPr/>
+        </p:nvSpPr>
+        <p:spPr>
+          <a:xfrm>
+            <a:off x="6156176" y="6093296"/>
+            <a:ext cx="1692000" cy="396000"/>
+          </a:xfrm>
+          <a:prstGeom prst="roundRect">
+            <a:avLst/>
+          </a:prstGeom>
+          <a:ln/>
+        </p:spPr>
+        <p:style>
+          <a:lnRef idx="2">
+            <a:schemeClr val="dk1"/>
+          </a:lnRef>
+          <a:fillRef idx="1">
+            <a:schemeClr val="lt1"/>
+          </a:fillRef>
+          <a:effectRef idx="0">
+            <a:schemeClr val="dk1"/>
+          </a:effectRef>
+          <a:fontRef idx="minor">
+            <a:schemeClr val="dk1"/>
+          </a:fontRef>
+        </p:style>
+        <p:txBody>
+          <a:bodyPr rtlCol="0" anchor="ctr"/>
+          <a:lstStyle/>
+          <a:p>
+            <a:pPr algn="ctr"/>
+            <a:r>
+              <a:rPr lang="fr-FR" sz="1200" dirty="0" smtClean="0">
+                <a:solidFill>
+                  <a:schemeClr val="tx1"/>
+                </a:solidFill>
+              </a:rPr>
+              <a:t>Fin</a:t>
+            </a:r>
+            <a:endParaRPr lang="fr-FR" sz="1200" dirty="0">
+              <a:solidFill>
+                <a:schemeClr val="tx1"/>
+              </a:solidFill>
+            </a:endParaRPr>
+          </a:p>
+        </p:txBody>
+      </p:sp>
+      <p:sp>
+        <p:nvSpPr>
+          <p:cNvPr id="166" name="ZoneTexte 165"/>
           <p:cNvSpPr txBox="1"/>
           <p:nvPr/>
         </p:nvSpPr>
         <p:spPr>
           <a:xfrm>
-            <a:off x="7524328" y="1778332"/>
-            <a:ext cx="1080120" cy="276999"/>
+            <a:off x="3216470" y="3498624"/>
+            <a:ext cx="1080120" cy="261610"/>
           </a:xfrm>
           <a:prstGeom prst="rect">
+            <a:avLst/>
+          </a:prstGeom>
+          <a:noFill/>
+        </p:spPr>
+        <p:txBody>
+          <a:bodyPr wrap="square" rtlCol="0">
+            <a:spAutoFit/>
+          </a:bodyPr>
+          <a:lstStyle/>
+          <a:p>
+            <a:pPr algn="ctr"/>
+            <a:r>
+              <a:rPr lang="fr-FR" sz="1050" dirty="0" smtClean="0">
+                <a:solidFill>
+                  <a:schemeClr val="accent1">
+                    <a:lumMod val="60000"/>
+                    <a:lumOff val="40000"/>
+                  </a:schemeClr>
+                </a:solidFill>
+              </a:rPr>
+              <a:t>rester</a:t>
+            </a:r>
+            <a:endParaRPr lang="fr-FR" sz="1050" dirty="0">
+              <a:solidFill>
+                <a:schemeClr val="accent1">
+                  <a:lumMod val="60000"/>
+                  <a:lumOff val="40000"/>
+                </a:schemeClr>
+              </a:solidFill>
+            </a:endParaRPr>
+          </a:p>
+        </p:txBody>
+      </p:sp>
+      <p:sp>
+        <p:nvSpPr>
+          <p:cNvPr id="67" name="Losange 66"/>
+          <p:cNvSpPr/>
+          <p:nvPr/>
+        </p:nvSpPr>
+        <p:spPr>
+          <a:xfrm>
+            <a:off x="6144748" y="4922296"/>
+            <a:ext cx="1728192" cy="794802"/>
+          </a:xfrm>
+          <a:prstGeom prst="diamond">
             <a:avLst/>
           </a:prstGeom>
           <a:noFill/>
@@ -3789,33 +4038,31 @@
           <a:p>
             <a:pPr algn="ctr"/>
             <a:r>
-              <a:rPr lang="fr-FR" sz="1200" dirty="0" smtClean="0"/>
-              <a:t>Joueur</a:t>
-            </a:r>
-            <a:endParaRPr lang="fr-FR" sz="1200" dirty="0"/>
-          </a:p>
-        </p:txBody>
-      </p:sp>
-      <p:sp>
-        <p:nvSpPr>
-          <p:cNvPr id="12" name="ZoneTexte 11"/>
+              <a:rPr lang="fr-FR" sz="1000" dirty="0" smtClean="0">
+                <a:solidFill>
+                  <a:schemeClr val="tx1"/>
+                </a:solidFill>
+              </a:rPr>
+              <a:t>Quitter / rejouer ?</a:t>
+            </a:r>
+          </a:p>
+        </p:txBody>
+      </p:sp>
+      <p:sp>
+        <p:nvSpPr>
+          <p:cNvPr id="86" name="ZoneTexte 85"/>
           <p:cNvSpPr txBox="1"/>
           <p:nvPr/>
         </p:nvSpPr>
         <p:spPr>
           <a:xfrm>
-            <a:off x="467544" y="1778332"/>
-            <a:ext cx="1080120" cy="276999"/>
+            <a:off x="6870713" y="5758604"/>
+            <a:ext cx="1080120" cy="261610"/>
           </a:xfrm>
           <a:prstGeom prst="rect">
             <a:avLst/>
           </a:prstGeom>
           <a:noFill/>
-          <a:ln>
-            <a:solidFill>
-              <a:schemeClr val="tx1"/>
-            </a:solidFill>
-          </a:ln>
         </p:spPr>
         <p:txBody>
           <a:bodyPr wrap="square" rtlCol="0">
@@ -3825,72 +4072,97 @@
           <a:p>
             <a:pPr algn="ctr"/>
             <a:r>
-              <a:rPr lang="fr-FR" sz="1200" dirty="0" smtClean="0"/>
-              <a:t>Croupier</a:t>
-            </a:r>
-            <a:endParaRPr lang="fr-FR" sz="1200" dirty="0"/>
-          </a:p>
-        </p:txBody>
-      </p:sp>
-      <p:sp>
-        <p:nvSpPr>
-          <p:cNvPr id="13" name="ZoneTexte 12"/>
-          <p:cNvSpPr txBox="1"/>
+              <a:rPr lang="fr-FR" sz="1050" dirty="0" smtClean="0">
+                <a:solidFill>
+                  <a:schemeClr val="accent1">
+                    <a:lumMod val="60000"/>
+                    <a:lumOff val="40000"/>
+                  </a:schemeClr>
+                </a:solidFill>
+              </a:rPr>
+              <a:t>Quitter</a:t>
+            </a:r>
+            <a:endParaRPr lang="fr-FR" sz="1050" dirty="0">
+              <a:solidFill>
+                <a:schemeClr val="accent1">
+                  <a:lumMod val="60000"/>
+                  <a:lumOff val="40000"/>
+                </a:schemeClr>
+              </a:solidFill>
+            </a:endParaRPr>
+          </a:p>
+        </p:txBody>
+      </p:sp>
+      <p:sp>
+        <p:nvSpPr>
+          <p:cNvPr id="91" name="Rectangle à coins arrondis 90"/>
+          <p:cNvSpPr/>
           <p:nvPr/>
         </p:nvSpPr>
         <p:spPr>
           <a:xfrm>
-            <a:off x="3995936" y="1283568"/>
-            <a:ext cx="1080120" cy="276999"/>
-          </a:xfrm>
-          <a:prstGeom prst="rect">
+            <a:off x="1436145" y="802138"/>
+            <a:ext cx="1692000" cy="396000"/>
+          </a:xfrm>
+          <a:prstGeom prst="roundRect">
             <a:avLst/>
           </a:prstGeom>
-          <a:noFill/>
-          <a:ln>
-            <a:solidFill>
-              <a:schemeClr val="tx1"/>
-            </a:solidFill>
-          </a:ln>
-        </p:spPr>
-        <p:txBody>
-          <a:bodyPr wrap="square" rtlCol="0">
-            <a:spAutoFit/>
-          </a:bodyPr>
-          <a:lstStyle/>
-          <a:p>
-            <a:pPr algn="ctr">
-              <a:tabLst>
-                <a:tab pos="623888" algn="l"/>
-              </a:tabLst>
-            </a:pPr>
-            <a:r>
-              <a:rPr lang="fr-FR" sz="1200" dirty="0" smtClean="0"/>
-              <a:t>Deck</a:t>
-            </a:r>
-            <a:endParaRPr lang="fr-FR" sz="1200" dirty="0"/>
+          <a:ln/>
+        </p:spPr>
+        <p:style>
+          <a:lnRef idx="2">
+            <a:schemeClr val="dk1"/>
+          </a:lnRef>
+          <a:fillRef idx="1">
+            <a:schemeClr val="lt1"/>
+          </a:fillRef>
+          <a:effectRef idx="0">
+            <a:schemeClr val="dk1"/>
+          </a:effectRef>
+          <a:fontRef idx="minor">
+            <a:schemeClr val="dk1"/>
+          </a:fontRef>
+        </p:style>
+        <p:txBody>
+          <a:bodyPr rtlCol="0" anchor="ctr"/>
+          <a:lstStyle/>
+          <a:p>
+            <a:pPr algn="ctr"/>
+            <a:r>
+              <a:rPr lang="fr-FR" sz="1200" dirty="0" smtClean="0">
+                <a:solidFill>
+                  <a:schemeClr val="tx1"/>
+                </a:solidFill>
+              </a:rPr>
+              <a:t>Initialiser les données</a:t>
+            </a:r>
+            <a:endParaRPr lang="fr-FR" sz="1200" dirty="0">
+              <a:solidFill>
+                <a:schemeClr val="tx1"/>
+              </a:solidFill>
+            </a:endParaRPr>
           </a:p>
         </p:txBody>
       </p:sp>
       <p:cxnSp>
         <p:nvCxnSpPr>
-          <p:cNvPr id="15" name="Forme 14"/>
+          <p:cNvPr id="30" name="Straight Arrow Connector 29"/>
           <p:cNvCxnSpPr>
-            <a:stCxn id="12" idx="0"/>
-            <a:endCxn id="13" idx="1"/>
+            <a:stCxn id="91" idx="2"/>
+            <a:endCxn id="13" idx="0"/>
           </p:cNvCxnSpPr>
           <p:nvPr/>
         </p:nvCxnSpPr>
         <p:spPr>
-          <a:xfrm rot="5400000" flipH="1" flipV="1">
-            <a:off x="2323638" y="106034"/>
-            <a:ext cx="356264" cy="2988332"/>
-          </a:xfrm>
-          <a:prstGeom prst="bentConnector2">
+          <a:xfrm>
+            <a:off x="2282145" y="1198138"/>
+            <a:ext cx="0" cy="180064"/>
+          </a:xfrm>
+          <a:prstGeom prst="straightConnector1">
             <a:avLst/>
           </a:prstGeom>
           <a:ln>
-            <a:tailEnd type="arrow"/>
+            <a:tailEnd type="triangle"/>
           </a:ln>
         </p:spPr>
         <p:style>
@@ -3910,23 +4182,23 @@
       </p:cxnSp>
       <p:cxnSp>
         <p:nvCxnSpPr>
-          <p:cNvPr id="17" name="Connecteur en angle 16"/>
+          <p:cNvPr id="42" name="Straight Arrow Connector 41"/>
           <p:cNvCxnSpPr>
-            <a:stCxn id="11" idx="0"/>
-            <a:endCxn id="13" idx="3"/>
+            <a:stCxn id="13" idx="2"/>
+            <a:endCxn id="12" idx="0"/>
           </p:cNvCxnSpPr>
           <p:nvPr/>
         </p:nvCxnSpPr>
         <p:spPr>
-          <a:xfrm rot="16200000" flipV="1">
-            <a:off x="6392090" y="106034"/>
-            <a:ext cx="356264" cy="2988332"/>
-          </a:xfrm>
-          <a:prstGeom prst="bentConnector2">
+          <a:xfrm>
+            <a:off x="2282145" y="1655201"/>
+            <a:ext cx="1" cy="387744"/>
+          </a:xfrm>
+          <a:prstGeom prst="straightConnector1">
             <a:avLst/>
           </a:prstGeom>
           <a:ln>
-            <a:tailEnd type="arrow"/>
+            <a:tailEnd type="triangle"/>
           </a:ln>
         </p:spPr>
         <p:style>
@@ -3946,23 +4218,23 @@
       </p:cxnSp>
       <p:cxnSp>
         <p:nvCxnSpPr>
-          <p:cNvPr id="29" name="Connecteur droit avec flèche 28"/>
+          <p:cNvPr id="55" name="Straight Arrow Connector 54"/>
           <p:cNvCxnSpPr>
-            <a:stCxn id="11" idx="1"/>
-            <a:endCxn id="5" idx="3"/>
+            <a:stCxn id="12" idx="2"/>
+            <a:endCxn id="11" idx="0"/>
           </p:cNvCxnSpPr>
           <p:nvPr/>
         </p:nvCxnSpPr>
         <p:spPr>
           <a:xfrm flipH="1">
-            <a:off x="5436096" y="1916832"/>
-            <a:ext cx="2088232" cy="0"/>
+            <a:off x="2282145" y="2504610"/>
+            <a:ext cx="1" cy="272883"/>
           </a:xfrm>
           <a:prstGeom prst="straightConnector1">
             <a:avLst/>
           </a:prstGeom>
           <a:ln>
-            <a:tailEnd type="arrow"/>
+            <a:tailEnd type="triangle"/>
           </a:ln>
         </p:spPr>
         <p:style>
@@ -3982,23 +4254,23 @@
       </p:cxnSp>
       <p:cxnSp>
         <p:nvCxnSpPr>
-          <p:cNvPr id="32" name="Connecteur droit avec flèche 31"/>
+          <p:cNvPr id="61" name="Straight Arrow Connector 60"/>
           <p:cNvCxnSpPr>
-            <a:stCxn id="12" idx="3"/>
-            <a:endCxn id="5" idx="1"/>
+            <a:stCxn id="11" idx="2"/>
+            <a:endCxn id="126" idx="0"/>
           </p:cNvCxnSpPr>
           <p:nvPr/>
         </p:nvCxnSpPr>
         <p:spPr>
           <a:xfrm>
-            <a:off x="1547664" y="1916832"/>
-            <a:ext cx="2160240" cy="0"/>
+            <a:off x="2282145" y="3239158"/>
+            <a:ext cx="6341" cy="229687"/>
           </a:xfrm>
           <a:prstGeom prst="straightConnector1">
             <a:avLst/>
           </a:prstGeom>
           <a:ln>
-            <a:tailEnd type="arrow"/>
+            <a:tailEnd type="triangle"/>
           </a:ln>
         </p:spPr>
         <p:style>
@@ -4018,14 +4290,58 @@
       </p:cxnSp>
       <p:sp>
         <p:nvSpPr>
-          <p:cNvPr id="33" name="ZoneTexte 32"/>
+          <p:cNvPr id="126" name="Losange 66"/>
+          <p:cNvSpPr/>
+          <p:nvPr/>
+        </p:nvSpPr>
+        <p:spPr>
+          <a:xfrm>
+            <a:off x="1424390" y="3468845"/>
+            <a:ext cx="1728192" cy="489109"/>
+          </a:xfrm>
+          <a:prstGeom prst="diamond">
+            <a:avLst/>
+          </a:prstGeom>
+          <a:noFill/>
+          <a:ln>
+            <a:solidFill>
+              <a:schemeClr val="tx1"/>
+            </a:solidFill>
+          </a:ln>
+        </p:spPr>
+        <p:txBody>
+          <a:bodyPr wrap="square" rtlCol="0">
+            <a:spAutoFit/>
+          </a:bodyPr>
+          <a:lstStyle/>
+          <a:p>
+            <a:pPr algn="ctr"/>
+            <a:r>
+              <a:rPr lang="fr-FR" sz="1000" dirty="0" smtClean="0">
+                <a:solidFill>
+                  <a:schemeClr val="tx1"/>
+                </a:solidFill>
+              </a:rPr>
+              <a:t>Tirer / rester</a:t>
+            </a:r>
+            <a:endParaRPr lang="fr-FR" sz="1000" dirty="0" smtClean="0">
+              <a:solidFill>
+                <a:schemeClr val="tx1"/>
+              </a:solidFill>
+            </a:endParaRPr>
+          </a:p>
+        </p:txBody>
+      </p:sp>
+      <p:sp>
+        <p:nvSpPr>
+          <p:cNvPr id="133" name="ZoneTexte 4"/>
           <p:cNvSpPr txBox="1"/>
           <p:nvPr/>
         </p:nvSpPr>
         <p:spPr>
           <a:xfrm>
-            <a:off x="6876256" y="2498412"/>
-            <a:ext cx="792088" cy="276999"/>
+            <a:off x="1430628" y="4207207"/>
+            <a:ext cx="1728192" cy="276999"/>
           </a:xfrm>
           <a:prstGeom prst="rect">
             <a:avLst/>
@@ -4046,7 +4362,7 @@
             <a:pPr algn="ctr"/>
             <a:r>
               <a:rPr lang="fr-FR" sz="1200" dirty="0" smtClean="0"/>
-              <a:t>Rester</a:t>
+              <a:t>tirer</a:t>
             </a:r>
             <a:endParaRPr lang="fr-FR" sz="1200" dirty="0"/>
           </a:p>
@@ -4054,25 +4370,23 @@
       </p:sp>
       <p:cxnSp>
         <p:nvCxnSpPr>
-          <p:cNvPr id="35" name="Connecteur en angle 34"/>
+          <p:cNvPr id="134" name="Straight Arrow Connector 133"/>
           <p:cNvCxnSpPr>
-            <a:stCxn id="11" idx="2"/>
-            <a:endCxn id="6" idx="0"/>
+            <a:stCxn id="126" idx="2"/>
+            <a:endCxn id="133" idx="0"/>
           </p:cNvCxnSpPr>
           <p:nvPr/>
         </p:nvCxnSpPr>
         <p:spPr>
-          <a:xfrm rot="5400000">
-            <a:off x="7014756" y="1448779"/>
-            <a:ext cx="443081" cy="1656184"/>
-          </a:xfrm>
-          <a:prstGeom prst="bentConnector3">
-            <a:avLst>
-              <a:gd name="adj1" fmla="val 50000"/>
-            </a:avLst>
+          <a:xfrm>
+            <a:off x="2288486" y="3957954"/>
+            <a:ext cx="6238" cy="249253"/>
+          </a:xfrm>
+          <a:prstGeom prst="straightConnector1">
+            <a:avLst/>
           </a:prstGeom>
           <a:ln>
-            <a:tailEnd type="arrow"/>
+            <a:tailEnd type="triangle"/>
           </a:ln>
         </p:spPr>
         <p:style>
@@ -4092,23 +4406,103 @@
       </p:cxnSp>
       <p:cxnSp>
         <p:nvCxnSpPr>
-          <p:cNvPr id="40" name="Connecteur droit avec flèche 39"/>
+          <p:cNvPr id="137" name="Straight Arrow Connector 136"/>
           <p:cNvCxnSpPr>
-            <a:stCxn id="11" idx="2"/>
-            <a:endCxn id="8" idx="0"/>
+            <a:stCxn id="133" idx="2"/>
+            <a:endCxn id="5" idx="0"/>
           </p:cNvCxnSpPr>
           <p:nvPr/>
         </p:nvCxnSpPr>
         <p:spPr>
           <a:xfrm>
-            <a:off x="8064388" y="2055331"/>
-            <a:ext cx="144016" cy="443081"/>
+            <a:off x="2294724" y="4484206"/>
+            <a:ext cx="478" cy="263931"/>
           </a:xfrm>
           <a:prstGeom prst="straightConnector1">
             <a:avLst/>
           </a:prstGeom>
           <a:ln>
-            <a:tailEnd type="arrow"/>
+            <a:tailEnd type="triangle"/>
+          </a:ln>
+        </p:spPr>
+        <p:style>
+          <a:lnRef idx="1">
+            <a:schemeClr val="accent1"/>
+          </a:lnRef>
+          <a:fillRef idx="0">
+            <a:schemeClr val="accent1"/>
+          </a:fillRef>
+          <a:effectRef idx="0">
+            <a:schemeClr val="accent1"/>
+          </a:effectRef>
+          <a:fontRef idx="minor">
+            <a:schemeClr val="tx1"/>
+          </a:fontRef>
+        </p:style>
+      </p:cxnSp>
+      <p:sp>
+        <p:nvSpPr>
+          <p:cNvPr id="150" name="Losange 66"/>
+          <p:cNvSpPr/>
+          <p:nvPr/>
+        </p:nvSpPr>
+        <p:spPr>
+          <a:xfrm>
+            <a:off x="1431106" y="5198761"/>
+            <a:ext cx="1728192" cy="489109"/>
+          </a:xfrm>
+          <a:prstGeom prst="diamond">
+            <a:avLst/>
+          </a:prstGeom>
+          <a:noFill/>
+          <a:ln>
+            <a:solidFill>
+              <a:schemeClr val="tx1"/>
+            </a:solidFill>
+          </a:ln>
+        </p:spPr>
+        <p:txBody>
+          <a:bodyPr wrap="square" rtlCol="0">
+            <a:spAutoFit/>
+          </a:bodyPr>
+          <a:lstStyle/>
+          <a:p>
+            <a:pPr algn="ctr"/>
+            <a:r>
+              <a:rPr lang="fr-FR" sz="1000" dirty="0" smtClean="0">
+                <a:solidFill>
+                  <a:schemeClr val="tx1"/>
+                </a:solidFill>
+              </a:rPr>
+              <a:t>+ de 21 ?</a:t>
+            </a:r>
+            <a:endParaRPr lang="fr-FR" sz="1000" dirty="0" smtClean="0">
+              <a:solidFill>
+                <a:schemeClr val="tx1"/>
+              </a:solidFill>
+            </a:endParaRPr>
+          </a:p>
+        </p:txBody>
+      </p:sp>
+      <p:cxnSp>
+        <p:nvCxnSpPr>
+          <p:cNvPr id="151" name="Straight Arrow Connector 150"/>
+          <p:cNvCxnSpPr>
+            <a:stCxn id="5" idx="2"/>
+            <a:endCxn id="150" idx="0"/>
+          </p:cNvCxnSpPr>
+          <p:nvPr/>
+        </p:nvCxnSpPr>
+        <p:spPr>
+          <a:xfrm>
+            <a:off x="2295202" y="5025136"/>
+            <a:ext cx="0" cy="173625"/>
+          </a:xfrm>
+          <a:prstGeom prst="straightConnector1">
+            <a:avLst/>
+          </a:prstGeom>
+          <a:ln>
+            <a:tailEnd type="triangle"/>
           </a:ln>
         </p:spPr>
         <p:style>
@@ -4128,23 +4522,23 @@
       </p:cxnSp>
       <p:cxnSp>
         <p:nvCxnSpPr>
-          <p:cNvPr id="43" name="Forme 42"/>
+          <p:cNvPr id="153" name="Straight Arrow Connector 152"/>
           <p:cNvCxnSpPr>
-            <a:stCxn id="6" idx="1"/>
-            <a:endCxn id="5" idx="2"/>
+            <a:stCxn id="150" idx="3"/>
+            <a:endCxn id="8" idx="1"/>
           </p:cNvCxnSpPr>
           <p:nvPr/>
         </p:nvCxnSpPr>
         <p:spPr>
-          <a:xfrm rot="10800000">
-            <a:off x="4572000" y="2055332"/>
-            <a:ext cx="1512168" cy="581581"/>
-          </a:xfrm>
-          <a:prstGeom prst="bentConnector2">
+          <a:xfrm>
+            <a:off x="3159298" y="5443316"/>
+            <a:ext cx="700867" cy="4688"/>
+          </a:xfrm>
+          <a:prstGeom prst="straightConnector1">
             <a:avLst/>
           </a:prstGeom>
           <a:ln>
-            <a:tailEnd type="arrow"/>
+            <a:tailEnd type="triangle"/>
           </a:ln>
         </p:spPr>
         <p:style>
@@ -4164,14 +4558,142 @@
       </p:cxnSp>
       <p:sp>
         <p:nvSpPr>
-          <p:cNvPr id="44" name="ZoneTexte 43"/>
+          <p:cNvPr id="156" name="ZoneTexte 165"/>
           <p:cNvSpPr txBox="1"/>
           <p:nvPr/>
         </p:nvSpPr>
         <p:spPr>
           <a:xfrm>
-            <a:off x="2339752" y="2498412"/>
-            <a:ext cx="648072" cy="276999"/>
+            <a:off x="3068077" y="5222121"/>
+            <a:ext cx="648072" cy="261610"/>
+          </a:xfrm>
+          <a:prstGeom prst="rect">
+            <a:avLst/>
+          </a:prstGeom>
+          <a:noFill/>
+        </p:spPr>
+        <p:txBody>
+          <a:bodyPr wrap="square" rtlCol="0">
+            <a:spAutoFit/>
+          </a:bodyPr>
+          <a:lstStyle/>
+          <a:p>
+            <a:pPr algn="ctr"/>
+            <a:r>
+              <a:rPr lang="fr-FR" sz="1050" dirty="0" smtClean="0">
+                <a:solidFill>
+                  <a:schemeClr val="accent1">
+                    <a:lumMod val="60000"/>
+                    <a:lumOff val="40000"/>
+                  </a:schemeClr>
+                </a:solidFill>
+              </a:rPr>
+              <a:t>oui</a:t>
+            </a:r>
+            <a:endParaRPr lang="fr-FR" sz="1050" dirty="0">
+              <a:solidFill>
+                <a:schemeClr val="accent1">
+                  <a:lumMod val="60000"/>
+                  <a:lumOff val="40000"/>
+                </a:schemeClr>
+              </a:solidFill>
+            </a:endParaRPr>
+          </a:p>
+        </p:txBody>
+      </p:sp>
+      <p:cxnSp>
+        <p:nvCxnSpPr>
+          <p:cNvPr id="158" name="Elbow Connector 157"/>
+          <p:cNvCxnSpPr>
+            <a:stCxn id="150" idx="1"/>
+            <a:endCxn id="126" idx="1"/>
+          </p:cNvCxnSpPr>
+          <p:nvPr/>
+        </p:nvCxnSpPr>
+        <p:spPr>
+          <a:xfrm rot="10800000">
+            <a:off x="1424390" y="3713400"/>
+            <a:ext cx="6716" cy="1729916"/>
+          </a:xfrm>
+          <a:prstGeom prst="bentConnector3">
+            <a:avLst>
+              <a:gd name="adj1" fmla="val 3503812"/>
+            </a:avLst>
+          </a:prstGeom>
+          <a:ln>
+            <a:tailEnd type="triangle"/>
+          </a:ln>
+        </p:spPr>
+        <p:style>
+          <a:lnRef idx="1">
+            <a:schemeClr val="accent1"/>
+          </a:lnRef>
+          <a:fillRef idx="0">
+            <a:schemeClr val="accent1"/>
+          </a:fillRef>
+          <a:effectRef idx="0">
+            <a:schemeClr val="accent1"/>
+          </a:effectRef>
+          <a:fontRef idx="minor">
+            <a:schemeClr val="tx1"/>
+          </a:fontRef>
+        </p:style>
+      </p:cxnSp>
+      <p:sp>
+        <p:nvSpPr>
+          <p:cNvPr id="167" name="ZoneTexte 165"/>
+          <p:cNvSpPr txBox="1"/>
+          <p:nvPr/>
+        </p:nvSpPr>
+        <p:spPr>
+          <a:xfrm rot="16200000">
+            <a:off x="730437" y="4537989"/>
+            <a:ext cx="648072" cy="261610"/>
+          </a:xfrm>
+          <a:prstGeom prst="rect">
+            <a:avLst/>
+          </a:prstGeom>
+          <a:noFill/>
+        </p:spPr>
+        <p:txBody>
+          <a:bodyPr wrap="square" rtlCol="0">
+            <a:spAutoFit/>
+          </a:bodyPr>
+          <a:lstStyle/>
+          <a:p>
+            <a:pPr algn="ctr"/>
+            <a:r>
+              <a:rPr lang="fr-FR" sz="1050" dirty="0" smtClean="0">
+                <a:solidFill>
+                  <a:schemeClr val="accent1">
+                    <a:lumMod val="60000"/>
+                    <a:lumOff val="40000"/>
+                  </a:schemeClr>
+                </a:solidFill>
+              </a:rPr>
+              <a:t>non</a:t>
+            </a:r>
+            <a:endParaRPr lang="fr-FR" sz="1050" dirty="0">
+              <a:solidFill>
+                <a:schemeClr val="accent1">
+                  <a:lumMod val="60000"/>
+                  <a:lumOff val="40000"/>
+                </a:schemeClr>
+              </a:solidFill>
+            </a:endParaRPr>
+          </a:p>
+        </p:txBody>
+      </p:sp>
+      <p:sp>
+        <p:nvSpPr>
+          <p:cNvPr id="195" name="ZoneTexte 4"/>
+          <p:cNvSpPr txBox="1"/>
+          <p:nvPr/>
+        </p:nvSpPr>
+        <p:spPr>
+          <a:xfrm>
+            <a:off x="6156504" y="2544891"/>
+            <a:ext cx="1728192" cy="276999"/>
           </a:xfrm>
           <a:prstGeom prst="rect">
             <a:avLst/>
@@ -4192,7 +4714,7 @@
             <a:pPr algn="ctr"/>
             <a:r>
               <a:rPr lang="fr-FR" sz="1200" dirty="0" smtClean="0"/>
-              <a:t>Tirer</a:t>
+              <a:t>Calculer la main</a:t>
             </a:r>
             <a:endParaRPr lang="fr-FR" sz="1200" dirty="0"/>
           </a:p>
@@ -4200,14 +4722,14 @@
       </p:sp>
       <p:sp>
         <p:nvSpPr>
-          <p:cNvPr id="46" name="ZoneTexte 45"/>
+          <p:cNvPr id="201" name="ZoneTexte 4"/>
           <p:cNvSpPr txBox="1"/>
           <p:nvPr/>
         </p:nvSpPr>
         <p:spPr>
           <a:xfrm>
-            <a:off x="1403648" y="2498412"/>
-            <a:ext cx="792088" cy="276999"/>
+            <a:off x="6156504" y="2016860"/>
+            <a:ext cx="1728192" cy="276999"/>
           </a:xfrm>
           <a:prstGeom prst="rect">
             <a:avLst/>
@@ -4227,25 +4749,61 @@
           <a:p>
             <a:pPr algn="ctr"/>
             <a:r>
-              <a:rPr lang="fr-FR" sz="1200" dirty="0" smtClean="0"/>
-              <a:t>Rester</a:t>
+              <a:rPr lang="fr-FR" sz="1200" dirty="0"/>
+              <a:t>Croupier tire</a:t>
             </a:r>
             <a:endParaRPr lang="fr-FR" sz="1200" dirty="0"/>
           </a:p>
         </p:txBody>
       </p:sp>
-      <p:sp>
-        <p:nvSpPr>
-          <p:cNvPr id="47" name="ZoneTexte 46"/>
-          <p:cNvSpPr txBox="1"/>
+      <p:cxnSp>
+        <p:nvCxnSpPr>
+          <p:cNvPr id="203" name="Straight Arrow Connector 202"/>
+          <p:cNvCxnSpPr>
+            <a:stCxn id="201" idx="2"/>
+            <a:endCxn id="195" idx="0"/>
+          </p:cNvCxnSpPr>
           <p:nvPr/>
-        </p:nvSpPr>
+        </p:nvCxnSpPr>
         <p:spPr>
           <a:xfrm>
-            <a:off x="467544" y="2498412"/>
-            <a:ext cx="792088" cy="276999"/>
-          </a:xfrm>
-          <a:prstGeom prst="rect">
+            <a:off x="7020600" y="2293859"/>
+            <a:ext cx="0" cy="251032"/>
+          </a:xfrm>
+          <a:prstGeom prst="straightConnector1">
+            <a:avLst/>
+          </a:prstGeom>
+          <a:ln>
+            <a:tailEnd type="triangle"/>
+          </a:ln>
+        </p:spPr>
+        <p:style>
+          <a:lnRef idx="1">
+            <a:schemeClr val="accent1"/>
+          </a:lnRef>
+          <a:fillRef idx="0">
+            <a:schemeClr val="accent1"/>
+          </a:fillRef>
+          <a:effectRef idx="0">
+            <a:schemeClr val="accent1"/>
+          </a:effectRef>
+          <a:fontRef idx="minor">
+            <a:schemeClr val="tx1"/>
+          </a:fontRef>
+        </p:style>
+      </p:cxnSp>
+      <p:sp>
+        <p:nvSpPr>
+          <p:cNvPr id="205" name="Losange 66"/>
+          <p:cNvSpPr/>
+          <p:nvPr/>
+        </p:nvSpPr>
+        <p:spPr>
+          <a:xfrm>
+            <a:off x="6156504" y="3103081"/>
+            <a:ext cx="1728192" cy="489109"/>
+          </a:xfrm>
+          <a:prstGeom prst="diamond">
             <a:avLst/>
           </a:prstGeom>
           <a:noFill/>
@@ -4263,34 +4821,123 @@
           <a:p>
             <a:pPr algn="ctr"/>
             <a:r>
-              <a:rPr lang="fr-FR" sz="1200" dirty="0" smtClean="0"/>
-              <a:t>Perdu</a:t>
-            </a:r>
-            <a:endParaRPr lang="fr-FR" sz="1200" dirty="0"/>
+              <a:rPr lang="fr-FR" sz="1000" dirty="0" smtClean="0">
+                <a:solidFill>
+                  <a:schemeClr val="tx1"/>
+                </a:solidFill>
+              </a:rPr>
+              <a:t>+ de 17?</a:t>
+            </a:r>
+            <a:endParaRPr lang="fr-FR" sz="1000" dirty="0" smtClean="0">
+              <a:solidFill>
+                <a:schemeClr val="tx1"/>
+              </a:solidFill>
+            </a:endParaRPr>
           </a:p>
         </p:txBody>
       </p:sp>
       <p:cxnSp>
         <p:nvCxnSpPr>
-          <p:cNvPr id="64" name="Connecteur en angle 63"/>
+          <p:cNvPr id="206" name="Straight Arrow Connector 205"/>
           <p:cNvCxnSpPr>
-            <a:stCxn id="12" idx="2"/>
-            <a:endCxn id="44" idx="0"/>
+            <a:stCxn id="195" idx="2"/>
+            <a:endCxn id="205" idx="0"/>
           </p:cNvCxnSpPr>
           <p:nvPr/>
         </p:nvCxnSpPr>
         <p:spPr>
-          <a:xfrm rot="16200000" flipH="1">
-            <a:off x="1614156" y="1448779"/>
-            <a:ext cx="443081" cy="1656184"/>
+          <a:xfrm>
+            <a:off x="7020600" y="2821890"/>
+            <a:ext cx="0" cy="281191"/>
+          </a:xfrm>
+          <a:prstGeom prst="straightConnector1">
+            <a:avLst/>
+          </a:prstGeom>
+          <a:ln>
+            <a:tailEnd type="triangle"/>
+          </a:ln>
+        </p:spPr>
+        <p:style>
+          <a:lnRef idx="1">
+            <a:schemeClr val="accent1"/>
+          </a:lnRef>
+          <a:fillRef idx="0">
+            <a:schemeClr val="accent1"/>
+          </a:fillRef>
+          <a:effectRef idx="0">
+            <a:schemeClr val="accent1"/>
+          </a:effectRef>
+          <a:fontRef idx="minor">
+            <a:schemeClr val="tx1"/>
+          </a:fontRef>
+        </p:style>
+      </p:cxnSp>
+      <p:sp>
+        <p:nvSpPr>
+          <p:cNvPr id="208" name="ZoneTexte 165"/>
+          <p:cNvSpPr txBox="1"/>
+          <p:nvPr/>
+        </p:nvSpPr>
+        <p:spPr>
+          <a:xfrm rot="16200000">
+            <a:off x="5427255" y="2693853"/>
+            <a:ext cx="648072" cy="261610"/>
+          </a:xfrm>
+          <a:prstGeom prst="rect">
+            <a:avLst/>
+          </a:prstGeom>
+          <a:noFill/>
+        </p:spPr>
+        <p:txBody>
+          <a:bodyPr wrap="square" rtlCol="0">
+            <a:spAutoFit/>
+          </a:bodyPr>
+          <a:lstStyle/>
+          <a:p>
+            <a:pPr algn="ctr"/>
+            <a:r>
+              <a:rPr lang="fr-FR" sz="1050" dirty="0" smtClean="0">
+                <a:solidFill>
+                  <a:schemeClr val="accent1">
+                    <a:lumMod val="60000"/>
+                    <a:lumOff val="40000"/>
+                  </a:schemeClr>
+                </a:solidFill>
+              </a:rPr>
+              <a:t>oui</a:t>
+            </a:r>
+            <a:endParaRPr lang="fr-FR" sz="1050" dirty="0">
+              <a:solidFill>
+                <a:schemeClr val="accent1">
+                  <a:lumMod val="60000"/>
+                  <a:lumOff val="40000"/>
+                </a:schemeClr>
+              </a:solidFill>
+            </a:endParaRPr>
+          </a:p>
+        </p:txBody>
+      </p:sp>
+      <p:cxnSp>
+        <p:nvCxnSpPr>
+          <p:cNvPr id="209" name="Elbow Connector 208"/>
+          <p:cNvCxnSpPr>
+            <a:stCxn id="205" idx="1"/>
+            <a:endCxn id="201" idx="1"/>
+          </p:cNvCxnSpPr>
+          <p:nvPr/>
+        </p:nvCxnSpPr>
+        <p:spPr>
+          <a:xfrm rot="10800000">
+            <a:off x="6156504" y="2155360"/>
+            <a:ext cx="12700" cy="1192276"/>
           </a:xfrm>
           <a:prstGeom prst="bentConnector3">
             <a:avLst>
-              <a:gd name="adj1" fmla="val 50000"/>
+              <a:gd name="adj1" fmla="val 1800000"/>
             </a:avLst>
           </a:prstGeom>
           <a:ln>
-            <a:tailEnd type="arrow"/>
+            <a:tailEnd type="triangle"/>
           </a:ln>
         </p:spPr>
         <p:style>
@@ -4310,23 +4957,26 @@
       </p:cxnSp>
       <p:cxnSp>
         <p:nvCxnSpPr>
-          <p:cNvPr id="70" name="Connecteur droit avec flèche 69"/>
+          <p:cNvPr id="213" name="Elbow Connector 212"/>
           <p:cNvCxnSpPr>
-            <a:stCxn id="12" idx="2"/>
-            <a:endCxn id="47" idx="0"/>
+            <a:stCxn id="126" idx="3"/>
+            <a:endCxn id="201" idx="0"/>
           </p:cNvCxnSpPr>
           <p:nvPr/>
         </p:nvCxnSpPr>
         <p:spPr>
-          <a:xfrm flipH="1">
-            <a:off x="863588" y="2055331"/>
-            <a:ext cx="144016" cy="443081"/>
-          </a:xfrm>
-          <a:prstGeom prst="straightConnector1">
-            <a:avLst/>
+          <a:xfrm flipV="1">
+            <a:off x="3152582" y="2016860"/>
+            <a:ext cx="3868018" cy="1696540"/>
+          </a:xfrm>
+          <a:prstGeom prst="bentConnector4">
+            <a:avLst>
+              <a:gd name="adj1" fmla="val 38830"/>
+              <a:gd name="adj2" fmla="val 113474"/>
+            </a:avLst>
           </a:prstGeom>
           <a:ln>
-            <a:tailEnd type="arrow"/>
+            <a:tailEnd type="triangle"/>
           </a:ln>
         </p:spPr>
         <p:style>
@@ -4346,21 +4996,27 @@
       </p:cxnSp>
       <p:cxnSp>
         <p:nvCxnSpPr>
-          <p:cNvPr id="74" name="Connecteur droit 73"/>
+          <p:cNvPr id="216" name="Elbow Connector 215"/>
           <p:cNvCxnSpPr>
-            <a:stCxn id="44" idx="3"/>
-            <a:endCxn id="6" idx="1"/>
+            <a:stCxn id="8" idx="3"/>
+            <a:endCxn id="201" idx="0"/>
           </p:cNvCxnSpPr>
           <p:nvPr/>
         </p:nvCxnSpPr>
         <p:spPr>
-          <a:xfrm>
-            <a:off x="2987824" y="2636912"/>
-            <a:ext cx="3096344" cy="0"/>
-          </a:xfrm>
-          <a:prstGeom prst="line">
-            <a:avLst/>
+          <a:xfrm flipV="1">
+            <a:off x="4652253" y="2016860"/>
+            <a:ext cx="2368347" cy="3431144"/>
+          </a:xfrm>
+          <a:prstGeom prst="bentConnector4">
+            <a:avLst>
+              <a:gd name="adj1" fmla="val 31757"/>
+              <a:gd name="adj2" fmla="val 106663"/>
+            </a:avLst>
           </a:prstGeom>
+          <a:ln>
+            <a:tailEnd type="triangle"/>
+          </a:ln>
         </p:spPr>
         <p:style>
           <a:lnRef idx="1">
@@ -4379,23 +5035,23 @@
       </p:cxnSp>
       <p:cxnSp>
         <p:nvCxnSpPr>
-          <p:cNvPr id="76" name="Forme 75"/>
+          <p:cNvPr id="238" name="Straight Arrow Connector 237"/>
           <p:cNvCxnSpPr>
-            <a:stCxn id="46" idx="2"/>
-            <a:endCxn id="7" idx="1"/>
+            <a:stCxn id="205" idx="2"/>
+            <a:endCxn id="7" idx="0"/>
           </p:cNvCxnSpPr>
           <p:nvPr/>
         </p:nvCxnSpPr>
         <p:spPr>
-          <a:xfrm rot="16200000" flipH="1">
-            <a:off x="2066964" y="2508139"/>
-            <a:ext cx="1229653" cy="1764196"/>
-          </a:xfrm>
-          <a:prstGeom prst="bentConnector2">
+          <a:xfrm>
+            <a:off x="7020600" y="3592190"/>
+            <a:ext cx="1" cy="382553"/>
+          </a:xfrm>
+          <a:prstGeom prst="straightConnector1">
             <a:avLst/>
           </a:prstGeom>
           <a:ln>
-            <a:tailEnd type="arrow"/>
+            <a:tailEnd type="triangle"/>
           </a:ln>
         </p:spPr>
         <p:style>
@@ -4415,23 +5071,25 @@
       </p:cxnSp>
       <p:cxnSp>
         <p:nvCxnSpPr>
-          <p:cNvPr id="78" name="Forme 77"/>
+          <p:cNvPr id="247" name="Elbow Connector 246"/>
           <p:cNvCxnSpPr>
-            <a:stCxn id="33" idx="2"/>
-            <a:endCxn id="7" idx="3"/>
+            <a:stCxn id="67" idx="3"/>
+            <a:endCxn id="13" idx="3"/>
           </p:cNvCxnSpPr>
           <p:nvPr/>
         </p:nvCxnSpPr>
         <p:spPr>
-          <a:xfrm rot="5400000">
-            <a:off x="5811380" y="2544143"/>
-            <a:ext cx="1229653" cy="1692188"/>
-          </a:xfrm>
-          <a:prstGeom prst="bentConnector2">
-            <a:avLst/>
+          <a:xfrm flipH="1" flipV="1">
+            <a:off x="2822205" y="1516702"/>
+            <a:ext cx="5050735" cy="3802995"/>
+          </a:xfrm>
+          <a:prstGeom prst="bentConnector3">
+            <a:avLst>
+              <a:gd name="adj1" fmla="val -4526"/>
+            </a:avLst>
           </a:prstGeom>
           <a:ln>
-            <a:tailEnd type="arrow"/>
+            <a:tailEnd type="triangle"/>
           </a:ln>
         </p:spPr>
         <p:style>
@@ -4451,25 +5109,23 @@
       </p:cxnSp>
       <p:cxnSp>
         <p:nvCxnSpPr>
-          <p:cNvPr id="80" name="Connecteur droit 79"/>
+          <p:cNvPr id="252" name="Straight Arrow Connector 251"/>
           <p:cNvCxnSpPr>
-            <a:stCxn id="6" idx="0"/>
-            <a:endCxn id="8" idx="0"/>
+            <a:stCxn id="67" idx="2"/>
+            <a:endCxn id="106" idx="0"/>
           </p:cNvCxnSpPr>
           <p:nvPr/>
         </p:nvCxnSpPr>
         <p:spPr>
-          <a:xfrm>
-            <a:off x="6408204" y="2498412"/>
-            <a:ext cx="1800200" cy="0"/>
-          </a:xfrm>
-          <a:prstGeom prst="line">
+          <a:xfrm flipH="1">
+            <a:off x="7002176" y="5717098"/>
+            <a:ext cx="6668" cy="376198"/>
+          </a:xfrm>
+          <a:prstGeom prst="straightConnector1">
             <a:avLst/>
           </a:prstGeom>
           <a:ln>
-            <a:solidFill>
-              <a:schemeClr val="tx1"/>
-            </a:solidFill>
+            <a:tailEnd type="triangle"/>
           </a:ln>
         </p:spPr>
         <p:style>
@@ -4489,25 +5145,23 @@
       </p:cxnSp>
       <p:cxnSp>
         <p:nvCxnSpPr>
-          <p:cNvPr id="84" name="Connecteur droit 83"/>
+          <p:cNvPr id="257" name="Straight Arrow Connector 256"/>
           <p:cNvCxnSpPr>
-            <a:stCxn id="6" idx="2"/>
-            <a:endCxn id="8" idx="2"/>
+            <a:stCxn id="7" idx="2"/>
+            <a:endCxn id="67" idx="0"/>
           </p:cNvCxnSpPr>
           <p:nvPr/>
         </p:nvCxnSpPr>
         <p:spPr>
-          <a:xfrm>
-            <a:off x="6408204" y="2775411"/>
-            <a:ext cx="1800200" cy="0"/>
-          </a:xfrm>
-          <a:prstGeom prst="line">
+          <a:xfrm flipH="1">
+            <a:off x="7008844" y="4436408"/>
+            <a:ext cx="11757" cy="485888"/>
+          </a:xfrm>
+          <a:prstGeom prst="straightConnector1">
             <a:avLst/>
           </a:prstGeom>
           <a:ln>
-            <a:solidFill>
-              <a:schemeClr val="tx1"/>
-            </a:solidFill>
+            <a:tailEnd type="triangle"/>
           </a:ln>
         </p:spPr>
         <p:style>
@@ -4525,631 +5179,16 @@
           </a:fontRef>
         </p:style>
       </p:cxnSp>
-      <p:cxnSp>
-        <p:nvCxnSpPr>
-          <p:cNvPr id="87" name="Connecteur droit 86"/>
-          <p:cNvCxnSpPr>
-            <a:stCxn id="47" idx="0"/>
-            <a:endCxn id="44" idx="0"/>
-          </p:cNvCxnSpPr>
-          <p:nvPr/>
-        </p:nvCxnSpPr>
-        <p:spPr>
-          <a:xfrm>
-            <a:off x="863588" y="2498412"/>
-            <a:ext cx="1800200" cy="0"/>
-          </a:xfrm>
-          <a:prstGeom prst="line">
-            <a:avLst/>
-          </a:prstGeom>
-          <a:ln>
-            <a:solidFill>
-              <a:schemeClr val="tx1"/>
-            </a:solidFill>
-          </a:ln>
-        </p:spPr>
-        <p:style>
-          <a:lnRef idx="1">
-            <a:schemeClr val="accent1"/>
-          </a:lnRef>
-          <a:fillRef idx="0">
-            <a:schemeClr val="accent1"/>
-          </a:fillRef>
-          <a:effectRef idx="0">
-            <a:schemeClr val="accent1"/>
-          </a:effectRef>
-          <a:fontRef idx="minor">
-            <a:schemeClr val="tx1"/>
-          </a:fontRef>
-        </p:style>
-      </p:cxnSp>
-      <p:cxnSp>
-        <p:nvCxnSpPr>
-          <p:cNvPr id="90" name="Connecteur droit 89"/>
-          <p:cNvCxnSpPr>
-            <a:stCxn id="47" idx="2"/>
-            <a:endCxn id="44" idx="2"/>
-          </p:cNvCxnSpPr>
-          <p:nvPr/>
-        </p:nvCxnSpPr>
-        <p:spPr>
-          <a:xfrm>
-            <a:off x="863588" y="2775411"/>
-            <a:ext cx="1800200" cy="0"/>
-          </a:xfrm>
-          <a:prstGeom prst="line">
-            <a:avLst/>
-          </a:prstGeom>
-          <a:ln>
-            <a:solidFill>
-              <a:schemeClr val="tx1"/>
-            </a:solidFill>
-          </a:ln>
-        </p:spPr>
-        <p:style>
-          <a:lnRef idx="1">
-            <a:schemeClr val="accent1"/>
-          </a:lnRef>
-          <a:fillRef idx="0">
-            <a:schemeClr val="accent1"/>
-          </a:fillRef>
-          <a:effectRef idx="0">
-            <a:schemeClr val="accent1"/>
-          </a:effectRef>
-          <a:fontRef idx="minor">
-            <a:schemeClr val="tx1"/>
-          </a:fontRef>
-        </p:style>
-      </p:cxnSp>
-      <p:cxnSp>
-        <p:nvCxnSpPr>
-          <p:cNvPr id="94" name="Forme 93"/>
-          <p:cNvCxnSpPr>
-            <a:stCxn id="6" idx="2"/>
-            <a:endCxn id="9" idx="3"/>
-          </p:cNvCxnSpPr>
-          <p:nvPr/>
-        </p:nvCxnSpPr>
-        <p:spPr>
-          <a:xfrm rot="5400000">
-            <a:off x="5729209" y="2698322"/>
-            <a:ext cx="601906" cy="756084"/>
-          </a:xfrm>
-          <a:prstGeom prst="bentConnector2">
-            <a:avLst/>
-          </a:prstGeom>
-          <a:ln>
-            <a:tailEnd type="arrow"/>
-          </a:ln>
-        </p:spPr>
-        <p:style>
-          <a:lnRef idx="1">
-            <a:schemeClr val="accent1"/>
-          </a:lnRef>
-          <a:fillRef idx="0">
-            <a:schemeClr val="accent1"/>
-          </a:fillRef>
-          <a:effectRef idx="0">
-            <a:schemeClr val="accent1"/>
-          </a:effectRef>
-          <a:fontRef idx="minor">
-            <a:schemeClr val="tx1"/>
-          </a:fontRef>
-        </p:style>
-      </p:cxnSp>
-      <p:cxnSp>
-        <p:nvCxnSpPr>
-          <p:cNvPr id="97" name="Forme 96"/>
-          <p:cNvCxnSpPr>
-            <a:stCxn id="44" idx="2"/>
-            <a:endCxn id="9" idx="1"/>
-          </p:cNvCxnSpPr>
-          <p:nvPr/>
-        </p:nvCxnSpPr>
-        <p:spPr>
-          <a:xfrm rot="16200000" flipH="1">
-            <a:off x="2776881" y="2662318"/>
-            <a:ext cx="601906" cy="828092"/>
-          </a:xfrm>
-          <a:prstGeom prst="bentConnector2">
-            <a:avLst/>
-          </a:prstGeom>
-          <a:ln>
-            <a:tailEnd type="arrow"/>
-          </a:ln>
-        </p:spPr>
-        <p:style>
-          <a:lnRef idx="1">
-            <a:schemeClr val="accent1"/>
-          </a:lnRef>
-          <a:fillRef idx="0">
-            <a:schemeClr val="accent1"/>
-          </a:fillRef>
-          <a:effectRef idx="0">
-            <a:schemeClr val="accent1"/>
-          </a:effectRef>
-          <a:fontRef idx="minor">
-            <a:schemeClr val="tx1"/>
-          </a:fontRef>
-        </p:style>
-      </p:cxnSp>
-      <p:cxnSp>
-        <p:nvCxnSpPr>
-          <p:cNvPr id="100" name="Connecteur droit avec flèche 99"/>
-          <p:cNvCxnSpPr>
-            <a:stCxn id="7" idx="2"/>
-            <a:endCxn id="10" idx="0"/>
-          </p:cNvCxnSpPr>
-          <p:nvPr/>
-        </p:nvCxnSpPr>
-        <p:spPr>
-          <a:xfrm>
-            <a:off x="4572000" y="4143563"/>
-            <a:ext cx="0" cy="236349"/>
-          </a:xfrm>
-          <a:prstGeom prst="straightConnector1">
-            <a:avLst/>
-          </a:prstGeom>
-          <a:ln>
-            <a:tailEnd type="arrow"/>
-          </a:ln>
-        </p:spPr>
-        <p:style>
-          <a:lnRef idx="1">
-            <a:schemeClr val="accent1"/>
-          </a:lnRef>
-          <a:fillRef idx="0">
-            <a:schemeClr val="accent1"/>
-          </a:fillRef>
-          <a:effectRef idx="0">
-            <a:schemeClr val="accent1"/>
-          </a:effectRef>
-          <a:fontRef idx="minor">
-            <a:schemeClr val="tx1"/>
-          </a:fontRef>
-        </p:style>
-      </p:cxnSp>
-      <p:cxnSp>
-        <p:nvCxnSpPr>
-          <p:cNvPr id="102" name="Forme 101"/>
-          <p:cNvCxnSpPr>
-            <a:stCxn id="8" idx="2"/>
-            <a:endCxn id="10" idx="3"/>
-          </p:cNvCxnSpPr>
-          <p:nvPr/>
-        </p:nvCxnSpPr>
-        <p:spPr>
-          <a:xfrm rot="5400000">
-            <a:off x="5940587" y="2342928"/>
-            <a:ext cx="1835334" cy="2700300"/>
-          </a:xfrm>
-          <a:prstGeom prst="bentConnector2">
-            <a:avLst/>
-          </a:prstGeom>
-          <a:ln>
-            <a:tailEnd type="arrow"/>
-          </a:ln>
-        </p:spPr>
-        <p:style>
-          <a:lnRef idx="1">
-            <a:schemeClr val="accent1"/>
-          </a:lnRef>
-          <a:fillRef idx="0">
-            <a:schemeClr val="accent1"/>
-          </a:fillRef>
-          <a:effectRef idx="0">
-            <a:schemeClr val="accent1"/>
-          </a:effectRef>
-          <a:fontRef idx="minor">
-            <a:schemeClr val="tx1"/>
-          </a:fontRef>
-        </p:style>
-      </p:cxnSp>
-      <p:cxnSp>
-        <p:nvCxnSpPr>
-          <p:cNvPr id="104" name="Forme 103"/>
-          <p:cNvCxnSpPr>
-            <a:stCxn id="47" idx="2"/>
-            <a:endCxn id="10" idx="1"/>
-          </p:cNvCxnSpPr>
-          <p:nvPr/>
-        </p:nvCxnSpPr>
-        <p:spPr>
-          <a:xfrm rot="16200000" flipH="1">
-            <a:off x="1332075" y="2306924"/>
-            <a:ext cx="1835334" cy="2772308"/>
-          </a:xfrm>
-          <a:prstGeom prst="bentConnector2">
-            <a:avLst/>
-          </a:prstGeom>
-          <a:ln>
-            <a:tailEnd type="arrow"/>
-          </a:ln>
-        </p:spPr>
-        <p:style>
-          <a:lnRef idx="1">
-            <a:schemeClr val="accent1"/>
-          </a:lnRef>
-          <a:fillRef idx="0">
-            <a:schemeClr val="accent1"/>
-          </a:fillRef>
-          <a:effectRef idx="0">
-            <a:schemeClr val="accent1"/>
-          </a:effectRef>
-          <a:fontRef idx="minor">
-            <a:schemeClr val="tx1"/>
-          </a:fontRef>
-        </p:style>
-      </p:cxnSp>
-      <p:sp>
-        <p:nvSpPr>
-          <p:cNvPr id="105" name="Rectangle à coins arrondis 104"/>
-          <p:cNvSpPr/>
-          <p:nvPr/>
-        </p:nvSpPr>
-        <p:spPr>
-          <a:xfrm>
-            <a:off x="3672088" y="116632"/>
-            <a:ext cx="1692000" cy="396000"/>
-          </a:xfrm>
-          <a:prstGeom prst="roundRect">
-            <a:avLst/>
-          </a:prstGeom>
-          <a:ln/>
-        </p:spPr>
-        <p:style>
-          <a:lnRef idx="2">
-            <a:schemeClr val="dk1"/>
-          </a:lnRef>
-          <a:fillRef idx="1">
-            <a:schemeClr val="lt1"/>
-          </a:fillRef>
-          <a:effectRef idx="0">
-            <a:schemeClr val="dk1"/>
-          </a:effectRef>
-          <a:fontRef idx="minor">
-            <a:schemeClr val="dk1"/>
-          </a:fontRef>
-        </p:style>
-        <p:txBody>
-          <a:bodyPr rtlCol="0" anchor="ctr"/>
-          <a:lstStyle/>
-          <a:p>
-            <a:pPr algn="ctr"/>
-            <a:r>
-              <a:rPr lang="fr-FR" sz="1200" dirty="0">
-                <a:solidFill>
-                  <a:schemeClr val="tx1"/>
-                </a:solidFill>
-              </a:rPr>
-              <a:t>Début</a:t>
-            </a:r>
-          </a:p>
-        </p:txBody>
-      </p:sp>
-      <p:sp>
-        <p:nvSpPr>
-          <p:cNvPr id="106" name="Rectangle à coins arrondis 105"/>
-          <p:cNvSpPr/>
-          <p:nvPr/>
-        </p:nvSpPr>
-        <p:spPr>
-          <a:xfrm>
-            <a:off x="179512" y="6108104"/>
-            <a:ext cx="1692000" cy="396000"/>
-          </a:xfrm>
-          <a:prstGeom prst="roundRect">
-            <a:avLst/>
-          </a:prstGeom>
-          <a:ln/>
-        </p:spPr>
-        <p:style>
-          <a:lnRef idx="2">
-            <a:schemeClr val="dk1"/>
-          </a:lnRef>
-          <a:fillRef idx="1">
-            <a:schemeClr val="lt1"/>
-          </a:fillRef>
-          <a:effectRef idx="0">
-            <a:schemeClr val="dk1"/>
-          </a:effectRef>
-          <a:fontRef idx="minor">
-            <a:schemeClr val="dk1"/>
-          </a:fontRef>
-        </p:style>
-        <p:txBody>
-          <a:bodyPr rtlCol="0" anchor="ctr"/>
-          <a:lstStyle/>
-          <a:p>
-            <a:pPr algn="ctr"/>
-            <a:r>
-              <a:rPr lang="fr-FR" sz="1200" dirty="0" smtClean="0">
-                <a:solidFill>
-                  <a:schemeClr val="tx1"/>
-                </a:solidFill>
-              </a:rPr>
-              <a:t>Fin</a:t>
-            </a:r>
-            <a:endParaRPr lang="fr-FR" sz="1200" dirty="0">
-              <a:solidFill>
-                <a:schemeClr val="tx1"/>
-              </a:solidFill>
-            </a:endParaRPr>
-          </a:p>
-        </p:txBody>
-      </p:sp>
-      <p:sp>
-        <p:nvSpPr>
-          <p:cNvPr id="107" name="ZoneTexte 106"/>
+      <p:sp>
+        <p:nvSpPr>
+          <p:cNvPr id="262" name="ZoneTexte 165"/>
           <p:cNvSpPr txBox="1"/>
           <p:nvPr/>
         </p:nvSpPr>
         <p:spPr>
-          <a:xfrm>
-            <a:off x="3563888" y="5099992"/>
-            <a:ext cx="2088232" cy="461665"/>
-          </a:xfrm>
-          <a:prstGeom prst="rect">
-            <a:avLst/>
-          </a:prstGeom>
-          <a:noFill/>
-          <a:ln>
-            <a:solidFill>
-              <a:schemeClr val="tx1"/>
-            </a:solidFill>
-          </a:ln>
-        </p:spPr>
-        <p:txBody>
-          <a:bodyPr wrap="square" rtlCol="0">
-            <a:spAutoFit/>
-          </a:bodyPr>
-          <a:lstStyle/>
-          <a:p>
-            <a:pPr algn="ctr"/>
-            <a:r>
-              <a:rPr lang="fr-FR" sz="1200" dirty="0" smtClean="0"/>
-              <a:t>Affichage du nombre de victoires</a:t>
-            </a:r>
-            <a:endParaRPr lang="fr-FR" sz="1200" dirty="0"/>
-          </a:p>
-        </p:txBody>
-      </p:sp>
-      <p:cxnSp>
-        <p:nvCxnSpPr>
-          <p:cNvPr id="124" name="Forme 123"/>
-          <p:cNvCxnSpPr>
-            <a:stCxn id="67" idx="1"/>
-            <a:endCxn id="106" idx="3"/>
-          </p:cNvCxnSpPr>
-          <p:nvPr/>
-        </p:nvCxnSpPr>
-        <p:spPr>
-          <a:xfrm rot="10800000" flipV="1">
-            <a:off x="1871512" y="6278612"/>
-            <a:ext cx="1836392" cy="27492"/>
-          </a:xfrm>
-          <a:prstGeom prst="bentConnector3">
-            <a:avLst>
-              <a:gd name="adj1" fmla="val 50000"/>
-            </a:avLst>
-          </a:prstGeom>
-          <a:ln>
-            <a:tailEnd type="arrow"/>
-          </a:ln>
-        </p:spPr>
-        <p:style>
-          <a:lnRef idx="1">
-            <a:schemeClr val="accent1"/>
-          </a:lnRef>
-          <a:fillRef idx="0">
-            <a:schemeClr val="accent1"/>
-          </a:fillRef>
-          <a:effectRef idx="0">
-            <a:schemeClr val="accent1"/>
-          </a:effectRef>
-          <a:fontRef idx="minor">
-            <a:schemeClr val="tx1"/>
-          </a:fontRef>
-        </p:style>
-      </p:cxnSp>
-      <p:cxnSp>
-        <p:nvCxnSpPr>
-          <p:cNvPr id="127" name="Connecteur en angle 126"/>
-          <p:cNvCxnSpPr>
-            <a:stCxn id="67" idx="3"/>
-            <a:endCxn id="11" idx="3"/>
-          </p:cNvCxnSpPr>
-          <p:nvPr/>
-        </p:nvCxnSpPr>
-        <p:spPr>
-          <a:xfrm flipV="1">
-            <a:off x="5436096" y="1916832"/>
-            <a:ext cx="3168352" cy="4361780"/>
-          </a:xfrm>
-          <a:prstGeom prst="bentConnector3">
-            <a:avLst>
-              <a:gd name="adj1" fmla="val 107215"/>
-            </a:avLst>
-          </a:prstGeom>
-          <a:ln>
-            <a:tailEnd type="arrow"/>
-          </a:ln>
-        </p:spPr>
-        <p:style>
-          <a:lnRef idx="1">
-            <a:schemeClr val="accent1"/>
-          </a:lnRef>
-          <a:fillRef idx="0">
-            <a:schemeClr val="accent1"/>
-          </a:fillRef>
-          <a:effectRef idx="0">
-            <a:schemeClr val="accent1"/>
-          </a:effectRef>
-          <a:fontRef idx="minor">
-            <a:schemeClr val="tx1"/>
-          </a:fontRef>
-        </p:style>
-      </p:cxnSp>
-      <p:sp>
-        <p:nvSpPr>
-          <p:cNvPr id="148" name="ZoneTexte 147"/>
-          <p:cNvSpPr txBox="1"/>
-          <p:nvPr/>
-        </p:nvSpPr>
-        <p:spPr>
-          <a:xfrm>
-            <a:off x="1691680" y="1139552"/>
-            <a:ext cx="1584176" cy="261610"/>
-          </a:xfrm>
-          <a:prstGeom prst="rect">
-            <a:avLst/>
-          </a:prstGeom>
-          <a:noFill/>
-        </p:spPr>
-        <p:txBody>
-          <a:bodyPr wrap="square" rtlCol="0">
-            <a:spAutoFit/>
-          </a:bodyPr>
-          <a:lstStyle/>
-          <a:p>
-            <a:pPr algn="ctr"/>
-            <a:r>
-              <a:rPr lang="fr-FR" sz="1050" dirty="0">
-                <a:solidFill>
-                  <a:schemeClr val="accent1">
-                    <a:lumMod val="60000"/>
-                    <a:lumOff val="40000"/>
-                  </a:schemeClr>
-                </a:solidFill>
-              </a:rPr>
-              <a:t>Tire une carte</a:t>
-            </a:r>
-          </a:p>
-        </p:txBody>
-      </p:sp>
-      <p:sp>
-        <p:nvSpPr>
-          <p:cNvPr id="149" name="ZoneTexte 148"/>
-          <p:cNvSpPr txBox="1"/>
-          <p:nvPr/>
-        </p:nvSpPr>
-        <p:spPr>
-          <a:xfrm>
-            <a:off x="5796136" y="1139552"/>
-            <a:ext cx="1584176" cy="261610"/>
-          </a:xfrm>
-          <a:prstGeom prst="rect">
-            <a:avLst/>
-          </a:prstGeom>
-          <a:noFill/>
-        </p:spPr>
-        <p:txBody>
-          <a:bodyPr wrap="square" rtlCol="0">
-            <a:spAutoFit/>
-          </a:bodyPr>
-          <a:lstStyle/>
-          <a:p>
-            <a:pPr algn="ctr"/>
-            <a:r>
-              <a:rPr lang="fr-FR" sz="1050" dirty="0">
-                <a:solidFill>
-                  <a:schemeClr val="accent1">
-                    <a:lumMod val="60000"/>
-                    <a:lumOff val="40000"/>
-                  </a:schemeClr>
-                </a:solidFill>
-              </a:rPr>
-              <a:t>Tire 2 cartes</a:t>
-            </a:r>
-          </a:p>
-        </p:txBody>
-      </p:sp>
-      <p:cxnSp>
-        <p:nvCxnSpPr>
-          <p:cNvPr id="155" name="Connecteur en angle 154"/>
-          <p:cNvCxnSpPr>
-            <a:stCxn id="12" idx="2"/>
-            <a:endCxn id="46" idx="0"/>
-          </p:cNvCxnSpPr>
-          <p:nvPr/>
-        </p:nvCxnSpPr>
-        <p:spPr>
-          <a:xfrm rot="16200000" flipH="1">
-            <a:off x="1182108" y="1880827"/>
-            <a:ext cx="443081" cy="792088"/>
-          </a:xfrm>
-          <a:prstGeom prst="bentConnector3">
-            <a:avLst>
-              <a:gd name="adj1" fmla="val 50000"/>
-            </a:avLst>
-          </a:prstGeom>
-          <a:ln>
-            <a:tailEnd type="arrow"/>
-          </a:ln>
-        </p:spPr>
-        <p:style>
-          <a:lnRef idx="1">
-            <a:schemeClr val="accent1"/>
-          </a:lnRef>
-          <a:fillRef idx="0">
-            <a:schemeClr val="accent1"/>
-          </a:fillRef>
-          <a:effectRef idx="0">
-            <a:schemeClr val="accent1"/>
-          </a:effectRef>
-          <a:fontRef idx="minor">
-            <a:schemeClr val="tx1"/>
-          </a:fontRef>
-        </p:style>
-      </p:cxnSp>
-      <p:cxnSp>
-        <p:nvCxnSpPr>
-          <p:cNvPr id="159" name="Connecteur en angle 158"/>
-          <p:cNvCxnSpPr>
-            <a:stCxn id="11" idx="2"/>
-            <a:endCxn id="33" idx="0"/>
-          </p:cNvCxnSpPr>
-          <p:nvPr/>
-        </p:nvCxnSpPr>
-        <p:spPr>
-          <a:xfrm rot="5400000">
-            <a:off x="7446804" y="1880827"/>
-            <a:ext cx="443081" cy="792088"/>
-          </a:xfrm>
-          <a:prstGeom prst="bentConnector3">
-            <a:avLst>
-              <a:gd name="adj1" fmla="val 50000"/>
-            </a:avLst>
-          </a:prstGeom>
-          <a:ln>
-            <a:tailEnd type="arrow"/>
-          </a:ln>
-        </p:spPr>
-        <p:style>
-          <a:lnRef idx="1">
-            <a:schemeClr val="accent1"/>
-          </a:lnRef>
-          <a:fillRef idx="0">
-            <a:schemeClr val="accent1"/>
-          </a:fillRef>
-          <a:effectRef idx="0">
-            <a:schemeClr val="accent1"/>
-          </a:effectRef>
-          <a:fontRef idx="minor">
-            <a:schemeClr val="tx1"/>
-          </a:fontRef>
-        </p:style>
-      </p:cxnSp>
-      <p:sp>
-        <p:nvSpPr>
-          <p:cNvPr id="161" name="ZoneTexte 160"/>
-          <p:cNvSpPr txBox="1"/>
-          <p:nvPr/>
-        </p:nvSpPr>
-        <p:spPr>
-          <a:xfrm>
-            <a:off x="1403648" y="2055911"/>
-            <a:ext cx="1584176" cy="261610"/>
+          <a:xfrm rot="16200000">
+            <a:off x="7982779" y="3544853"/>
+            <a:ext cx="648072" cy="261610"/>
           </a:xfrm>
           <a:prstGeom prst="rect">
             <a:avLst/>
@@ -5172,7 +5211,7 @@
                   </a:schemeClr>
                 </a:solidFill>
               </a:rPr>
-              <a:t>Tire jusqu’à 17</a:t>
+              <a:t>rejouer</a:t>
             </a:r>
             <a:endParaRPr lang="fr-FR" sz="1050" dirty="0">
               <a:solidFill>
@@ -5185,394 +5224,12 @@
           </a:p>
         </p:txBody>
       </p:sp>
-      <p:sp>
-        <p:nvSpPr>
-          <p:cNvPr id="163" name="ZoneTexte 162"/>
-          <p:cNvSpPr txBox="1"/>
-          <p:nvPr/>
-        </p:nvSpPr>
-        <p:spPr>
-          <a:xfrm>
-            <a:off x="7380312" y="4072135"/>
-            <a:ext cx="1080120" cy="261610"/>
-          </a:xfrm>
-          <a:prstGeom prst="rect">
-            <a:avLst/>
-          </a:prstGeom>
-          <a:noFill/>
-        </p:spPr>
-        <p:txBody>
-          <a:bodyPr wrap="square" rtlCol="0">
-            <a:spAutoFit/>
-          </a:bodyPr>
-          <a:lstStyle/>
-          <a:p>
-            <a:pPr algn="ctr"/>
-            <a:r>
-              <a:rPr lang="fr-FR" sz="1050" dirty="0" smtClean="0">
-                <a:solidFill>
-                  <a:schemeClr val="accent1">
-                    <a:lumMod val="60000"/>
-                    <a:lumOff val="40000"/>
-                  </a:schemeClr>
-                </a:solidFill>
-              </a:rPr>
-              <a:t>+ de 21</a:t>
-            </a:r>
-            <a:endParaRPr lang="fr-FR" sz="1050" dirty="0">
-              <a:solidFill>
-                <a:schemeClr val="accent1">
-                  <a:lumMod val="60000"/>
-                  <a:lumOff val="40000"/>
-                </a:schemeClr>
-              </a:solidFill>
-            </a:endParaRPr>
-          </a:p>
-        </p:txBody>
-      </p:sp>
-      <p:sp>
-        <p:nvSpPr>
-          <p:cNvPr id="164" name="ZoneTexte 163"/>
-          <p:cNvSpPr txBox="1"/>
-          <p:nvPr/>
-        </p:nvSpPr>
-        <p:spPr>
-          <a:xfrm>
-            <a:off x="611560" y="4072135"/>
-            <a:ext cx="1080120" cy="261610"/>
-          </a:xfrm>
-          <a:prstGeom prst="rect">
-            <a:avLst/>
-          </a:prstGeom>
-          <a:noFill/>
-        </p:spPr>
-        <p:txBody>
-          <a:bodyPr wrap="square" rtlCol="0">
-            <a:spAutoFit/>
-          </a:bodyPr>
-          <a:lstStyle/>
-          <a:p>
-            <a:pPr algn="ctr"/>
-            <a:r>
-              <a:rPr lang="fr-FR" sz="1050" dirty="0" smtClean="0">
-                <a:solidFill>
-                  <a:schemeClr val="accent1">
-                    <a:lumMod val="60000"/>
-                    <a:lumOff val="40000"/>
-                  </a:schemeClr>
-                </a:solidFill>
-              </a:rPr>
-              <a:t>+ de 21</a:t>
-            </a:r>
-            <a:endParaRPr lang="fr-FR" sz="1050" dirty="0">
-              <a:solidFill>
-                <a:schemeClr val="accent1">
-                  <a:lumMod val="60000"/>
-                  <a:lumOff val="40000"/>
-                </a:schemeClr>
-              </a:solidFill>
-            </a:endParaRPr>
-          </a:p>
-        </p:txBody>
-      </p:sp>
-      <p:sp>
-        <p:nvSpPr>
-          <p:cNvPr id="166" name="ZoneTexte 165"/>
-          <p:cNvSpPr txBox="1"/>
-          <p:nvPr/>
-        </p:nvSpPr>
-        <p:spPr>
-          <a:xfrm>
-            <a:off x="6444208" y="2003648"/>
-            <a:ext cx="1080120" cy="261610"/>
-          </a:xfrm>
-          <a:prstGeom prst="rect">
-            <a:avLst/>
-          </a:prstGeom>
-          <a:noFill/>
-        </p:spPr>
-        <p:txBody>
-          <a:bodyPr wrap="square" rtlCol="0">
-            <a:spAutoFit/>
-          </a:bodyPr>
-          <a:lstStyle/>
-          <a:p>
-            <a:pPr algn="ctr"/>
-            <a:r>
-              <a:rPr lang="fr-FR" sz="1050" dirty="0" smtClean="0">
-                <a:solidFill>
-                  <a:schemeClr val="accent1">
-                    <a:lumMod val="60000"/>
-                    <a:lumOff val="40000"/>
-                  </a:schemeClr>
-                </a:solidFill>
-              </a:rPr>
-              <a:t>Saisir</a:t>
-            </a:r>
-            <a:endParaRPr lang="fr-FR" sz="1050" dirty="0">
-              <a:solidFill>
-                <a:schemeClr val="accent1">
-                  <a:lumMod val="60000"/>
-                  <a:lumOff val="40000"/>
-                </a:schemeClr>
-              </a:solidFill>
-            </a:endParaRPr>
-          </a:p>
-        </p:txBody>
-      </p:sp>
-      <p:cxnSp>
-        <p:nvCxnSpPr>
-          <p:cNvPr id="62" name="Connecteur droit avec flèche 61"/>
-          <p:cNvCxnSpPr>
-            <a:stCxn id="10" idx="2"/>
-            <a:endCxn id="107" idx="0"/>
-          </p:cNvCxnSpPr>
-          <p:nvPr/>
-        </p:nvCxnSpPr>
-        <p:spPr>
-          <a:xfrm>
-            <a:off x="4572000" y="4841577"/>
-            <a:ext cx="36004" cy="258415"/>
-          </a:xfrm>
-          <a:prstGeom prst="straightConnector1">
-            <a:avLst/>
-          </a:prstGeom>
-          <a:ln>
-            <a:tailEnd type="arrow"/>
-          </a:ln>
-        </p:spPr>
-        <p:style>
-          <a:lnRef idx="1">
-            <a:schemeClr val="accent1"/>
-          </a:lnRef>
-          <a:fillRef idx="0">
-            <a:schemeClr val="accent1"/>
-          </a:fillRef>
-          <a:effectRef idx="0">
-            <a:schemeClr val="accent1"/>
-          </a:effectRef>
-          <a:fontRef idx="minor">
-            <a:schemeClr val="tx1"/>
-          </a:fontRef>
-        </p:style>
-      </p:cxnSp>
-      <p:sp>
-        <p:nvSpPr>
-          <p:cNvPr id="67" name="Losange 66"/>
-          <p:cNvSpPr/>
-          <p:nvPr/>
-        </p:nvSpPr>
-        <p:spPr>
-          <a:xfrm>
-            <a:off x="3707904" y="5820072"/>
-            <a:ext cx="1728192" cy="917079"/>
-          </a:xfrm>
-          <a:prstGeom prst="diamond">
-            <a:avLst/>
-          </a:prstGeom>
-          <a:noFill/>
-          <a:ln>
-            <a:solidFill>
-              <a:schemeClr val="tx1"/>
-            </a:solidFill>
-          </a:ln>
-        </p:spPr>
-        <p:txBody>
-          <a:bodyPr wrap="square" rtlCol="0">
-            <a:spAutoFit/>
-          </a:bodyPr>
-          <a:lstStyle/>
-          <a:p>
-            <a:pPr algn="ctr"/>
-            <a:r>
-              <a:rPr lang="fr-FR" sz="1200" dirty="0" smtClean="0">
-                <a:solidFill>
-                  <a:schemeClr val="tx1"/>
-                </a:solidFill>
-              </a:rPr>
-              <a:t>Quitter / rejouer ?</a:t>
-            </a:r>
-          </a:p>
-        </p:txBody>
-      </p:sp>
-      <p:cxnSp>
-        <p:nvCxnSpPr>
-          <p:cNvPr id="68" name="Connecteur droit avec flèche 67"/>
-          <p:cNvCxnSpPr>
-            <a:stCxn id="107" idx="2"/>
-            <a:endCxn id="67" idx="0"/>
-          </p:cNvCxnSpPr>
-          <p:nvPr/>
-        </p:nvCxnSpPr>
-        <p:spPr>
-          <a:xfrm flipH="1">
-            <a:off x="4572000" y="5561657"/>
-            <a:ext cx="36004" cy="258415"/>
-          </a:xfrm>
-          <a:prstGeom prst="straightConnector1">
-            <a:avLst/>
-          </a:prstGeom>
-          <a:ln>
-            <a:tailEnd type="arrow"/>
-          </a:ln>
-        </p:spPr>
-        <p:style>
-          <a:lnRef idx="1">
-            <a:schemeClr val="accent1"/>
-          </a:lnRef>
-          <a:fillRef idx="0">
-            <a:schemeClr val="accent1"/>
-          </a:fillRef>
-          <a:effectRef idx="0">
-            <a:schemeClr val="accent1"/>
-          </a:effectRef>
-          <a:fontRef idx="minor">
-            <a:schemeClr val="tx1"/>
-          </a:fontRef>
-        </p:style>
-      </p:cxnSp>
-      <p:sp>
-        <p:nvSpPr>
-          <p:cNvPr id="81" name="ZoneTexte 80"/>
-          <p:cNvSpPr txBox="1"/>
-          <p:nvPr/>
-        </p:nvSpPr>
-        <p:spPr>
-          <a:xfrm>
-            <a:off x="6084168" y="5964088"/>
-            <a:ext cx="1080120" cy="261610"/>
-          </a:xfrm>
-          <a:prstGeom prst="rect">
-            <a:avLst/>
-          </a:prstGeom>
-          <a:noFill/>
-        </p:spPr>
-        <p:txBody>
-          <a:bodyPr wrap="square" rtlCol="0">
-            <a:spAutoFit/>
-          </a:bodyPr>
-          <a:lstStyle/>
-          <a:p>
-            <a:pPr algn="ctr"/>
-            <a:r>
-              <a:rPr lang="fr-FR" sz="1050" dirty="0" smtClean="0">
-                <a:solidFill>
-                  <a:schemeClr val="accent1">
-                    <a:lumMod val="60000"/>
-                    <a:lumOff val="40000"/>
-                  </a:schemeClr>
-                </a:solidFill>
-              </a:rPr>
-              <a:t>Rejouer</a:t>
-            </a:r>
-            <a:endParaRPr lang="fr-FR" sz="1050" dirty="0">
-              <a:solidFill>
-                <a:schemeClr val="accent1">
-                  <a:lumMod val="60000"/>
-                  <a:lumOff val="40000"/>
-                </a:schemeClr>
-              </a:solidFill>
-            </a:endParaRPr>
-          </a:p>
-        </p:txBody>
-      </p:sp>
-      <p:sp>
-        <p:nvSpPr>
-          <p:cNvPr id="86" name="ZoneTexte 85"/>
-          <p:cNvSpPr txBox="1"/>
-          <p:nvPr/>
-        </p:nvSpPr>
-        <p:spPr>
-          <a:xfrm>
-            <a:off x="2339752" y="5964088"/>
-            <a:ext cx="1080120" cy="261610"/>
-          </a:xfrm>
-          <a:prstGeom prst="rect">
-            <a:avLst/>
-          </a:prstGeom>
-          <a:noFill/>
-        </p:spPr>
-        <p:txBody>
-          <a:bodyPr wrap="square" rtlCol="0">
-            <a:spAutoFit/>
-          </a:bodyPr>
-          <a:lstStyle/>
-          <a:p>
-            <a:pPr algn="ctr"/>
-            <a:r>
-              <a:rPr lang="fr-FR" sz="1050" dirty="0" smtClean="0">
-                <a:solidFill>
-                  <a:schemeClr val="accent1">
-                    <a:lumMod val="60000"/>
-                    <a:lumOff val="40000"/>
-                  </a:schemeClr>
-                </a:solidFill>
-              </a:rPr>
-              <a:t>Quitter</a:t>
-            </a:r>
-            <a:endParaRPr lang="fr-FR" sz="1050" dirty="0">
-              <a:solidFill>
-                <a:schemeClr val="accent1">
-                  <a:lumMod val="60000"/>
-                  <a:lumOff val="40000"/>
-                </a:schemeClr>
-              </a:solidFill>
-            </a:endParaRPr>
-          </a:p>
-        </p:txBody>
-      </p:sp>
-      <p:sp>
-        <p:nvSpPr>
-          <p:cNvPr id="91" name="Rectangle à coins arrondis 90"/>
-          <p:cNvSpPr/>
-          <p:nvPr/>
-        </p:nvSpPr>
-        <p:spPr>
-          <a:xfrm>
-            <a:off x="3672088" y="620688"/>
-            <a:ext cx="1692000" cy="396000"/>
-          </a:xfrm>
-          <a:prstGeom prst="roundRect">
-            <a:avLst/>
-          </a:prstGeom>
-          <a:ln/>
-        </p:spPr>
-        <p:style>
-          <a:lnRef idx="2">
-            <a:schemeClr val="dk1"/>
-          </a:lnRef>
-          <a:fillRef idx="1">
-            <a:schemeClr val="lt1"/>
-          </a:fillRef>
-          <a:effectRef idx="0">
-            <a:schemeClr val="dk1"/>
-          </a:effectRef>
-          <a:fontRef idx="minor">
-            <a:schemeClr val="dk1"/>
-          </a:fontRef>
-        </p:style>
-        <p:txBody>
-          <a:bodyPr rtlCol="0" anchor="ctr"/>
-          <a:lstStyle/>
-          <a:p>
-            <a:pPr algn="ctr"/>
-            <a:r>
-              <a:rPr lang="fr-FR" sz="1200" dirty="0" smtClean="0">
-                <a:solidFill>
-                  <a:schemeClr val="tx1"/>
-                </a:solidFill>
-              </a:rPr>
-              <a:t>Initialiser les données</a:t>
-            </a:r>
-            <a:endParaRPr lang="fr-FR" sz="1200" dirty="0">
-              <a:solidFill>
-                <a:schemeClr val="tx1"/>
-              </a:solidFill>
-            </a:endParaRPr>
-          </a:p>
-        </p:txBody>
-      </p:sp>
     </p:spTree>
+    <p:extLst>
+      <p:ext uri="{BB962C8B-B14F-4D97-AF65-F5344CB8AC3E}">
+        <p14:creationId xmlns:p14="http://schemas.microsoft.com/office/powerpoint/2010/main" val="898925216"/>
+      </p:ext>
+    </p:extLst>
   </p:cSld>
   <p:clrMapOvr>
     <a:masterClrMapping/>

</xml_diff>

<commit_message>
amélioration de gagnant et de joueur resolution des scores resolution du rechargement de deck
</commit_message>
<xml_diff>
--- a/Plan du code.pptx
+++ b/Plan du code.pptx
@@ -109,7 +109,7 @@
   </p:defaultTextStyle>
   <p:extLst>
     <p:ext uri="{EFAFB233-063F-42B5-8137-9DF3F51BA10A}">
-      <p15:sldGuideLst xmlns:p15="http://schemas.microsoft.com/office/powerpoint/2012/main">
+      <p15:sldGuideLst xmlns:p15="http://schemas.microsoft.com/office/powerpoint/2012/main" xmlns="">
         <p15:guide id="1" orient="horz" pos="2160">
           <p15:clr>
             <a:srgbClr val="A4A3A4"/>
@@ -209,7 +209,7 @@
             <a:fld id="{DDC8463C-3E3A-418A-A60E-8E63D1408739}" type="datetimeFigureOut">
               <a:rPr lang="fr-FR" smtClean="0"/>
               <a:pPr/>
-              <a:t>02/03/2016</a:t>
+              <a:t>27/03/2016</a:t>
             </a:fld>
             <a:endParaRPr lang="fr-FR"/>
           </a:p>
@@ -371,7 +371,7 @@
             <a:fld id="{18542CE6-5613-49DF-9696-56BD62AA6F54}" type="slidenum">
               <a:rPr lang="fr-FR" smtClean="0"/>
               <a:pPr/>
-              <a:t>‹#›</a:t>
+              <a:t>‹N°›</a:t>
             </a:fld>
             <a:endParaRPr lang="fr-FR"/>
           </a:p>
@@ -380,7 +380,7 @@
     </p:spTree>
     <p:extLst>
       <p:ext uri="{BB962C8B-B14F-4D97-AF65-F5344CB8AC3E}">
-        <p14:creationId xmlns:p14="http://schemas.microsoft.com/office/powerpoint/2010/main" val="4209985601"/>
+        <p14:creationId xmlns:p14="http://schemas.microsoft.com/office/powerpoint/2010/main" xmlns="" val="4209985601"/>
       </p:ext>
     </p:extLst>
   </p:cSld>
@@ -609,21 +609,13 @@
           <a:p>
             <a:r>
               <a:rPr lang="fr-FR" baseline="0" dirty="0" smtClean="0"/>
-              <a:t>A </a:t>
-            </a:r>
+              <a:t>A l’issue des 2 boucles, comparer score et continuer</a:t>
+            </a:r>
+          </a:p>
+          <a:p>
             <a:r>
               <a:rPr lang="fr-FR" baseline="0" dirty="0" smtClean="0"/>
-              <a:t>l’issue des 2 boucles, comparer score et continuer</a:t>
-            </a:r>
-          </a:p>
-          <a:p>
-            <a:r>
-              <a:rPr lang="fr-FR" baseline="0" dirty="0" smtClean="0"/>
-              <a:t>Ajouter </a:t>
-            </a:r>
-            <a:r>
-              <a:rPr lang="fr-FR" baseline="0" dirty="0" smtClean="0"/>
-              <a:t>affichage graphique, son…</a:t>
+              <a:t>Ajouter affichage graphique, son…</a:t>
             </a:r>
           </a:p>
           <a:p>
@@ -666,7 +658,7 @@
     </p:spTree>
     <p:extLst>
       <p:ext uri="{BB962C8B-B14F-4D97-AF65-F5344CB8AC3E}">
-        <p14:creationId xmlns:p14="http://schemas.microsoft.com/office/powerpoint/2010/main" val="4006202470"/>
+        <p14:creationId xmlns:p14="http://schemas.microsoft.com/office/powerpoint/2010/main" xmlns="" val="4006202470"/>
       </p:ext>
     </p:extLst>
   </p:cSld>
@@ -858,7 +850,7 @@
             <a:fld id="{0A9D268A-F862-4ECA-AAA6-6F579D34DADA}" type="datetimeFigureOut">
               <a:rPr lang="fr-FR" smtClean="0"/>
               <a:pPr/>
-              <a:t>02/03/2016</a:t>
+              <a:t>27/03/2016</a:t>
             </a:fld>
             <a:endParaRPr lang="fr-FR"/>
           </a:p>
@@ -901,7 +893,7 @@
             <a:fld id="{A4043CEC-C98D-4494-94F9-6942A0180D31}" type="slidenum">
               <a:rPr lang="fr-FR" smtClean="0"/>
               <a:pPr/>
-              <a:t>‹#›</a:t>
+              <a:t>‹N°›</a:t>
             </a:fld>
             <a:endParaRPr lang="fr-FR"/>
           </a:p>
@@ -1025,7 +1017,7 @@
             <a:fld id="{0A9D268A-F862-4ECA-AAA6-6F579D34DADA}" type="datetimeFigureOut">
               <a:rPr lang="fr-FR" smtClean="0"/>
               <a:pPr/>
-              <a:t>02/03/2016</a:t>
+              <a:t>27/03/2016</a:t>
             </a:fld>
             <a:endParaRPr lang="fr-FR"/>
           </a:p>
@@ -1068,7 +1060,7 @@
             <a:fld id="{A4043CEC-C98D-4494-94F9-6942A0180D31}" type="slidenum">
               <a:rPr lang="fr-FR" smtClean="0"/>
               <a:pPr/>
-              <a:t>‹#›</a:t>
+              <a:t>‹N°›</a:t>
             </a:fld>
             <a:endParaRPr lang="fr-FR"/>
           </a:p>
@@ -1202,7 +1194,7 @@
             <a:fld id="{0A9D268A-F862-4ECA-AAA6-6F579D34DADA}" type="datetimeFigureOut">
               <a:rPr lang="fr-FR" smtClean="0"/>
               <a:pPr/>
-              <a:t>02/03/2016</a:t>
+              <a:t>27/03/2016</a:t>
             </a:fld>
             <a:endParaRPr lang="fr-FR"/>
           </a:p>
@@ -1245,7 +1237,7 @@
             <a:fld id="{A4043CEC-C98D-4494-94F9-6942A0180D31}" type="slidenum">
               <a:rPr lang="fr-FR" smtClean="0"/>
               <a:pPr/>
-              <a:t>‹#›</a:t>
+              <a:t>‹N°›</a:t>
             </a:fld>
             <a:endParaRPr lang="fr-FR"/>
           </a:p>
@@ -1369,7 +1361,7 @@
             <a:fld id="{0A9D268A-F862-4ECA-AAA6-6F579D34DADA}" type="datetimeFigureOut">
               <a:rPr lang="fr-FR" smtClean="0"/>
               <a:pPr/>
-              <a:t>02/03/2016</a:t>
+              <a:t>27/03/2016</a:t>
             </a:fld>
             <a:endParaRPr lang="fr-FR"/>
           </a:p>
@@ -1412,7 +1404,7 @@
             <a:fld id="{A4043CEC-C98D-4494-94F9-6942A0180D31}" type="slidenum">
               <a:rPr lang="fr-FR" smtClean="0"/>
               <a:pPr/>
-              <a:t>‹#›</a:t>
+              <a:t>‹N°›</a:t>
             </a:fld>
             <a:endParaRPr lang="fr-FR"/>
           </a:p>
@@ -1612,7 +1604,7 @@
             <a:fld id="{0A9D268A-F862-4ECA-AAA6-6F579D34DADA}" type="datetimeFigureOut">
               <a:rPr lang="fr-FR" smtClean="0"/>
               <a:pPr/>
-              <a:t>02/03/2016</a:t>
+              <a:t>27/03/2016</a:t>
             </a:fld>
             <a:endParaRPr lang="fr-FR"/>
           </a:p>
@@ -1655,7 +1647,7 @@
             <a:fld id="{A4043CEC-C98D-4494-94F9-6942A0180D31}" type="slidenum">
               <a:rPr lang="fr-FR" smtClean="0"/>
               <a:pPr/>
-              <a:t>‹#›</a:t>
+              <a:t>‹N°›</a:t>
             </a:fld>
             <a:endParaRPr lang="fr-FR"/>
           </a:p>
@@ -1897,7 +1889,7 @@
             <a:fld id="{0A9D268A-F862-4ECA-AAA6-6F579D34DADA}" type="datetimeFigureOut">
               <a:rPr lang="fr-FR" smtClean="0"/>
               <a:pPr/>
-              <a:t>02/03/2016</a:t>
+              <a:t>27/03/2016</a:t>
             </a:fld>
             <a:endParaRPr lang="fr-FR"/>
           </a:p>
@@ -1940,7 +1932,7 @@
             <a:fld id="{A4043CEC-C98D-4494-94F9-6942A0180D31}" type="slidenum">
               <a:rPr lang="fr-FR" smtClean="0"/>
               <a:pPr/>
-              <a:t>‹#›</a:t>
+              <a:t>‹N°›</a:t>
             </a:fld>
             <a:endParaRPr lang="fr-FR"/>
           </a:p>
@@ -2316,7 +2308,7 @@
             <a:fld id="{0A9D268A-F862-4ECA-AAA6-6F579D34DADA}" type="datetimeFigureOut">
               <a:rPr lang="fr-FR" smtClean="0"/>
               <a:pPr/>
-              <a:t>02/03/2016</a:t>
+              <a:t>27/03/2016</a:t>
             </a:fld>
             <a:endParaRPr lang="fr-FR"/>
           </a:p>
@@ -2359,7 +2351,7 @@
             <a:fld id="{A4043CEC-C98D-4494-94F9-6942A0180D31}" type="slidenum">
               <a:rPr lang="fr-FR" smtClean="0"/>
               <a:pPr/>
-              <a:t>‹#›</a:t>
+              <a:t>‹N°›</a:t>
             </a:fld>
             <a:endParaRPr lang="fr-FR"/>
           </a:p>
@@ -2431,7 +2423,7 @@
             <a:fld id="{0A9D268A-F862-4ECA-AAA6-6F579D34DADA}" type="datetimeFigureOut">
               <a:rPr lang="fr-FR" smtClean="0"/>
               <a:pPr/>
-              <a:t>02/03/2016</a:t>
+              <a:t>27/03/2016</a:t>
             </a:fld>
             <a:endParaRPr lang="fr-FR"/>
           </a:p>
@@ -2474,7 +2466,7 @@
             <a:fld id="{A4043CEC-C98D-4494-94F9-6942A0180D31}" type="slidenum">
               <a:rPr lang="fr-FR" smtClean="0"/>
               <a:pPr/>
-              <a:t>‹#›</a:t>
+              <a:t>‹N°›</a:t>
             </a:fld>
             <a:endParaRPr lang="fr-FR"/>
           </a:p>
@@ -2523,7 +2515,7 @@
             <a:fld id="{0A9D268A-F862-4ECA-AAA6-6F579D34DADA}" type="datetimeFigureOut">
               <a:rPr lang="fr-FR" smtClean="0"/>
               <a:pPr/>
-              <a:t>02/03/2016</a:t>
+              <a:t>27/03/2016</a:t>
             </a:fld>
             <a:endParaRPr lang="fr-FR"/>
           </a:p>
@@ -2566,7 +2558,7 @@
             <a:fld id="{A4043CEC-C98D-4494-94F9-6942A0180D31}" type="slidenum">
               <a:rPr lang="fr-FR" smtClean="0"/>
               <a:pPr/>
-              <a:t>‹#›</a:t>
+              <a:t>‹N°›</a:t>
             </a:fld>
             <a:endParaRPr lang="fr-FR"/>
           </a:p>
@@ -2797,7 +2789,7 @@
             <a:fld id="{0A9D268A-F862-4ECA-AAA6-6F579D34DADA}" type="datetimeFigureOut">
               <a:rPr lang="fr-FR" smtClean="0"/>
               <a:pPr/>
-              <a:t>02/03/2016</a:t>
+              <a:t>27/03/2016</a:t>
             </a:fld>
             <a:endParaRPr lang="fr-FR"/>
           </a:p>
@@ -2840,7 +2832,7 @@
             <a:fld id="{A4043CEC-C98D-4494-94F9-6942A0180D31}" type="slidenum">
               <a:rPr lang="fr-FR" smtClean="0"/>
               <a:pPr/>
-              <a:t>‹#›</a:t>
+              <a:t>‹N°›</a:t>
             </a:fld>
             <a:endParaRPr lang="fr-FR"/>
           </a:p>
@@ -3047,7 +3039,7 @@
             <a:fld id="{0A9D268A-F862-4ECA-AAA6-6F579D34DADA}" type="datetimeFigureOut">
               <a:rPr lang="fr-FR" smtClean="0"/>
               <a:pPr/>
-              <a:t>02/03/2016</a:t>
+              <a:t>27/03/2016</a:t>
             </a:fld>
             <a:endParaRPr lang="fr-FR"/>
           </a:p>
@@ -3090,7 +3082,7 @@
             <a:fld id="{A4043CEC-C98D-4494-94F9-6942A0180D31}" type="slidenum">
               <a:rPr lang="fr-FR" smtClean="0"/>
               <a:pPr/>
-              <a:t>‹#›</a:t>
+              <a:t>‹N°›</a:t>
             </a:fld>
             <a:endParaRPr lang="fr-FR"/>
           </a:p>
@@ -3257,7 +3249,7 @@
             <a:fld id="{0A9D268A-F862-4ECA-AAA6-6F579D34DADA}" type="datetimeFigureOut">
               <a:rPr lang="fr-FR" smtClean="0"/>
               <a:pPr/>
-              <a:t>02/03/2016</a:t>
+              <a:t>27/03/2016</a:t>
             </a:fld>
             <a:endParaRPr lang="fr-FR"/>
           </a:p>
@@ -3336,7 +3328,7 @@
             <a:fld id="{A4043CEC-C98D-4494-94F9-6942A0180D31}" type="slidenum">
               <a:rPr lang="fr-FR" smtClean="0"/>
               <a:pPr/>
-              <a:t>‹#›</a:t>
+              <a:t>‹N°›</a:t>
             </a:fld>
             <a:endParaRPr lang="fr-FR"/>
           </a:p>
@@ -3694,11 +3686,7 @@
             <a:pPr algn="ctr"/>
             <a:r>
               <a:rPr lang="fr-FR" sz="1200" dirty="0" smtClean="0"/>
-              <a:t>Comparer le </a:t>
-            </a:r>
-            <a:r>
-              <a:rPr lang="fr-FR" sz="1200" dirty="0" smtClean="0"/>
-              <a:t>score</a:t>
+              <a:t>Comparer le score</a:t>
             </a:r>
           </a:p>
           <a:p>
@@ -3813,11 +3801,7 @@
             <a:pPr algn="ctr"/>
             <a:r>
               <a:rPr lang="fr-FR" sz="1200" dirty="0"/>
-              <a:t>Tire une </a:t>
-            </a:r>
-            <a:r>
-              <a:rPr lang="fr-FR" sz="1200" dirty="0"/>
-              <a:t>carte pour le </a:t>
+              <a:t>Tire une carte pour le </a:t>
             </a:r>
             <a:r>
               <a:rPr lang="fr-FR" sz="1200" dirty="0" smtClean="0"/>
@@ -4324,11 +4308,6 @@
               </a:rPr>
               <a:t>Tirer / rester</a:t>
             </a:r>
-            <a:endParaRPr lang="fr-FR" sz="1000" dirty="0" smtClean="0">
-              <a:solidFill>
-                <a:schemeClr val="tx1"/>
-              </a:solidFill>
-            </a:endParaRPr>
           </a:p>
         </p:txBody>
       </p:sp>
@@ -4476,11 +4455,6 @@
               </a:rPr>
               <a:t>+ de 21 ?</a:t>
             </a:r>
-            <a:endParaRPr lang="fr-FR" sz="1000" dirty="0" smtClean="0">
-              <a:solidFill>
-                <a:schemeClr val="tx1"/>
-              </a:solidFill>
-            </a:endParaRPr>
           </a:p>
         </p:txBody>
       </p:sp>
@@ -4752,7 +4726,6 @@
               <a:rPr lang="fr-FR" sz="1200" dirty="0"/>
               <a:t>Croupier tire</a:t>
             </a:r>
-            <a:endParaRPr lang="fr-FR" sz="1200" dirty="0"/>
           </a:p>
         </p:txBody>
       </p:sp>
@@ -4828,11 +4801,6 @@
               </a:rPr>
               <a:t>+ de 17?</a:t>
             </a:r>
-            <a:endParaRPr lang="fr-FR" sz="1000" dirty="0" smtClean="0">
-              <a:solidFill>
-                <a:schemeClr val="tx1"/>
-              </a:solidFill>
-            </a:endParaRPr>
           </a:p>
         </p:txBody>
       </p:sp>
@@ -5227,7 +5195,7 @@
     </p:spTree>
     <p:extLst>
       <p:ext uri="{BB962C8B-B14F-4D97-AF65-F5344CB8AC3E}">
-        <p14:creationId xmlns:p14="http://schemas.microsoft.com/office/powerpoint/2010/main" val="898925216"/>
+        <p14:creationId xmlns:p14="http://schemas.microsoft.com/office/powerpoint/2010/main" xmlns="" val="898925216"/>
       </p:ext>
     </p:extLst>
   </p:cSld>

</xml_diff>